<commit_message>
added some intro slides to PPT
</commit_message>
<xml_diff>
--- a/Assets/presentation/Group 4 Project 1 Presentation.pptx
+++ b/Assets/presentation/Group 4 Project 1 Presentation.pptx
@@ -7,6 +7,9 @@
   <p:sldIdLst>
     <p:sldId id="256" r:id="rId2"/>
     <p:sldId id="257" r:id="rId3"/>
+    <p:sldId id="258" r:id="rId4"/>
+    <p:sldId id="259" r:id="rId5"/>
+    <p:sldId id="260" r:id="rId6"/>
   </p:sldIdLst>
   <p:sldSz cx="12192000" cy="6858000"/>
   <p:notesSz cx="6858000" cy="9144000"/>
@@ -105,6 +108,11 @@
       </a:defRPr>
     </a:lvl9pPr>
   </p:defaultTextStyle>
+  <p:extLst>
+    <p:ext uri="{EFAFB233-063F-42B5-8137-9DF3F51BA10A}">
+      <p15:sldGuideLst xmlns:p15="http://schemas.microsoft.com/office/powerpoint/2012/main"/>
+    </p:ext>
+  </p:extLst>
 </p:presentation>
 </file>
 
@@ -3889,10 +3897,10 @@
       </p:grpSpPr>
       <p:sp>
         <p:nvSpPr>
-          <p:cNvPr id="5" name="Title 4">
+          <p:cNvPr id="2" name="Title 1">
             <a:extLst>
               <a:ext uri="{FF2B5EF4-FFF2-40B4-BE49-F238E27FC236}">
-                <a16:creationId xmlns:a16="http://schemas.microsoft.com/office/drawing/2014/main" id="{ADB27003-F2EE-49FF-A196-8D2BAE8A7D6D}"/>
+                <a16:creationId xmlns:a16="http://schemas.microsoft.com/office/drawing/2014/main" id="{FAD14CB2-F593-4EB3-8BC8-B44FE130B063}"/>
               </a:ext>
             </a:extLst>
           </p:cNvPr>
@@ -3908,16 +3916,19 @@
           <a:bodyPr/>
           <a:lstStyle/>
           <a:p>
-            <a:endParaRPr lang="en-US"/>
-          </a:p>
-        </p:txBody>
-      </p:sp>
-      <p:sp>
-        <p:nvSpPr>
-          <p:cNvPr id="6" name="Text Placeholder 5">
+            <a:r>
+              <a:rPr lang="en-US" dirty="0"/>
+              <a:t>Value Added Proposal</a:t>
+            </a:r>
+          </a:p>
+        </p:txBody>
+      </p:sp>
+      <p:sp>
+        <p:nvSpPr>
+          <p:cNvPr id="3" name="Content Placeholder 2">
             <a:extLst>
               <a:ext uri="{FF2B5EF4-FFF2-40B4-BE49-F238E27FC236}">
-                <a16:creationId xmlns:a16="http://schemas.microsoft.com/office/drawing/2014/main" id="{3EBB6F44-234F-4771-B58D-AC008E00FB7E}"/>
+                <a16:creationId xmlns:a16="http://schemas.microsoft.com/office/drawing/2014/main" id="{D60F30C1-22BE-4BD7-91AF-CC45D0806162}"/>
               </a:ext>
             </a:extLst>
           </p:cNvPr>
@@ -3925,82 +3936,7 @@
             <a:spLocks noGrp="1"/>
           </p:cNvSpPr>
           <p:nvPr>
-            <p:ph type="body" idx="1"/>
-          </p:nvPr>
-        </p:nvSpPr>
-        <p:spPr/>
-        <p:txBody>
-          <a:bodyPr/>
-          <a:lstStyle/>
-          <a:p>
-            <a:endParaRPr lang="en-US"/>
-          </a:p>
-        </p:txBody>
-      </p:sp>
-      <p:sp>
-        <p:nvSpPr>
-          <p:cNvPr id="7" name="Content Placeholder 6">
-            <a:extLst>
-              <a:ext uri="{FF2B5EF4-FFF2-40B4-BE49-F238E27FC236}">
-                <a16:creationId xmlns:a16="http://schemas.microsoft.com/office/drawing/2014/main" id="{5D49ACEA-7A27-4869-ABF5-3BD6820BD84F}"/>
-              </a:ext>
-            </a:extLst>
-          </p:cNvPr>
-          <p:cNvSpPr>
-            <a:spLocks noGrp="1"/>
-          </p:cNvSpPr>
-          <p:nvPr>
-            <p:ph sz="half" idx="2"/>
-          </p:nvPr>
-        </p:nvSpPr>
-        <p:spPr/>
-        <p:txBody>
-          <a:bodyPr/>
-          <a:lstStyle/>
-          <a:p>
-            <a:endParaRPr lang="en-US"/>
-          </a:p>
-        </p:txBody>
-      </p:sp>
-      <p:sp>
-        <p:nvSpPr>
-          <p:cNvPr id="8" name="Text Placeholder 7">
-            <a:extLst>
-              <a:ext uri="{FF2B5EF4-FFF2-40B4-BE49-F238E27FC236}">
-                <a16:creationId xmlns:a16="http://schemas.microsoft.com/office/drawing/2014/main" id="{D3E30D31-C7FF-4B83-A1F6-1098560135C2}"/>
-              </a:ext>
-            </a:extLst>
-          </p:cNvPr>
-          <p:cNvSpPr>
-            <a:spLocks noGrp="1"/>
-          </p:cNvSpPr>
-          <p:nvPr>
-            <p:ph type="body" sz="quarter" idx="3"/>
-          </p:nvPr>
-        </p:nvSpPr>
-        <p:spPr/>
-        <p:txBody>
-          <a:bodyPr/>
-          <a:lstStyle/>
-          <a:p>
-            <a:endParaRPr lang="en-US"/>
-          </a:p>
-        </p:txBody>
-      </p:sp>
-      <p:sp>
-        <p:nvSpPr>
-          <p:cNvPr id="9" name="Content Placeholder 8">
-            <a:extLst>
-              <a:ext uri="{FF2B5EF4-FFF2-40B4-BE49-F238E27FC236}">
-                <a16:creationId xmlns:a16="http://schemas.microsoft.com/office/drawing/2014/main" id="{1F081241-CCBE-4F0E-BABE-9EE42D6BEEAA}"/>
-              </a:ext>
-            </a:extLst>
-          </p:cNvPr>
-          <p:cNvSpPr>
-            <a:spLocks noGrp="1"/>
-          </p:cNvSpPr>
-          <p:nvPr>
-            <p:ph sz="quarter" idx="4"/>
+            <p:ph idx="1"/>
           </p:nvPr>
         </p:nvSpPr>
         <p:spPr/>
@@ -4016,6 +3952,337 @@
     <p:extLst>
       <p:ext uri="{BB962C8B-B14F-4D97-AF65-F5344CB8AC3E}">
         <p14:creationId xmlns:p14="http://schemas.microsoft.com/office/powerpoint/2010/main" val="154900881"/>
+      </p:ext>
+    </p:extLst>
+  </p:cSld>
+  <p:clrMapOvr>
+    <a:masterClrMapping/>
+  </p:clrMapOvr>
+</p:sld>
+</file>
+
+<file path=ppt/slides/slide3.xml><?xml version="1.0" encoding="utf-8"?>
+<p:sld xmlns:a="http://schemas.openxmlformats.org/drawingml/2006/main" xmlns:r="http://schemas.openxmlformats.org/officeDocument/2006/relationships" xmlns:p="http://schemas.openxmlformats.org/presentationml/2006/main">
+  <p:cSld>
+    <p:spTree>
+      <p:nvGrpSpPr>
+        <p:cNvPr id="1" name=""/>
+        <p:cNvGrpSpPr/>
+        <p:nvPr/>
+      </p:nvGrpSpPr>
+      <p:grpSpPr>
+        <a:xfrm>
+          <a:off x="0" y="0"/>
+          <a:ext cx="0" cy="0"/>
+          <a:chOff x="0" y="0"/>
+          <a:chExt cx="0" cy="0"/>
+        </a:xfrm>
+      </p:grpSpPr>
+      <p:sp>
+        <p:nvSpPr>
+          <p:cNvPr id="2" name="Title 1">
+            <a:extLst>
+              <a:ext uri="{FF2B5EF4-FFF2-40B4-BE49-F238E27FC236}">
+                <a16:creationId xmlns:a16="http://schemas.microsoft.com/office/drawing/2014/main" id="{FAD14CB2-F593-4EB3-8BC8-B44FE130B063}"/>
+              </a:ext>
+            </a:extLst>
+          </p:cNvPr>
+          <p:cNvSpPr>
+            <a:spLocks noGrp="1"/>
+          </p:cNvSpPr>
+          <p:nvPr>
+            <p:ph type="title"/>
+          </p:nvPr>
+        </p:nvSpPr>
+        <p:spPr/>
+        <p:txBody>
+          <a:bodyPr/>
+          <a:lstStyle/>
+          <a:p>
+            <a:r>
+              <a:rPr lang="en-US" dirty="0"/>
+              <a:t>Group Members</a:t>
+            </a:r>
+          </a:p>
+        </p:txBody>
+      </p:sp>
+      <p:sp>
+        <p:nvSpPr>
+          <p:cNvPr id="3" name="Content Placeholder 2">
+            <a:extLst>
+              <a:ext uri="{FF2B5EF4-FFF2-40B4-BE49-F238E27FC236}">
+                <a16:creationId xmlns:a16="http://schemas.microsoft.com/office/drawing/2014/main" id="{D60F30C1-22BE-4BD7-91AF-CC45D0806162}"/>
+              </a:ext>
+            </a:extLst>
+          </p:cNvPr>
+          <p:cNvSpPr>
+            <a:spLocks noGrp="1"/>
+          </p:cNvSpPr>
+          <p:nvPr>
+            <p:ph idx="1"/>
+          </p:nvPr>
+        </p:nvSpPr>
+        <p:spPr/>
+        <p:txBody>
+          <a:bodyPr/>
+          <a:lstStyle/>
+          <a:p>
+            <a:endParaRPr lang="en-US"/>
+          </a:p>
+        </p:txBody>
+      </p:sp>
+    </p:spTree>
+    <p:extLst>
+      <p:ext uri="{BB962C8B-B14F-4D97-AF65-F5344CB8AC3E}">
+        <p14:creationId xmlns:p14="http://schemas.microsoft.com/office/powerpoint/2010/main" val="3164642440"/>
+      </p:ext>
+    </p:extLst>
+  </p:cSld>
+  <p:clrMapOvr>
+    <a:masterClrMapping/>
+  </p:clrMapOvr>
+</p:sld>
+</file>
+
+<file path=ppt/slides/slide4.xml><?xml version="1.0" encoding="utf-8"?>
+<p:sld xmlns:a="http://schemas.openxmlformats.org/drawingml/2006/main" xmlns:r="http://schemas.openxmlformats.org/officeDocument/2006/relationships" xmlns:p="http://schemas.openxmlformats.org/presentationml/2006/main">
+  <p:cSld>
+    <p:spTree>
+      <p:nvGrpSpPr>
+        <p:cNvPr id="1" name=""/>
+        <p:cNvGrpSpPr/>
+        <p:nvPr/>
+      </p:nvGrpSpPr>
+      <p:grpSpPr>
+        <a:xfrm>
+          <a:off x="0" y="0"/>
+          <a:ext cx="0" cy="0"/>
+          <a:chOff x="0" y="0"/>
+          <a:chExt cx="0" cy="0"/>
+        </a:xfrm>
+      </p:grpSpPr>
+      <p:sp>
+        <p:nvSpPr>
+          <p:cNvPr id="2" name="Title 1">
+            <a:extLst>
+              <a:ext uri="{FF2B5EF4-FFF2-40B4-BE49-F238E27FC236}">
+                <a16:creationId xmlns:a16="http://schemas.microsoft.com/office/drawing/2014/main" id="{FAD14CB2-F593-4EB3-8BC8-B44FE130B063}"/>
+              </a:ext>
+            </a:extLst>
+          </p:cNvPr>
+          <p:cNvSpPr>
+            <a:spLocks noGrp="1"/>
+          </p:cNvSpPr>
+          <p:nvPr>
+            <p:ph type="title"/>
+          </p:nvPr>
+        </p:nvSpPr>
+        <p:spPr/>
+        <p:txBody>
+          <a:bodyPr/>
+          <a:lstStyle/>
+          <a:p>
+            <a:r>
+              <a:rPr lang="en-US" dirty="0"/>
+              <a:t>Tools Used for Development</a:t>
+            </a:r>
+          </a:p>
+        </p:txBody>
+      </p:sp>
+      <p:sp>
+        <p:nvSpPr>
+          <p:cNvPr id="3" name="Content Placeholder 2">
+            <a:extLst>
+              <a:ext uri="{FF2B5EF4-FFF2-40B4-BE49-F238E27FC236}">
+                <a16:creationId xmlns:a16="http://schemas.microsoft.com/office/drawing/2014/main" id="{D60F30C1-22BE-4BD7-91AF-CC45D0806162}"/>
+              </a:ext>
+            </a:extLst>
+          </p:cNvPr>
+          <p:cNvSpPr>
+            <a:spLocks noGrp="1"/>
+          </p:cNvSpPr>
+          <p:nvPr>
+            <p:ph idx="1"/>
+          </p:nvPr>
+        </p:nvSpPr>
+        <p:spPr/>
+        <p:txBody>
+          <a:bodyPr/>
+          <a:lstStyle/>
+          <a:p>
+            <a:endParaRPr lang="en-US"/>
+          </a:p>
+        </p:txBody>
+      </p:sp>
+    </p:spTree>
+    <p:extLst>
+      <p:ext uri="{BB962C8B-B14F-4D97-AF65-F5344CB8AC3E}">
+        <p14:creationId xmlns:p14="http://schemas.microsoft.com/office/powerpoint/2010/main" val="194285427"/>
+      </p:ext>
+    </p:extLst>
+  </p:cSld>
+  <p:clrMapOvr>
+    <a:masterClrMapping/>
+  </p:clrMapOvr>
+</p:sld>
+</file>
+
+<file path=ppt/slides/slide5.xml><?xml version="1.0" encoding="utf-8"?>
+<p:sld xmlns:a="http://schemas.openxmlformats.org/drawingml/2006/main" xmlns:r="http://schemas.openxmlformats.org/officeDocument/2006/relationships" xmlns:p="http://schemas.openxmlformats.org/presentationml/2006/main">
+  <p:cSld>
+    <p:spTree>
+      <p:nvGrpSpPr>
+        <p:cNvPr id="1" name=""/>
+        <p:cNvGrpSpPr/>
+        <p:nvPr/>
+      </p:nvGrpSpPr>
+      <p:grpSpPr>
+        <a:xfrm>
+          <a:off x="0" y="0"/>
+          <a:ext cx="0" cy="0"/>
+          <a:chOff x="0" y="0"/>
+          <a:chExt cx="0" cy="0"/>
+        </a:xfrm>
+      </p:grpSpPr>
+      <p:sp>
+        <p:nvSpPr>
+          <p:cNvPr id="4" name="Title 3">
+            <a:extLst>
+              <a:ext uri="{FF2B5EF4-FFF2-40B4-BE49-F238E27FC236}">
+                <a16:creationId xmlns:a16="http://schemas.microsoft.com/office/drawing/2014/main" id="{9D217995-CF48-453D-9F72-7A0FB0F49A4D}"/>
+              </a:ext>
+            </a:extLst>
+          </p:cNvPr>
+          <p:cNvSpPr>
+            <a:spLocks noGrp="1"/>
+          </p:cNvSpPr>
+          <p:nvPr>
+            <p:ph type="title"/>
+          </p:nvPr>
+        </p:nvSpPr>
+        <p:spPr/>
+        <p:txBody>
+          <a:bodyPr/>
+          <a:lstStyle/>
+          <a:p>
+            <a:r>
+              <a:rPr lang="en-US"/>
+              <a:t>Beginning Development</a:t>
+            </a:r>
+            <a:endParaRPr lang="en-US" dirty="0"/>
+          </a:p>
+        </p:txBody>
+      </p:sp>
+      <p:sp>
+        <p:nvSpPr>
+          <p:cNvPr id="7" name="Text Placeholder 6">
+            <a:extLst>
+              <a:ext uri="{FF2B5EF4-FFF2-40B4-BE49-F238E27FC236}">
+                <a16:creationId xmlns:a16="http://schemas.microsoft.com/office/drawing/2014/main" id="{77212D67-04F3-487D-855E-4C0D2F2EF2E1}"/>
+              </a:ext>
+            </a:extLst>
+          </p:cNvPr>
+          <p:cNvSpPr>
+            <a:spLocks noGrp="1"/>
+          </p:cNvSpPr>
+          <p:nvPr>
+            <p:ph type="body" idx="1"/>
+          </p:nvPr>
+        </p:nvSpPr>
+        <p:spPr/>
+        <p:txBody>
+          <a:bodyPr/>
+          <a:lstStyle/>
+          <a:p>
+            <a:r>
+              <a:rPr lang="en-US" dirty="0"/>
+              <a:t>Flowchart</a:t>
+            </a:r>
+          </a:p>
+        </p:txBody>
+      </p:sp>
+      <p:sp>
+        <p:nvSpPr>
+          <p:cNvPr id="5" name="Content Placeholder 4">
+            <a:extLst>
+              <a:ext uri="{FF2B5EF4-FFF2-40B4-BE49-F238E27FC236}">
+                <a16:creationId xmlns:a16="http://schemas.microsoft.com/office/drawing/2014/main" id="{B3A7EBAD-84BC-427E-B513-7234DCD8BF8B}"/>
+              </a:ext>
+            </a:extLst>
+          </p:cNvPr>
+          <p:cNvSpPr>
+            <a:spLocks noGrp="1"/>
+          </p:cNvSpPr>
+          <p:nvPr>
+            <p:ph sz="half" idx="2"/>
+          </p:nvPr>
+        </p:nvSpPr>
+        <p:spPr/>
+        <p:txBody>
+          <a:bodyPr/>
+          <a:lstStyle/>
+          <a:p>
+            <a:endParaRPr lang="en-US" dirty="0"/>
+          </a:p>
+        </p:txBody>
+      </p:sp>
+      <p:sp>
+        <p:nvSpPr>
+          <p:cNvPr id="8" name="Text Placeholder 7">
+            <a:extLst>
+              <a:ext uri="{FF2B5EF4-FFF2-40B4-BE49-F238E27FC236}">
+                <a16:creationId xmlns:a16="http://schemas.microsoft.com/office/drawing/2014/main" id="{FAD44BBC-30D1-46E6-A86F-A3AF8A22251A}"/>
+              </a:ext>
+            </a:extLst>
+          </p:cNvPr>
+          <p:cNvSpPr>
+            <a:spLocks noGrp="1"/>
+          </p:cNvSpPr>
+          <p:nvPr>
+            <p:ph type="body" sz="quarter" idx="3"/>
+          </p:nvPr>
+        </p:nvSpPr>
+        <p:spPr/>
+        <p:txBody>
+          <a:bodyPr/>
+          <a:lstStyle/>
+          <a:p>
+            <a:r>
+              <a:rPr lang="en-US" dirty="0"/>
+              <a:t>wireframe</a:t>
+            </a:r>
+          </a:p>
+        </p:txBody>
+      </p:sp>
+      <p:sp>
+        <p:nvSpPr>
+          <p:cNvPr id="6" name="Content Placeholder 5">
+            <a:extLst>
+              <a:ext uri="{FF2B5EF4-FFF2-40B4-BE49-F238E27FC236}">
+                <a16:creationId xmlns:a16="http://schemas.microsoft.com/office/drawing/2014/main" id="{436C213C-6D86-4BDA-8BC0-BC9BFA63E7EB}"/>
+              </a:ext>
+            </a:extLst>
+          </p:cNvPr>
+          <p:cNvSpPr>
+            <a:spLocks noGrp="1"/>
+          </p:cNvSpPr>
+          <p:nvPr>
+            <p:ph sz="quarter" idx="4"/>
+          </p:nvPr>
+        </p:nvSpPr>
+        <p:spPr/>
+        <p:txBody>
+          <a:bodyPr/>
+          <a:lstStyle/>
+          <a:p>
+            <a:endParaRPr lang="en-US" dirty="0"/>
+          </a:p>
+        </p:txBody>
+      </p:sp>
+    </p:spTree>
+    <p:extLst>
+      <p:ext uri="{BB962C8B-B14F-4D97-AF65-F5344CB8AC3E}">
+        <p14:creationId xmlns:p14="http://schemas.microsoft.com/office/powerpoint/2010/main" val="1319871924"/>
       </p:ext>
     </p:extLst>
   </p:cSld>

</xml_diff>

<commit_message>
added additional PPT content
</commit_message>
<xml_diff>
--- a/Assets/presentation/Group 4 Project 1 Presentation.pptx
+++ b/Assets/presentation/Group 4 Project 1 Presentation.pptx
@@ -6,10 +6,15 @@
   </p:sldMasterIdLst>
   <p:sldIdLst>
     <p:sldId id="256" r:id="rId2"/>
-    <p:sldId id="257" r:id="rId3"/>
-    <p:sldId id="258" r:id="rId4"/>
-    <p:sldId id="259" r:id="rId5"/>
-    <p:sldId id="260" r:id="rId6"/>
+    <p:sldId id="258" r:id="rId3"/>
+    <p:sldId id="257" r:id="rId4"/>
+    <p:sldId id="264" r:id="rId5"/>
+    <p:sldId id="265" r:id="rId6"/>
+    <p:sldId id="259" r:id="rId7"/>
+    <p:sldId id="260" r:id="rId8"/>
+    <p:sldId id="261" r:id="rId9"/>
+    <p:sldId id="262" r:id="rId10"/>
+    <p:sldId id="263" r:id="rId11"/>
   </p:sldIdLst>
   <p:sldSz cx="12192000" cy="6858000"/>
   <p:notesSz cx="6858000" cy="9144000"/>
@@ -3878,6 +3883,144 @@
 </p:sld>
 </file>
 
+<file path=ppt/slides/slide10.xml><?xml version="1.0" encoding="utf-8"?>
+<p:sld xmlns:a="http://schemas.openxmlformats.org/drawingml/2006/main" xmlns:r="http://schemas.openxmlformats.org/officeDocument/2006/relationships" xmlns:p="http://schemas.openxmlformats.org/presentationml/2006/main">
+  <p:cSld>
+    <p:spTree>
+      <p:nvGrpSpPr>
+        <p:cNvPr id="1" name=""/>
+        <p:cNvGrpSpPr/>
+        <p:nvPr/>
+      </p:nvGrpSpPr>
+      <p:grpSpPr>
+        <a:xfrm>
+          <a:off x="0" y="0"/>
+          <a:ext cx="0" cy="0"/>
+          <a:chOff x="0" y="0"/>
+          <a:chExt cx="0" cy="0"/>
+        </a:xfrm>
+      </p:grpSpPr>
+      <p:sp>
+        <p:nvSpPr>
+          <p:cNvPr id="2" name="Title 1">
+            <a:extLst>
+              <a:ext uri="{FF2B5EF4-FFF2-40B4-BE49-F238E27FC236}">
+                <a16:creationId xmlns:a16="http://schemas.microsoft.com/office/drawing/2014/main" id="{A81A6BCB-6791-42D1-BF19-D2413F042BC2}"/>
+              </a:ext>
+            </a:extLst>
+          </p:cNvPr>
+          <p:cNvSpPr>
+            <a:spLocks noGrp="1"/>
+          </p:cNvSpPr>
+          <p:nvPr>
+            <p:ph type="title"/>
+          </p:nvPr>
+        </p:nvSpPr>
+        <p:spPr/>
+        <p:txBody>
+          <a:bodyPr/>
+          <a:lstStyle/>
+          <a:p>
+            <a:r>
+              <a:rPr lang="en-US" dirty="0"/>
+              <a:t>Application Demo!!</a:t>
+            </a:r>
+          </a:p>
+        </p:txBody>
+      </p:sp>
+      <p:sp>
+        <p:nvSpPr>
+          <p:cNvPr id="3" name="Content Placeholder 2">
+            <a:extLst>
+              <a:ext uri="{FF2B5EF4-FFF2-40B4-BE49-F238E27FC236}">
+                <a16:creationId xmlns:a16="http://schemas.microsoft.com/office/drawing/2014/main" id="{E3678429-DD7B-4505-A4A7-8D30526C82CA}"/>
+              </a:ext>
+            </a:extLst>
+          </p:cNvPr>
+          <p:cNvSpPr>
+            <a:spLocks noGrp="1"/>
+          </p:cNvSpPr>
+          <p:nvPr>
+            <p:ph idx="1"/>
+          </p:nvPr>
+        </p:nvSpPr>
+        <p:spPr/>
+        <p:txBody>
+          <a:bodyPr/>
+          <a:lstStyle/>
+          <a:p>
+            <a:r>
+              <a:rPr lang="en-US" dirty="0"/>
+              <a:t>Here are the links to the team's GitHub Project Repo and GitHub pages link for our web application.</a:t>
+            </a:r>
+          </a:p>
+          <a:p>
+            <a:pPr marL="0" indent="0">
+              <a:lnSpc>
+                <a:spcPct val="0"/>
+              </a:lnSpc>
+              <a:buNone/>
+            </a:pPr>
+            <a:endParaRPr lang="en-US" dirty="0"/>
+          </a:p>
+          <a:p>
+            <a:pPr lvl="1">
+              <a:buFont typeface="Arial" panose="020B0604020202020204" pitchFamily="34" charset="0"/>
+              <a:buChar char="•"/>
+            </a:pPr>
+            <a:r>
+              <a:rPr lang="en-US" dirty="0"/>
+              <a:t>Link to GitHub Project Repo - </a:t>
+            </a:r>
+            <a:r>
+              <a:rPr lang="en-US" dirty="0">
+                <a:hlinkClick r:id="rId2"/>
+              </a:rPr>
+              <a:t>https://github.com/Group4project1/project1</a:t>
+            </a:r>
+            <a:endParaRPr lang="en-US" dirty="0"/>
+          </a:p>
+          <a:p>
+            <a:pPr marL="201168" lvl="1" indent="0">
+              <a:buNone/>
+            </a:pPr>
+            <a:endParaRPr lang="en-US" dirty="0"/>
+          </a:p>
+          <a:p>
+            <a:pPr lvl="1">
+              <a:buFont typeface="Arial" panose="020B0604020202020204" pitchFamily="34" charset="0"/>
+              <a:buChar char="•"/>
+            </a:pPr>
+            <a:r>
+              <a:rPr lang="en-US" dirty="0"/>
+              <a:t>Link to GitHub Pages for Web App - </a:t>
+            </a:r>
+            <a:r>
+              <a:rPr lang="en-US" dirty="0">
+                <a:hlinkClick r:id="rId3"/>
+              </a:rPr>
+              <a:t>https://group4project1.github.io/project1/</a:t>
+            </a:r>
+            <a:endParaRPr lang="en-US" dirty="0"/>
+          </a:p>
+          <a:p>
+            <a:endParaRPr lang="en-US" dirty="0"/>
+          </a:p>
+        </p:txBody>
+      </p:sp>
+    </p:spTree>
+    <p:extLst>
+      <p:ext uri="{BB962C8B-B14F-4D97-AF65-F5344CB8AC3E}">
+        <p14:creationId xmlns:p14="http://schemas.microsoft.com/office/powerpoint/2010/main" val="2558673445"/>
+      </p:ext>
+    </p:extLst>
+  </p:cSld>
+  <p:clrMapOvr>
+    <a:masterClrMapping/>
+  </p:clrMapOvr>
+</p:sld>
+</file>
+
 <file path=ppt/slides/slide2.xml><?xml version="1.0" encoding="utf-8"?>
 <p:sld xmlns:a="http://schemas.openxmlformats.org/drawingml/2006/main" xmlns:r="http://schemas.openxmlformats.org/officeDocument/2006/relationships" xmlns:p="http://schemas.openxmlformats.org/presentationml/2006/main">
   <p:cSld>
@@ -3918,7 +4061,7 @@
           <a:p>
             <a:r>
               <a:rPr lang="en-US" dirty="0"/>
-              <a:t>Value Added Proposal</a:t>
+              <a:t>Group Members</a:t>
             </a:r>
           </a:p>
         </p:txBody>
@@ -3951,7 +4094,7 @@
     </p:spTree>
     <p:extLst>
       <p:ext uri="{BB962C8B-B14F-4D97-AF65-F5344CB8AC3E}">
-        <p14:creationId xmlns:p14="http://schemas.microsoft.com/office/powerpoint/2010/main" val="154900881"/>
+        <p14:creationId xmlns:p14="http://schemas.microsoft.com/office/powerpoint/2010/main" val="3164642440"/>
       </p:ext>
     </p:extLst>
   </p:cSld>
@@ -4001,7 +4144,7 @@
           <a:p>
             <a:r>
               <a:rPr lang="en-US" dirty="0"/>
-              <a:t>Group Members</a:t>
+              <a:t>Value Added Proposal</a:t>
             </a:r>
           </a:p>
         </p:txBody>
@@ -4034,7 +4177,7 @@
     </p:spTree>
     <p:extLst>
       <p:ext uri="{BB962C8B-B14F-4D97-AF65-F5344CB8AC3E}">
-        <p14:creationId xmlns:p14="http://schemas.microsoft.com/office/powerpoint/2010/main" val="3164642440"/>
+        <p14:creationId xmlns:p14="http://schemas.microsoft.com/office/powerpoint/2010/main" val="154900881"/>
       </p:ext>
     </p:extLst>
   </p:cSld>
@@ -4063,10 +4206,10 @@
       </p:grpSpPr>
       <p:sp>
         <p:nvSpPr>
-          <p:cNvPr id="2" name="Title 1">
+          <p:cNvPr id="18" name="Title 17">
             <a:extLst>
               <a:ext uri="{FF2B5EF4-FFF2-40B4-BE49-F238E27FC236}">
-                <a16:creationId xmlns:a16="http://schemas.microsoft.com/office/drawing/2014/main" id="{FAD14CB2-F593-4EB3-8BC8-B44FE130B063}"/>
+                <a16:creationId xmlns:a16="http://schemas.microsoft.com/office/drawing/2014/main" id="{382BE2DA-2D7B-4309-955D-F85AD658DC91}"/>
               </a:ext>
             </a:extLst>
           </p:cNvPr>
@@ -4084,17 +4227,17 @@
           <a:p>
             <a:r>
               <a:rPr lang="en-US" dirty="0"/>
-              <a:t>Tools Used for Development</a:t>
-            </a:r>
-          </a:p>
-        </p:txBody>
-      </p:sp>
-      <p:sp>
-        <p:nvSpPr>
-          <p:cNvPr id="3" name="Content Placeholder 2">
+              <a:t>Project Requirements</a:t>
+            </a:r>
+          </a:p>
+        </p:txBody>
+      </p:sp>
+      <p:sp>
+        <p:nvSpPr>
+          <p:cNvPr id="19" name="Content Placeholder 18">
             <a:extLst>
               <a:ext uri="{FF2B5EF4-FFF2-40B4-BE49-F238E27FC236}">
-                <a16:creationId xmlns:a16="http://schemas.microsoft.com/office/drawing/2014/main" id="{D60F30C1-22BE-4BD7-91AF-CC45D0806162}"/>
+                <a16:creationId xmlns:a16="http://schemas.microsoft.com/office/drawing/2014/main" id="{55B74B31-AA31-4C04-AA40-099F1C74F53F}"/>
               </a:ext>
             </a:extLst>
           </p:cNvPr>
@@ -4110,14 +4253,116 @@
           <a:bodyPr/>
           <a:lstStyle/>
           <a:p>
-            <a:endParaRPr lang="en-US"/>
+            <a:pPr>
+              <a:buFont typeface="Wingdings" panose="05000000000000000000" pitchFamily="2" charset="2"/>
+              <a:buChar char="ü"/>
+            </a:pPr>
+            <a:r>
+              <a:rPr lang="en-US" dirty="0"/>
+              <a:t>Must use at least two server-side APIs</a:t>
+            </a:r>
+          </a:p>
+          <a:p>
+            <a:pPr>
+              <a:buFont typeface="Wingdings" panose="05000000000000000000" pitchFamily="2" charset="2"/>
+              <a:buChar char="ü"/>
+            </a:pPr>
+            <a:r>
+              <a:rPr lang="en-US" dirty="0"/>
+              <a:t>Must use a CSS framework </a:t>
+            </a:r>
+            <a:r>
+              <a:rPr lang="en-US" i="1" dirty="0"/>
+              <a:t>other than </a:t>
+            </a:r>
+            <a:r>
+              <a:rPr lang="en-US" dirty="0"/>
+              <a:t>Bootstrap</a:t>
+            </a:r>
+          </a:p>
+          <a:p>
+            <a:pPr>
+              <a:buFont typeface="Wingdings" panose="05000000000000000000" pitchFamily="2" charset="2"/>
+              <a:buChar char="ü"/>
+            </a:pPr>
+            <a:r>
+              <a:rPr lang="en-US" dirty="0"/>
+              <a:t>Use at least one new third-party API</a:t>
+            </a:r>
+          </a:p>
+          <a:p>
+            <a:pPr>
+              <a:buFont typeface="Wingdings" panose="05000000000000000000" pitchFamily="2" charset="2"/>
+              <a:buChar char="ü"/>
+            </a:pPr>
+            <a:r>
+              <a:rPr lang="en-US" dirty="0"/>
+              <a:t>Must have a polished, mobile-first UI</a:t>
+            </a:r>
+          </a:p>
+          <a:p>
+            <a:pPr>
+              <a:buFont typeface="Wingdings" panose="05000000000000000000" pitchFamily="2" charset="2"/>
+              <a:buChar char="ü"/>
+            </a:pPr>
+            <a:r>
+              <a:rPr lang="en-US" dirty="0"/>
+              <a:t>Must meet good quality coding standards (indentation, scoping, naming, etc.)</a:t>
+            </a:r>
+          </a:p>
+          <a:p>
+            <a:pPr>
+              <a:buFont typeface="Wingdings" panose="05000000000000000000" pitchFamily="2" charset="2"/>
+              <a:buChar char="ü"/>
+            </a:pPr>
+            <a:r>
+              <a:rPr lang="en-US" dirty="0"/>
+              <a:t>Does NOT use alerts, confirms, or prompts (look into </a:t>
+            </a:r>
+            <a:r>
+              <a:rPr lang="en-US" i="1" dirty="0"/>
+              <a:t>modals</a:t>
+            </a:r>
+            <a:r>
+              <a:rPr lang="en-US" dirty="0"/>
+              <a:t>).</a:t>
+            </a:r>
+          </a:p>
+          <a:p>
+            <a:pPr>
+              <a:buFont typeface="Wingdings" panose="05000000000000000000" pitchFamily="2" charset="2"/>
+              <a:buChar char="ü"/>
+            </a:pPr>
+            <a:r>
+              <a:rPr lang="en-US" dirty="0"/>
+              <a:t>Must be deployed to GitHub Pages</a:t>
+            </a:r>
+          </a:p>
+          <a:p>
+            <a:pPr>
+              <a:buFont typeface="Wingdings" panose="05000000000000000000" pitchFamily="2" charset="2"/>
+              <a:buChar char="ü"/>
+            </a:pPr>
+            <a:r>
+              <a:rPr lang="en-US" dirty="0"/>
+              <a:t>Must be interactive (</a:t>
+            </a:r>
+            <a:r>
+              <a:rPr lang="en-US" dirty="0" err="1"/>
+              <a:t>i.e</a:t>
+            </a:r>
+            <a:r>
+              <a:rPr lang="en-US" dirty="0"/>
+              <a:t>: accept and respond to user input)</a:t>
+            </a:r>
+            <a:endParaRPr lang="en-US" b="1" dirty="0"/>
           </a:p>
         </p:txBody>
       </p:sp>
     </p:spTree>
     <p:extLst>
       <p:ext uri="{BB962C8B-B14F-4D97-AF65-F5344CB8AC3E}">
-        <p14:creationId xmlns:p14="http://schemas.microsoft.com/office/powerpoint/2010/main" val="194285427"/>
+        <p14:creationId xmlns:p14="http://schemas.microsoft.com/office/powerpoint/2010/main" val="280059492"/>
       </p:ext>
     </p:extLst>
   </p:cSld>
@@ -4146,6 +4391,251 @@
       </p:grpSpPr>
       <p:sp>
         <p:nvSpPr>
+          <p:cNvPr id="2" name="Title 1">
+            <a:extLst>
+              <a:ext uri="{FF2B5EF4-FFF2-40B4-BE49-F238E27FC236}">
+                <a16:creationId xmlns:a16="http://schemas.microsoft.com/office/drawing/2014/main" id="{EFBF182F-32AB-46F7-8CBA-8FB215C6A87A}"/>
+              </a:ext>
+            </a:extLst>
+          </p:cNvPr>
+          <p:cNvSpPr>
+            <a:spLocks noGrp="1"/>
+          </p:cNvSpPr>
+          <p:nvPr>
+            <p:ph type="title"/>
+          </p:nvPr>
+        </p:nvSpPr>
+        <p:spPr/>
+        <p:txBody>
+          <a:bodyPr/>
+          <a:lstStyle/>
+          <a:p>
+            <a:r>
+              <a:rPr lang="en-US" dirty="0"/>
+              <a:t>Meeting Our Project MVP</a:t>
+            </a:r>
+          </a:p>
+        </p:txBody>
+      </p:sp>
+      <p:sp>
+        <p:nvSpPr>
+          <p:cNvPr id="3" name="Text Placeholder 2">
+            <a:extLst>
+              <a:ext uri="{FF2B5EF4-FFF2-40B4-BE49-F238E27FC236}">
+                <a16:creationId xmlns:a16="http://schemas.microsoft.com/office/drawing/2014/main" id="{2ED03923-908E-44FF-B0A2-CFE25CF0FF86}"/>
+              </a:ext>
+            </a:extLst>
+          </p:cNvPr>
+          <p:cNvSpPr>
+            <a:spLocks noGrp="1"/>
+          </p:cNvSpPr>
+          <p:nvPr>
+            <p:ph type="body" idx="1"/>
+          </p:nvPr>
+        </p:nvSpPr>
+        <p:spPr/>
+        <p:txBody>
+          <a:bodyPr/>
+          <a:lstStyle/>
+          <a:p>
+            <a:r>
+              <a:rPr lang="en-US"/>
+              <a:t>User </a:t>
+            </a:r>
+            <a:endParaRPr lang="en-US" dirty="0"/>
+          </a:p>
+        </p:txBody>
+      </p:sp>
+      <p:sp>
+        <p:nvSpPr>
+          <p:cNvPr id="4" name="Content Placeholder 3">
+            <a:extLst>
+              <a:ext uri="{FF2B5EF4-FFF2-40B4-BE49-F238E27FC236}">
+                <a16:creationId xmlns:a16="http://schemas.microsoft.com/office/drawing/2014/main" id="{24AF89E1-8FAD-4036-94A2-F725CCAD0765}"/>
+              </a:ext>
+            </a:extLst>
+          </p:cNvPr>
+          <p:cNvSpPr>
+            <a:spLocks noGrp="1"/>
+          </p:cNvSpPr>
+          <p:nvPr>
+            <p:ph sz="half" idx="2"/>
+          </p:nvPr>
+        </p:nvSpPr>
+        <p:spPr/>
+        <p:txBody>
+          <a:bodyPr/>
+          <a:lstStyle/>
+          <a:p>
+            <a:endParaRPr lang="en-US" dirty="0"/>
+          </a:p>
+        </p:txBody>
+      </p:sp>
+      <p:sp>
+        <p:nvSpPr>
+          <p:cNvPr id="5" name="Text Placeholder 4">
+            <a:extLst>
+              <a:ext uri="{FF2B5EF4-FFF2-40B4-BE49-F238E27FC236}">
+                <a16:creationId xmlns:a16="http://schemas.microsoft.com/office/drawing/2014/main" id="{C9575EAE-319D-47A7-B7FD-DF5EA631BA32}"/>
+              </a:ext>
+            </a:extLst>
+          </p:cNvPr>
+          <p:cNvSpPr>
+            <a:spLocks noGrp="1"/>
+          </p:cNvSpPr>
+          <p:nvPr>
+            <p:ph type="body" sz="quarter" idx="3"/>
+          </p:nvPr>
+        </p:nvSpPr>
+        <p:spPr/>
+        <p:txBody>
+          <a:bodyPr/>
+          <a:lstStyle/>
+          <a:p>
+            <a:endParaRPr lang="en-US"/>
+          </a:p>
+        </p:txBody>
+      </p:sp>
+      <p:sp>
+        <p:nvSpPr>
+          <p:cNvPr id="6" name="Content Placeholder 5">
+            <a:extLst>
+              <a:ext uri="{FF2B5EF4-FFF2-40B4-BE49-F238E27FC236}">
+                <a16:creationId xmlns:a16="http://schemas.microsoft.com/office/drawing/2014/main" id="{FA6921A9-C323-443A-91F4-D3BBDE344A9E}"/>
+              </a:ext>
+            </a:extLst>
+          </p:cNvPr>
+          <p:cNvSpPr>
+            <a:spLocks noGrp="1"/>
+          </p:cNvSpPr>
+          <p:nvPr>
+            <p:ph sz="quarter" idx="4"/>
+          </p:nvPr>
+        </p:nvSpPr>
+        <p:spPr/>
+        <p:txBody>
+          <a:bodyPr/>
+          <a:lstStyle/>
+          <a:p>
+            <a:endParaRPr lang="en-US"/>
+          </a:p>
+        </p:txBody>
+      </p:sp>
+    </p:spTree>
+    <p:extLst>
+      <p:ext uri="{BB962C8B-B14F-4D97-AF65-F5344CB8AC3E}">
+        <p14:creationId xmlns:p14="http://schemas.microsoft.com/office/powerpoint/2010/main" val="9560277"/>
+      </p:ext>
+    </p:extLst>
+  </p:cSld>
+  <p:clrMapOvr>
+    <a:masterClrMapping/>
+  </p:clrMapOvr>
+</p:sld>
+</file>
+
+<file path=ppt/slides/slide6.xml><?xml version="1.0" encoding="utf-8"?>
+<p:sld xmlns:a="http://schemas.openxmlformats.org/drawingml/2006/main" xmlns:r="http://schemas.openxmlformats.org/officeDocument/2006/relationships" xmlns:p="http://schemas.openxmlformats.org/presentationml/2006/main">
+  <p:cSld>
+    <p:spTree>
+      <p:nvGrpSpPr>
+        <p:cNvPr id="1" name=""/>
+        <p:cNvGrpSpPr/>
+        <p:nvPr/>
+      </p:nvGrpSpPr>
+      <p:grpSpPr>
+        <a:xfrm>
+          <a:off x="0" y="0"/>
+          <a:ext cx="0" cy="0"/>
+          <a:chOff x="0" y="0"/>
+          <a:chExt cx="0" cy="0"/>
+        </a:xfrm>
+      </p:grpSpPr>
+      <p:sp>
+        <p:nvSpPr>
+          <p:cNvPr id="2" name="Title 1">
+            <a:extLst>
+              <a:ext uri="{FF2B5EF4-FFF2-40B4-BE49-F238E27FC236}">
+                <a16:creationId xmlns:a16="http://schemas.microsoft.com/office/drawing/2014/main" id="{FAD14CB2-F593-4EB3-8BC8-B44FE130B063}"/>
+              </a:ext>
+            </a:extLst>
+          </p:cNvPr>
+          <p:cNvSpPr>
+            <a:spLocks noGrp="1"/>
+          </p:cNvSpPr>
+          <p:nvPr>
+            <p:ph type="title"/>
+          </p:nvPr>
+        </p:nvSpPr>
+        <p:spPr/>
+        <p:txBody>
+          <a:bodyPr/>
+          <a:lstStyle/>
+          <a:p>
+            <a:r>
+              <a:rPr lang="en-US" dirty="0"/>
+              <a:t>Tools Used for Development</a:t>
+            </a:r>
+          </a:p>
+        </p:txBody>
+      </p:sp>
+      <p:sp>
+        <p:nvSpPr>
+          <p:cNvPr id="3" name="Content Placeholder 2">
+            <a:extLst>
+              <a:ext uri="{FF2B5EF4-FFF2-40B4-BE49-F238E27FC236}">
+                <a16:creationId xmlns:a16="http://schemas.microsoft.com/office/drawing/2014/main" id="{D60F30C1-22BE-4BD7-91AF-CC45D0806162}"/>
+              </a:ext>
+            </a:extLst>
+          </p:cNvPr>
+          <p:cNvSpPr>
+            <a:spLocks noGrp="1"/>
+          </p:cNvSpPr>
+          <p:nvPr>
+            <p:ph idx="1"/>
+          </p:nvPr>
+        </p:nvSpPr>
+        <p:spPr/>
+        <p:txBody>
+          <a:bodyPr/>
+          <a:lstStyle/>
+          <a:p>
+            <a:endParaRPr lang="en-US"/>
+          </a:p>
+        </p:txBody>
+      </p:sp>
+    </p:spTree>
+    <p:extLst>
+      <p:ext uri="{BB962C8B-B14F-4D97-AF65-F5344CB8AC3E}">
+        <p14:creationId xmlns:p14="http://schemas.microsoft.com/office/powerpoint/2010/main" val="194285427"/>
+      </p:ext>
+    </p:extLst>
+  </p:cSld>
+  <p:clrMapOvr>
+    <a:masterClrMapping/>
+  </p:clrMapOvr>
+</p:sld>
+</file>
+
+<file path=ppt/slides/slide7.xml><?xml version="1.0" encoding="utf-8"?>
+<p:sld xmlns:a="http://schemas.openxmlformats.org/drawingml/2006/main" xmlns:r="http://schemas.openxmlformats.org/officeDocument/2006/relationships" xmlns:p="http://schemas.openxmlformats.org/presentationml/2006/main">
+  <p:cSld>
+    <p:spTree>
+      <p:nvGrpSpPr>
+        <p:cNvPr id="1" name=""/>
+        <p:cNvGrpSpPr/>
+        <p:nvPr/>
+      </p:nvGrpSpPr>
+      <p:grpSpPr>
+        <a:xfrm>
+          <a:off x="0" y="0"/>
+          <a:ext cx="0" cy="0"/>
+          <a:chOff x="0" y="0"/>
+          <a:chExt cx="0" cy="0"/>
+        </a:xfrm>
+      </p:grpSpPr>
+      <p:sp>
+        <p:nvSpPr>
           <p:cNvPr id="4" name="Title 3">
             <a:extLst>
               <a:ext uri="{FF2B5EF4-FFF2-40B4-BE49-F238E27FC236}">
@@ -4283,6 +4773,172 @@
     <p:extLst>
       <p:ext uri="{BB962C8B-B14F-4D97-AF65-F5344CB8AC3E}">
         <p14:creationId xmlns:p14="http://schemas.microsoft.com/office/powerpoint/2010/main" val="1319871924"/>
+      </p:ext>
+    </p:extLst>
+  </p:cSld>
+  <p:clrMapOvr>
+    <a:masterClrMapping/>
+  </p:clrMapOvr>
+</p:sld>
+</file>
+
+<file path=ppt/slides/slide8.xml><?xml version="1.0" encoding="utf-8"?>
+<p:sld xmlns:a="http://schemas.openxmlformats.org/drawingml/2006/main" xmlns:r="http://schemas.openxmlformats.org/officeDocument/2006/relationships" xmlns:p="http://schemas.openxmlformats.org/presentationml/2006/main">
+  <p:cSld>
+    <p:spTree>
+      <p:nvGrpSpPr>
+        <p:cNvPr id="1" name=""/>
+        <p:cNvGrpSpPr/>
+        <p:nvPr/>
+      </p:nvGrpSpPr>
+      <p:grpSpPr>
+        <a:xfrm>
+          <a:off x="0" y="0"/>
+          <a:ext cx="0" cy="0"/>
+          <a:chOff x="0" y="0"/>
+          <a:chExt cx="0" cy="0"/>
+        </a:xfrm>
+      </p:grpSpPr>
+      <p:sp>
+        <p:nvSpPr>
+          <p:cNvPr id="2" name="Title 1">
+            <a:extLst>
+              <a:ext uri="{FF2B5EF4-FFF2-40B4-BE49-F238E27FC236}">
+                <a16:creationId xmlns:a16="http://schemas.microsoft.com/office/drawing/2014/main" id="{5CA1B235-0A35-4B48-AA31-F6B55AA0D7BB}"/>
+              </a:ext>
+            </a:extLst>
+          </p:cNvPr>
+          <p:cNvSpPr>
+            <a:spLocks noGrp="1"/>
+          </p:cNvSpPr>
+          <p:nvPr>
+            <p:ph type="title"/>
+          </p:nvPr>
+        </p:nvSpPr>
+        <p:spPr/>
+        <p:txBody>
+          <a:bodyPr/>
+          <a:lstStyle/>
+          <a:p>
+            <a:r>
+              <a:rPr lang="en-US" dirty="0"/>
+              <a:t>Project APIs</a:t>
+            </a:r>
+          </a:p>
+        </p:txBody>
+      </p:sp>
+      <p:sp>
+        <p:nvSpPr>
+          <p:cNvPr id="3" name="Content Placeholder 2">
+            <a:extLst>
+              <a:ext uri="{FF2B5EF4-FFF2-40B4-BE49-F238E27FC236}">
+                <a16:creationId xmlns:a16="http://schemas.microsoft.com/office/drawing/2014/main" id="{5A9B18C0-6423-4C49-ACDE-919654FC03ED}"/>
+              </a:ext>
+            </a:extLst>
+          </p:cNvPr>
+          <p:cNvSpPr>
+            <a:spLocks noGrp="1"/>
+          </p:cNvSpPr>
+          <p:nvPr>
+            <p:ph idx="1"/>
+          </p:nvPr>
+        </p:nvSpPr>
+        <p:spPr/>
+        <p:txBody>
+          <a:bodyPr/>
+          <a:lstStyle/>
+          <a:p>
+            <a:endParaRPr lang="en-US"/>
+          </a:p>
+        </p:txBody>
+      </p:sp>
+    </p:spTree>
+    <p:extLst>
+      <p:ext uri="{BB962C8B-B14F-4D97-AF65-F5344CB8AC3E}">
+        <p14:creationId xmlns:p14="http://schemas.microsoft.com/office/powerpoint/2010/main" val="1600017888"/>
+      </p:ext>
+    </p:extLst>
+  </p:cSld>
+  <p:clrMapOvr>
+    <a:masterClrMapping/>
+  </p:clrMapOvr>
+</p:sld>
+</file>
+
+<file path=ppt/slides/slide9.xml><?xml version="1.0" encoding="utf-8"?>
+<p:sld xmlns:a="http://schemas.openxmlformats.org/drawingml/2006/main" xmlns:r="http://schemas.openxmlformats.org/officeDocument/2006/relationships" xmlns:p="http://schemas.openxmlformats.org/presentationml/2006/main">
+  <p:cSld>
+    <p:spTree>
+      <p:nvGrpSpPr>
+        <p:cNvPr id="1" name=""/>
+        <p:cNvGrpSpPr/>
+        <p:nvPr/>
+      </p:nvGrpSpPr>
+      <p:grpSpPr>
+        <a:xfrm>
+          <a:off x="0" y="0"/>
+          <a:ext cx="0" cy="0"/>
+          <a:chOff x="0" y="0"/>
+          <a:chExt cx="0" cy="0"/>
+        </a:xfrm>
+      </p:grpSpPr>
+      <p:sp>
+        <p:nvSpPr>
+          <p:cNvPr id="2" name="Title 1">
+            <a:extLst>
+              <a:ext uri="{FF2B5EF4-FFF2-40B4-BE49-F238E27FC236}">
+                <a16:creationId xmlns:a16="http://schemas.microsoft.com/office/drawing/2014/main" id="{90395DE1-2535-4224-9430-D0A2715FE7D9}"/>
+              </a:ext>
+            </a:extLst>
+          </p:cNvPr>
+          <p:cNvSpPr>
+            <a:spLocks noGrp="1"/>
+          </p:cNvSpPr>
+          <p:nvPr>
+            <p:ph type="title"/>
+          </p:nvPr>
+        </p:nvSpPr>
+        <p:spPr/>
+        <p:txBody>
+          <a:bodyPr/>
+          <a:lstStyle/>
+          <a:p>
+            <a:r>
+              <a:rPr lang="en-US" dirty="0"/>
+              <a:t>Lessons Learned</a:t>
+            </a:r>
+          </a:p>
+        </p:txBody>
+      </p:sp>
+      <p:sp>
+        <p:nvSpPr>
+          <p:cNvPr id="3" name="Content Placeholder 2">
+            <a:extLst>
+              <a:ext uri="{FF2B5EF4-FFF2-40B4-BE49-F238E27FC236}">
+                <a16:creationId xmlns:a16="http://schemas.microsoft.com/office/drawing/2014/main" id="{367693E4-E37D-46A2-BE85-B85F186B5883}"/>
+              </a:ext>
+            </a:extLst>
+          </p:cNvPr>
+          <p:cNvSpPr>
+            <a:spLocks noGrp="1"/>
+          </p:cNvSpPr>
+          <p:nvPr>
+            <p:ph idx="1"/>
+          </p:nvPr>
+        </p:nvSpPr>
+        <p:spPr/>
+        <p:txBody>
+          <a:bodyPr/>
+          <a:lstStyle/>
+          <a:p>
+            <a:endParaRPr lang="en-US"/>
+          </a:p>
+        </p:txBody>
+      </p:sp>
+    </p:spTree>
+    <p:extLst>
+      <p:ext uri="{BB962C8B-B14F-4D97-AF65-F5344CB8AC3E}">
+        <p14:creationId xmlns:p14="http://schemas.microsoft.com/office/powerpoint/2010/main" val="2523085891"/>
       </p:ext>
     </p:extLst>
   </p:cSld>

</xml_diff>

<commit_message>
added more content to PPT
</commit_message>
<xml_diff>
--- a/Assets/presentation/Group 4 Project 1 Presentation.pptx
+++ b/Assets/presentation/Group 4 Project 1 Presentation.pptx
@@ -8,11 +8,11 @@
     <p:sldId id="256" r:id="rId2"/>
     <p:sldId id="258" r:id="rId3"/>
     <p:sldId id="257" r:id="rId4"/>
-    <p:sldId id="264" r:id="rId5"/>
-    <p:sldId id="265" r:id="rId6"/>
+    <p:sldId id="260" r:id="rId5"/>
+    <p:sldId id="264" r:id="rId6"/>
     <p:sldId id="259" r:id="rId7"/>
-    <p:sldId id="260" r:id="rId8"/>
-    <p:sldId id="261" r:id="rId9"/>
+    <p:sldId id="261" r:id="rId8"/>
+    <p:sldId id="265" r:id="rId9"/>
     <p:sldId id="262" r:id="rId10"/>
     <p:sldId id="263" r:id="rId11"/>
   </p:sldIdLst>
@@ -119,6 +119,3756 @@
     </p:ext>
   </p:extLst>
 </p:presentation>
+</file>
+
+<file path=ppt/diagrams/colors1.xml><?xml version="1.0" encoding="utf-8"?>
+<dgm:colorsDef xmlns:dgm="http://schemas.openxmlformats.org/drawingml/2006/diagram" xmlns:a="http://schemas.openxmlformats.org/drawingml/2006/main" uniqueId="urn:microsoft.com/office/officeart/2005/8/colors/accent1_2">
+  <dgm:title val=""/>
+  <dgm:desc val=""/>
+  <dgm:catLst>
+    <dgm:cat type="accent1" pri="11200"/>
+  </dgm:catLst>
+  <dgm:styleLbl name="node0">
+    <dgm:fillClrLst meth="repeat">
+      <a:schemeClr val="accent1"/>
+    </dgm:fillClrLst>
+    <dgm:linClrLst meth="repeat">
+      <a:schemeClr val="lt1"/>
+    </dgm:linClrLst>
+    <dgm:effectClrLst/>
+    <dgm:txLinClrLst/>
+    <dgm:txFillClrLst/>
+    <dgm:txEffectClrLst/>
+  </dgm:styleLbl>
+  <dgm:styleLbl name="alignNode1">
+    <dgm:fillClrLst meth="repeat">
+      <a:schemeClr val="accent1"/>
+    </dgm:fillClrLst>
+    <dgm:linClrLst meth="repeat">
+      <a:schemeClr val="accent1"/>
+    </dgm:linClrLst>
+    <dgm:effectClrLst/>
+    <dgm:txLinClrLst/>
+    <dgm:txFillClrLst/>
+    <dgm:txEffectClrLst/>
+  </dgm:styleLbl>
+  <dgm:styleLbl name="node1">
+    <dgm:fillClrLst meth="repeat">
+      <a:schemeClr val="accent1"/>
+    </dgm:fillClrLst>
+    <dgm:linClrLst meth="repeat">
+      <a:schemeClr val="lt1"/>
+    </dgm:linClrLst>
+    <dgm:effectClrLst/>
+    <dgm:txLinClrLst/>
+    <dgm:txFillClrLst/>
+    <dgm:txEffectClrLst/>
+  </dgm:styleLbl>
+  <dgm:styleLbl name="lnNode1">
+    <dgm:fillClrLst meth="repeat">
+      <a:schemeClr val="accent1"/>
+    </dgm:fillClrLst>
+    <dgm:linClrLst meth="repeat">
+      <a:schemeClr val="lt1"/>
+    </dgm:linClrLst>
+    <dgm:effectClrLst/>
+    <dgm:txLinClrLst/>
+    <dgm:txFillClrLst/>
+    <dgm:txEffectClrLst/>
+  </dgm:styleLbl>
+  <dgm:styleLbl name="vennNode1">
+    <dgm:fillClrLst meth="repeat">
+      <a:schemeClr val="accent1">
+        <a:alpha val="50000"/>
+      </a:schemeClr>
+    </dgm:fillClrLst>
+    <dgm:linClrLst meth="repeat">
+      <a:schemeClr val="lt1"/>
+    </dgm:linClrLst>
+    <dgm:effectClrLst/>
+    <dgm:txLinClrLst/>
+    <dgm:txFillClrLst/>
+    <dgm:txEffectClrLst/>
+  </dgm:styleLbl>
+  <dgm:styleLbl name="node2">
+    <dgm:fillClrLst meth="repeat">
+      <a:schemeClr val="accent1"/>
+    </dgm:fillClrLst>
+    <dgm:linClrLst meth="repeat">
+      <a:schemeClr val="lt1"/>
+    </dgm:linClrLst>
+    <dgm:effectClrLst/>
+    <dgm:txLinClrLst/>
+    <dgm:txFillClrLst/>
+    <dgm:txEffectClrLst/>
+  </dgm:styleLbl>
+  <dgm:styleLbl name="node3">
+    <dgm:fillClrLst meth="repeat">
+      <a:schemeClr val="accent1"/>
+    </dgm:fillClrLst>
+    <dgm:linClrLst meth="repeat">
+      <a:schemeClr val="lt1"/>
+    </dgm:linClrLst>
+    <dgm:effectClrLst/>
+    <dgm:txLinClrLst/>
+    <dgm:txFillClrLst/>
+    <dgm:txEffectClrLst/>
+  </dgm:styleLbl>
+  <dgm:styleLbl name="node4">
+    <dgm:fillClrLst meth="repeat">
+      <a:schemeClr val="accent1"/>
+    </dgm:fillClrLst>
+    <dgm:linClrLst meth="repeat">
+      <a:schemeClr val="lt1"/>
+    </dgm:linClrLst>
+    <dgm:effectClrLst/>
+    <dgm:txLinClrLst/>
+    <dgm:txFillClrLst/>
+    <dgm:txEffectClrLst/>
+  </dgm:styleLbl>
+  <dgm:styleLbl name="fgImgPlace1">
+    <dgm:fillClrLst meth="repeat">
+      <a:schemeClr val="accent1">
+        <a:tint val="50000"/>
+      </a:schemeClr>
+    </dgm:fillClrLst>
+    <dgm:linClrLst meth="repeat">
+      <a:schemeClr val="lt1"/>
+    </dgm:linClrLst>
+    <dgm:effectClrLst/>
+    <dgm:txLinClrLst/>
+    <dgm:txFillClrLst meth="repeat">
+      <a:schemeClr val="lt1"/>
+    </dgm:txFillClrLst>
+    <dgm:txEffectClrLst/>
+  </dgm:styleLbl>
+  <dgm:styleLbl name="alignImgPlace1">
+    <dgm:fillClrLst meth="repeat">
+      <a:schemeClr val="accent1">
+        <a:tint val="50000"/>
+      </a:schemeClr>
+    </dgm:fillClrLst>
+    <dgm:linClrLst meth="repeat">
+      <a:schemeClr val="lt1"/>
+    </dgm:linClrLst>
+    <dgm:effectClrLst/>
+    <dgm:txLinClrLst/>
+    <dgm:txFillClrLst meth="repeat">
+      <a:schemeClr val="lt1"/>
+    </dgm:txFillClrLst>
+    <dgm:txEffectClrLst/>
+  </dgm:styleLbl>
+  <dgm:styleLbl name="bgImgPlace1">
+    <dgm:fillClrLst meth="repeat">
+      <a:schemeClr val="accent1">
+        <a:tint val="50000"/>
+      </a:schemeClr>
+    </dgm:fillClrLst>
+    <dgm:linClrLst meth="repeat">
+      <a:schemeClr val="lt1"/>
+    </dgm:linClrLst>
+    <dgm:effectClrLst/>
+    <dgm:txLinClrLst/>
+    <dgm:txFillClrLst meth="repeat">
+      <a:schemeClr val="lt1"/>
+    </dgm:txFillClrLst>
+    <dgm:txEffectClrLst/>
+  </dgm:styleLbl>
+  <dgm:styleLbl name="sibTrans2D1">
+    <dgm:fillClrLst meth="repeat">
+      <a:schemeClr val="accent1">
+        <a:tint val="60000"/>
+      </a:schemeClr>
+    </dgm:fillClrLst>
+    <dgm:linClrLst meth="repeat">
+      <a:schemeClr val="accent1">
+        <a:tint val="60000"/>
+      </a:schemeClr>
+    </dgm:linClrLst>
+    <dgm:effectClrLst/>
+    <dgm:txLinClrLst/>
+    <dgm:txFillClrLst/>
+    <dgm:txEffectClrLst/>
+  </dgm:styleLbl>
+  <dgm:styleLbl name="fgSibTrans2D1">
+    <dgm:fillClrLst meth="repeat">
+      <a:schemeClr val="accent1">
+        <a:tint val="60000"/>
+      </a:schemeClr>
+    </dgm:fillClrLst>
+    <dgm:linClrLst meth="repeat">
+      <a:schemeClr val="accent1">
+        <a:tint val="60000"/>
+      </a:schemeClr>
+    </dgm:linClrLst>
+    <dgm:effectClrLst/>
+    <dgm:txLinClrLst/>
+    <dgm:txFillClrLst/>
+    <dgm:txEffectClrLst/>
+  </dgm:styleLbl>
+  <dgm:styleLbl name="bgSibTrans2D1">
+    <dgm:fillClrLst meth="repeat">
+      <a:schemeClr val="accent1">
+        <a:tint val="60000"/>
+      </a:schemeClr>
+    </dgm:fillClrLst>
+    <dgm:linClrLst meth="repeat">
+      <a:schemeClr val="accent1">
+        <a:tint val="60000"/>
+      </a:schemeClr>
+    </dgm:linClrLst>
+    <dgm:effectClrLst/>
+    <dgm:txLinClrLst/>
+    <dgm:txFillClrLst/>
+    <dgm:txEffectClrLst/>
+  </dgm:styleLbl>
+  <dgm:styleLbl name="sibTrans1D1">
+    <dgm:fillClrLst meth="repeat">
+      <a:schemeClr val="accent1"/>
+    </dgm:fillClrLst>
+    <dgm:linClrLst meth="repeat">
+      <a:schemeClr val="accent1"/>
+    </dgm:linClrLst>
+    <dgm:effectClrLst/>
+    <dgm:txLinClrLst/>
+    <dgm:txFillClrLst meth="repeat">
+      <a:schemeClr val="tx1"/>
+    </dgm:txFillClrLst>
+    <dgm:txEffectClrLst/>
+  </dgm:styleLbl>
+  <dgm:styleLbl name="callout">
+    <dgm:fillClrLst meth="repeat">
+      <a:schemeClr val="accent1"/>
+    </dgm:fillClrLst>
+    <dgm:linClrLst meth="repeat">
+      <a:schemeClr val="accent1">
+        <a:tint val="50000"/>
+      </a:schemeClr>
+    </dgm:linClrLst>
+    <dgm:effectClrLst/>
+    <dgm:txLinClrLst/>
+    <dgm:txFillClrLst meth="repeat">
+      <a:schemeClr val="tx1"/>
+    </dgm:txFillClrLst>
+    <dgm:txEffectClrLst/>
+  </dgm:styleLbl>
+  <dgm:styleLbl name="asst0">
+    <dgm:fillClrLst meth="repeat">
+      <a:schemeClr val="accent1"/>
+    </dgm:fillClrLst>
+    <dgm:linClrLst meth="repeat">
+      <a:schemeClr val="lt1"/>
+    </dgm:linClrLst>
+    <dgm:effectClrLst/>
+    <dgm:txLinClrLst/>
+    <dgm:txFillClrLst/>
+    <dgm:txEffectClrLst/>
+  </dgm:styleLbl>
+  <dgm:styleLbl name="asst1">
+    <dgm:fillClrLst meth="repeat">
+      <a:schemeClr val="accent1"/>
+    </dgm:fillClrLst>
+    <dgm:linClrLst meth="repeat">
+      <a:schemeClr val="lt1"/>
+    </dgm:linClrLst>
+    <dgm:effectClrLst/>
+    <dgm:txLinClrLst/>
+    <dgm:txFillClrLst/>
+    <dgm:txEffectClrLst/>
+  </dgm:styleLbl>
+  <dgm:styleLbl name="asst2">
+    <dgm:fillClrLst meth="repeat">
+      <a:schemeClr val="accent1"/>
+    </dgm:fillClrLst>
+    <dgm:linClrLst meth="repeat">
+      <a:schemeClr val="lt1"/>
+    </dgm:linClrLst>
+    <dgm:effectClrLst/>
+    <dgm:txLinClrLst/>
+    <dgm:txFillClrLst/>
+    <dgm:txEffectClrLst/>
+  </dgm:styleLbl>
+  <dgm:styleLbl name="asst3">
+    <dgm:fillClrLst meth="repeat">
+      <a:schemeClr val="accent1"/>
+    </dgm:fillClrLst>
+    <dgm:linClrLst meth="repeat">
+      <a:schemeClr val="lt1"/>
+    </dgm:linClrLst>
+    <dgm:effectClrLst/>
+    <dgm:txLinClrLst/>
+    <dgm:txFillClrLst/>
+    <dgm:txEffectClrLst/>
+  </dgm:styleLbl>
+  <dgm:styleLbl name="asst4">
+    <dgm:fillClrLst meth="repeat">
+      <a:schemeClr val="accent1"/>
+    </dgm:fillClrLst>
+    <dgm:linClrLst meth="repeat">
+      <a:schemeClr val="lt1"/>
+    </dgm:linClrLst>
+    <dgm:effectClrLst/>
+    <dgm:txLinClrLst/>
+    <dgm:txFillClrLst/>
+    <dgm:txEffectClrLst/>
+  </dgm:styleLbl>
+  <dgm:styleLbl name="parChTrans2D1">
+    <dgm:fillClrLst meth="repeat">
+      <a:schemeClr val="accent1">
+        <a:tint val="60000"/>
+      </a:schemeClr>
+    </dgm:fillClrLst>
+    <dgm:linClrLst meth="repeat">
+      <a:schemeClr val="accent1">
+        <a:tint val="60000"/>
+      </a:schemeClr>
+    </dgm:linClrLst>
+    <dgm:effectClrLst/>
+    <dgm:txLinClrLst/>
+    <dgm:txFillClrLst meth="repeat">
+      <a:schemeClr val="lt1"/>
+    </dgm:txFillClrLst>
+    <dgm:txEffectClrLst/>
+  </dgm:styleLbl>
+  <dgm:styleLbl name="parChTrans2D2">
+    <dgm:fillClrLst meth="repeat">
+      <a:schemeClr val="accent1"/>
+    </dgm:fillClrLst>
+    <dgm:linClrLst meth="repeat">
+      <a:schemeClr val="accent1"/>
+    </dgm:linClrLst>
+    <dgm:effectClrLst/>
+    <dgm:txLinClrLst/>
+    <dgm:txFillClrLst meth="repeat">
+      <a:schemeClr val="lt1"/>
+    </dgm:txFillClrLst>
+    <dgm:txEffectClrLst/>
+  </dgm:styleLbl>
+  <dgm:styleLbl name="parChTrans2D3">
+    <dgm:fillClrLst meth="repeat">
+      <a:schemeClr val="accent1"/>
+    </dgm:fillClrLst>
+    <dgm:linClrLst meth="repeat">
+      <a:schemeClr val="accent1"/>
+    </dgm:linClrLst>
+    <dgm:effectClrLst/>
+    <dgm:txLinClrLst/>
+    <dgm:txFillClrLst meth="repeat">
+      <a:schemeClr val="lt1"/>
+    </dgm:txFillClrLst>
+    <dgm:txEffectClrLst/>
+  </dgm:styleLbl>
+  <dgm:styleLbl name="parChTrans2D4">
+    <dgm:fillClrLst meth="repeat">
+      <a:schemeClr val="accent1"/>
+    </dgm:fillClrLst>
+    <dgm:linClrLst meth="repeat">
+      <a:schemeClr val="accent1"/>
+    </dgm:linClrLst>
+    <dgm:effectClrLst/>
+    <dgm:txLinClrLst/>
+    <dgm:txFillClrLst meth="repeat">
+      <a:schemeClr val="lt1"/>
+    </dgm:txFillClrLst>
+    <dgm:txEffectClrLst/>
+  </dgm:styleLbl>
+  <dgm:styleLbl name="parChTrans1D1">
+    <dgm:fillClrLst meth="repeat">
+      <a:schemeClr val="accent1"/>
+    </dgm:fillClrLst>
+    <dgm:linClrLst meth="repeat">
+      <a:schemeClr val="accent1">
+        <a:shade val="60000"/>
+      </a:schemeClr>
+    </dgm:linClrLst>
+    <dgm:effectClrLst/>
+    <dgm:txLinClrLst/>
+    <dgm:txFillClrLst meth="repeat">
+      <a:schemeClr val="tx1"/>
+    </dgm:txFillClrLst>
+    <dgm:txEffectClrLst/>
+  </dgm:styleLbl>
+  <dgm:styleLbl name="parChTrans1D2">
+    <dgm:fillClrLst meth="repeat">
+      <a:schemeClr val="accent1"/>
+    </dgm:fillClrLst>
+    <dgm:linClrLst meth="repeat">
+      <a:schemeClr val="accent1">
+        <a:shade val="60000"/>
+      </a:schemeClr>
+    </dgm:linClrLst>
+    <dgm:effectClrLst/>
+    <dgm:txLinClrLst/>
+    <dgm:txFillClrLst meth="repeat">
+      <a:schemeClr val="tx1"/>
+    </dgm:txFillClrLst>
+    <dgm:txEffectClrLst/>
+  </dgm:styleLbl>
+  <dgm:styleLbl name="parChTrans1D3">
+    <dgm:fillClrLst meth="repeat">
+      <a:schemeClr val="accent1"/>
+    </dgm:fillClrLst>
+    <dgm:linClrLst meth="repeat">
+      <a:schemeClr val="accent1">
+        <a:shade val="80000"/>
+      </a:schemeClr>
+    </dgm:linClrLst>
+    <dgm:effectClrLst/>
+    <dgm:txLinClrLst/>
+    <dgm:txFillClrLst meth="repeat">
+      <a:schemeClr val="tx1"/>
+    </dgm:txFillClrLst>
+    <dgm:txEffectClrLst/>
+  </dgm:styleLbl>
+  <dgm:styleLbl name="parChTrans1D4">
+    <dgm:fillClrLst meth="repeat">
+      <a:schemeClr val="accent1"/>
+    </dgm:fillClrLst>
+    <dgm:linClrLst meth="repeat">
+      <a:schemeClr val="accent1">
+        <a:shade val="80000"/>
+      </a:schemeClr>
+    </dgm:linClrLst>
+    <dgm:effectClrLst/>
+    <dgm:txLinClrLst/>
+    <dgm:txFillClrLst meth="repeat">
+      <a:schemeClr val="tx1"/>
+    </dgm:txFillClrLst>
+    <dgm:txEffectClrLst/>
+  </dgm:styleLbl>
+  <dgm:styleLbl name="fgAcc1">
+    <dgm:fillClrLst meth="repeat">
+      <a:schemeClr val="lt1">
+        <a:alpha val="90000"/>
+      </a:schemeClr>
+    </dgm:fillClrLst>
+    <dgm:linClrLst meth="repeat">
+      <a:schemeClr val="accent1"/>
+    </dgm:linClrLst>
+    <dgm:effectClrLst/>
+    <dgm:txLinClrLst/>
+    <dgm:txFillClrLst meth="repeat">
+      <a:schemeClr val="dk1"/>
+    </dgm:txFillClrLst>
+    <dgm:txEffectClrLst/>
+  </dgm:styleLbl>
+  <dgm:styleLbl name="conFgAcc1">
+    <dgm:fillClrLst meth="repeat">
+      <a:schemeClr val="lt1">
+        <a:alpha val="90000"/>
+      </a:schemeClr>
+    </dgm:fillClrLst>
+    <dgm:linClrLst meth="repeat">
+      <a:schemeClr val="accent1"/>
+    </dgm:linClrLst>
+    <dgm:effectClrLst/>
+    <dgm:txLinClrLst/>
+    <dgm:txFillClrLst meth="repeat">
+      <a:schemeClr val="dk1"/>
+    </dgm:txFillClrLst>
+    <dgm:txEffectClrLst/>
+  </dgm:styleLbl>
+  <dgm:styleLbl name="alignAcc1">
+    <dgm:fillClrLst meth="repeat">
+      <a:schemeClr val="lt1">
+        <a:alpha val="90000"/>
+      </a:schemeClr>
+    </dgm:fillClrLst>
+    <dgm:linClrLst meth="repeat">
+      <a:schemeClr val="accent1"/>
+    </dgm:linClrLst>
+    <dgm:effectClrLst/>
+    <dgm:txLinClrLst/>
+    <dgm:txFillClrLst meth="repeat">
+      <a:schemeClr val="dk1"/>
+    </dgm:txFillClrLst>
+    <dgm:txEffectClrLst/>
+  </dgm:styleLbl>
+  <dgm:styleLbl name="trAlignAcc1">
+    <dgm:fillClrLst meth="repeat">
+      <a:schemeClr val="lt1">
+        <a:alpha val="40000"/>
+      </a:schemeClr>
+    </dgm:fillClrLst>
+    <dgm:linClrLst meth="repeat">
+      <a:schemeClr val="accent1"/>
+    </dgm:linClrLst>
+    <dgm:effectClrLst/>
+    <dgm:txLinClrLst/>
+    <dgm:txFillClrLst meth="repeat">
+      <a:schemeClr val="dk1"/>
+    </dgm:txFillClrLst>
+    <dgm:txEffectClrLst/>
+  </dgm:styleLbl>
+  <dgm:styleLbl name="bgAcc1">
+    <dgm:fillClrLst meth="repeat">
+      <a:schemeClr val="lt1">
+        <a:alpha val="90000"/>
+      </a:schemeClr>
+    </dgm:fillClrLst>
+    <dgm:linClrLst meth="repeat">
+      <a:schemeClr val="accent1"/>
+    </dgm:linClrLst>
+    <dgm:effectClrLst/>
+    <dgm:txLinClrLst/>
+    <dgm:txFillClrLst meth="repeat">
+      <a:schemeClr val="dk1"/>
+    </dgm:txFillClrLst>
+    <dgm:txEffectClrLst/>
+  </dgm:styleLbl>
+  <dgm:styleLbl name="solidFgAcc1">
+    <dgm:fillClrLst meth="repeat">
+      <a:schemeClr val="lt1"/>
+    </dgm:fillClrLst>
+    <dgm:linClrLst meth="repeat">
+      <a:schemeClr val="accent1"/>
+    </dgm:linClrLst>
+    <dgm:effectClrLst/>
+    <dgm:txLinClrLst/>
+    <dgm:txFillClrLst meth="repeat">
+      <a:schemeClr val="dk1"/>
+    </dgm:txFillClrLst>
+    <dgm:txEffectClrLst/>
+  </dgm:styleLbl>
+  <dgm:styleLbl name="solidAlignAcc1">
+    <dgm:fillClrLst meth="repeat">
+      <a:schemeClr val="lt1"/>
+    </dgm:fillClrLst>
+    <dgm:linClrLst meth="repeat">
+      <a:schemeClr val="accent1"/>
+    </dgm:linClrLst>
+    <dgm:effectClrLst/>
+    <dgm:txLinClrLst/>
+    <dgm:txFillClrLst meth="repeat">
+      <a:schemeClr val="dk1"/>
+    </dgm:txFillClrLst>
+    <dgm:txEffectClrLst/>
+  </dgm:styleLbl>
+  <dgm:styleLbl name="solidBgAcc1">
+    <dgm:fillClrLst meth="repeat">
+      <a:schemeClr val="lt1"/>
+    </dgm:fillClrLst>
+    <dgm:linClrLst meth="repeat">
+      <a:schemeClr val="accent1"/>
+    </dgm:linClrLst>
+    <dgm:effectClrLst/>
+    <dgm:txLinClrLst/>
+    <dgm:txFillClrLst meth="repeat">
+      <a:schemeClr val="dk1"/>
+    </dgm:txFillClrLst>
+    <dgm:txEffectClrLst/>
+  </dgm:styleLbl>
+  <dgm:styleLbl name="fgAccFollowNode1">
+    <dgm:fillClrLst meth="repeat">
+      <a:schemeClr val="accent1">
+        <a:alpha val="90000"/>
+        <a:tint val="40000"/>
+      </a:schemeClr>
+    </dgm:fillClrLst>
+    <dgm:linClrLst meth="repeat">
+      <a:schemeClr val="accent1">
+        <a:alpha val="90000"/>
+        <a:tint val="40000"/>
+      </a:schemeClr>
+    </dgm:linClrLst>
+    <dgm:effectClrLst/>
+    <dgm:txLinClrLst/>
+    <dgm:txFillClrLst meth="repeat">
+      <a:schemeClr val="dk1"/>
+    </dgm:txFillClrLst>
+    <dgm:txEffectClrLst/>
+  </dgm:styleLbl>
+  <dgm:styleLbl name="alignAccFollowNode1">
+    <dgm:fillClrLst meth="repeat">
+      <a:schemeClr val="accent1">
+        <a:alpha val="90000"/>
+        <a:tint val="40000"/>
+      </a:schemeClr>
+    </dgm:fillClrLst>
+    <dgm:linClrLst meth="repeat">
+      <a:schemeClr val="accent1">
+        <a:alpha val="90000"/>
+        <a:tint val="40000"/>
+      </a:schemeClr>
+    </dgm:linClrLst>
+    <dgm:effectClrLst/>
+    <dgm:txLinClrLst/>
+    <dgm:txFillClrLst meth="repeat">
+      <a:schemeClr val="dk1"/>
+    </dgm:txFillClrLst>
+    <dgm:txEffectClrLst/>
+  </dgm:styleLbl>
+  <dgm:styleLbl name="bgAccFollowNode1">
+    <dgm:fillClrLst meth="repeat">
+      <a:schemeClr val="accent1">
+        <a:alpha val="90000"/>
+        <a:tint val="40000"/>
+      </a:schemeClr>
+    </dgm:fillClrLst>
+    <dgm:linClrLst meth="repeat">
+      <a:schemeClr val="accent1">
+        <a:alpha val="90000"/>
+        <a:tint val="40000"/>
+      </a:schemeClr>
+    </dgm:linClrLst>
+    <dgm:effectClrLst/>
+    <dgm:txLinClrLst/>
+    <dgm:txFillClrLst meth="repeat">
+      <a:schemeClr val="dk1"/>
+    </dgm:txFillClrLst>
+    <dgm:txEffectClrLst/>
+  </dgm:styleLbl>
+  <dgm:styleLbl name="fgAcc0">
+    <dgm:fillClrLst meth="repeat">
+      <a:schemeClr val="lt1">
+        <a:alpha val="90000"/>
+      </a:schemeClr>
+    </dgm:fillClrLst>
+    <dgm:linClrLst meth="repeat">
+      <a:schemeClr val="accent1"/>
+    </dgm:linClrLst>
+    <dgm:effectClrLst/>
+    <dgm:txLinClrLst/>
+    <dgm:txFillClrLst meth="repeat">
+      <a:schemeClr val="dk1"/>
+    </dgm:txFillClrLst>
+    <dgm:txEffectClrLst/>
+  </dgm:styleLbl>
+  <dgm:styleLbl name="fgAcc2">
+    <dgm:fillClrLst meth="repeat">
+      <a:schemeClr val="lt1">
+        <a:alpha val="90000"/>
+      </a:schemeClr>
+    </dgm:fillClrLst>
+    <dgm:linClrLst meth="repeat">
+      <a:schemeClr val="accent1"/>
+    </dgm:linClrLst>
+    <dgm:effectClrLst/>
+    <dgm:txLinClrLst/>
+    <dgm:txFillClrLst meth="repeat">
+      <a:schemeClr val="dk1"/>
+    </dgm:txFillClrLst>
+    <dgm:txEffectClrLst/>
+  </dgm:styleLbl>
+  <dgm:styleLbl name="fgAcc3">
+    <dgm:fillClrLst meth="repeat">
+      <a:schemeClr val="lt1">
+        <a:alpha val="90000"/>
+      </a:schemeClr>
+    </dgm:fillClrLst>
+    <dgm:linClrLst meth="repeat">
+      <a:schemeClr val="accent1"/>
+    </dgm:linClrLst>
+    <dgm:effectClrLst/>
+    <dgm:txLinClrLst/>
+    <dgm:txFillClrLst meth="repeat">
+      <a:schemeClr val="dk1"/>
+    </dgm:txFillClrLst>
+    <dgm:txEffectClrLst/>
+  </dgm:styleLbl>
+  <dgm:styleLbl name="fgAcc4">
+    <dgm:fillClrLst meth="repeat">
+      <a:schemeClr val="lt1">
+        <a:alpha val="90000"/>
+      </a:schemeClr>
+    </dgm:fillClrLst>
+    <dgm:linClrLst meth="repeat">
+      <a:schemeClr val="accent1"/>
+    </dgm:linClrLst>
+    <dgm:effectClrLst/>
+    <dgm:txLinClrLst/>
+    <dgm:txFillClrLst meth="repeat">
+      <a:schemeClr val="dk1"/>
+    </dgm:txFillClrLst>
+    <dgm:txEffectClrLst/>
+  </dgm:styleLbl>
+  <dgm:styleLbl name="bgShp">
+    <dgm:fillClrLst meth="repeat">
+      <a:schemeClr val="accent1">
+        <a:tint val="40000"/>
+      </a:schemeClr>
+    </dgm:fillClrLst>
+    <dgm:linClrLst meth="repeat">
+      <a:schemeClr val="accent1"/>
+    </dgm:linClrLst>
+    <dgm:effectClrLst/>
+    <dgm:txLinClrLst/>
+    <dgm:txFillClrLst meth="repeat">
+      <a:schemeClr val="dk1"/>
+    </dgm:txFillClrLst>
+    <dgm:txEffectClrLst/>
+  </dgm:styleLbl>
+  <dgm:styleLbl name="dkBgShp">
+    <dgm:fillClrLst meth="repeat">
+      <a:schemeClr val="accent1">
+        <a:shade val="80000"/>
+      </a:schemeClr>
+    </dgm:fillClrLst>
+    <dgm:linClrLst meth="repeat">
+      <a:schemeClr val="accent1"/>
+    </dgm:linClrLst>
+    <dgm:effectClrLst/>
+    <dgm:txLinClrLst/>
+    <dgm:txFillClrLst meth="repeat">
+      <a:schemeClr val="lt1"/>
+    </dgm:txFillClrLst>
+    <dgm:txEffectClrLst/>
+  </dgm:styleLbl>
+  <dgm:styleLbl name="trBgShp">
+    <dgm:fillClrLst meth="repeat">
+      <a:schemeClr val="accent1">
+        <a:tint val="50000"/>
+        <a:alpha val="40000"/>
+      </a:schemeClr>
+    </dgm:fillClrLst>
+    <dgm:linClrLst meth="repeat">
+      <a:schemeClr val="accent1"/>
+    </dgm:linClrLst>
+    <dgm:effectClrLst/>
+    <dgm:txLinClrLst/>
+    <dgm:txFillClrLst meth="repeat">
+      <a:schemeClr val="lt1"/>
+    </dgm:txFillClrLst>
+    <dgm:txEffectClrLst/>
+  </dgm:styleLbl>
+  <dgm:styleLbl name="fgShp">
+    <dgm:fillClrLst meth="repeat">
+      <a:schemeClr val="accent1">
+        <a:tint val="60000"/>
+      </a:schemeClr>
+    </dgm:fillClrLst>
+    <dgm:linClrLst meth="repeat">
+      <a:schemeClr val="lt1"/>
+    </dgm:linClrLst>
+    <dgm:effectClrLst/>
+    <dgm:txLinClrLst/>
+    <dgm:txFillClrLst meth="repeat">
+      <a:schemeClr val="dk1"/>
+    </dgm:txFillClrLst>
+    <dgm:txEffectClrLst/>
+  </dgm:styleLbl>
+  <dgm:styleLbl name="revTx">
+    <dgm:fillClrLst meth="repeat">
+      <a:schemeClr val="lt1">
+        <a:alpha val="0"/>
+      </a:schemeClr>
+    </dgm:fillClrLst>
+    <dgm:linClrLst meth="repeat">
+      <a:schemeClr val="dk1">
+        <a:alpha val="0"/>
+      </a:schemeClr>
+    </dgm:linClrLst>
+    <dgm:effectClrLst/>
+    <dgm:txLinClrLst/>
+    <dgm:txFillClrLst meth="repeat">
+      <a:schemeClr val="tx1"/>
+    </dgm:txFillClrLst>
+    <dgm:txEffectClrLst/>
+  </dgm:styleLbl>
+</dgm:colorsDef>
+</file>
+
+<file path=ppt/diagrams/data1.xml><?xml version="1.0" encoding="utf-8"?>
+<dgm:dataModel xmlns:dgm="http://schemas.openxmlformats.org/drawingml/2006/diagram" xmlns:a="http://schemas.openxmlformats.org/drawingml/2006/main">
+  <dgm:ptLst>
+    <dgm:pt modelId="{7D36141B-B2FF-4EC7-A2BB-38B788916CCF}" type="doc">
+      <dgm:prSet loTypeId="urn:microsoft.com/office/officeart/2005/8/layout/pictureOrgChart+Icon" loCatId="hierarchy" qsTypeId="urn:microsoft.com/office/officeart/2005/8/quickstyle/simple1" qsCatId="simple" csTypeId="urn:microsoft.com/office/officeart/2005/8/colors/accent1_2" csCatId="accent1" phldr="1"/>
+      <dgm:spPr/>
+      <dgm:t>
+        <a:bodyPr/>
+        <a:lstStyle/>
+        <a:p>
+          <a:endParaRPr lang="en-US"/>
+        </a:p>
+      </dgm:t>
+    </dgm:pt>
+    <dgm:pt modelId="{F923B04F-AB23-42C2-A1E8-502EFB92AAAC}">
+      <dgm:prSet phldrT="[Text]"/>
+      <dgm:spPr/>
+      <dgm:t>
+        <a:bodyPr/>
+        <a:lstStyle/>
+        <a:p>
+          <a:r>
+            <a:rPr lang="en-US" dirty="0"/>
+            <a:t>Juliet Goldstein</a:t>
+          </a:r>
+        </a:p>
+      </dgm:t>
+    </dgm:pt>
+    <dgm:pt modelId="{224C2A43-F731-4AEE-BC58-0273D5730F10}" type="parTrans" cxnId="{3CEE64CA-B734-4A75-B027-CAB15E58DD1A}">
+      <dgm:prSet/>
+      <dgm:spPr/>
+      <dgm:t>
+        <a:bodyPr/>
+        <a:lstStyle/>
+        <a:p>
+          <a:endParaRPr lang="en-US"/>
+        </a:p>
+      </dgm:t>
+    </dgm:pt>
+    <dgm:pt modelId="{F2136BC5-A46B-4158-87CD-D64512A1D411}" type="sibTrans" cxnId="{3CEE64CA-B734-4A75-B027-CAB15E58DD1A}">
+      <dgm:prSet/>
+      <dgm:spPr/>
+      <dgm:t>
+        <a:bodyPr/>
+        <a:lstStyle/>
+        <a:p>
+          <a:endParaRPr lang="en-US"/>
+        </a:p>
+      </dgm:t>
+    </dgm:pt>
+    <dgm:pt modelId="{46611710-FB10-4F3A-92B5-24361F8C7A1F}">
+      <dgm:prSet phldrT="[Text]"/>
+      <dgm:spPr/>
+      <dgm:t>
+        <a:bodyPr/>
+        <a:lstStyle/>
+        <a:p>
+          <a:r>
+            <a:rPr lang="en-US" dirty="0"/>
+            <a:t>Krystal Duran</a:t>
+          </a:r>
+        </a:p>
+      </dgm:t>
+    </dgm:pt>
+    <dgm:pt modelId="{01F66AB6-22B7-4862-8B8B-D2BA16285510}" type="parTrans" cxnId="{331B3893-46DA-4E72-9A4F-3863EEF22CEA}">
+      <dgm:prSet/>
+      <dgm:spPr/>
+      <dgm:t>
+        <a:bodyPr/>
+        <a:lstStyle/>
+        <a:p>
+          <a:endParaRPr lang="en-US"/>
+        </a:p>
+      </dgm:t>
+    </dgm:pt>
+    <dgm:pt modelId="{A01BD352-7F86-4D1F-AC76-25B4B1AB5031}" type="sibTrans" cxnId="{331B3893-46DA-4E72-9A4F-3863EEF22CEA}">
+      <dgm:prSet/>
+      <dgm:spPr/>
+      <dgm:t>
+        <a:bodyPr/>
+        <a:lstStyle/>
+        <a:p>
+          <a:endParaRPr lang="en-US"/>
+        </a:p>
+      </dgm:t>
+    </dgm:pt>
+    <dgm:pt modelId="{7995BA59-0620-458D-8341-B74B0B60FDB6}">
+      <dgm:prSet phldrT="[Text]"/>
+      <dgm:spPr/>
+      <dgm:t>
+        <a:bodyPr/>
+        <a:lstStyle/>
+        <a:p>
+          <a:r>
+            <a:rPr lang="en-US" dirty="0" err="1"/>
+            <a:t>Vandolph</a:t>
+          </a:r>
+          <a:r>
+            <a:rPr lang="en-US" dirty="0"/>
+            <a:t> Baptiste</a:t>
+          </a:r>
+        </a:p>
+      </dgm:t>
+    </dgm:pt>
+    <dgm:pt modelId="{CC66CC04-97A7-4F05-9F0C-2056AEF74EB9}" type="parTrans" cxnId="{7161D12F-5E30-4BAA-82D5-61C33F5EF2FD}">
+      <dgm:prSet/>
+      <dgm:spPr/>
+      <dgm:t>
+        <a:bodyPr/>
+        <a:lstStyle/>
+        <a:p>
+          <a:endParaRPr lang="en-US"/>
+        </a:p>
+      </dgm:t>
+    </dgm:pt>
+    <dgm:pt modelId="{1D19F415-ADAA-4960-99D8-0C459E14B06D}" type="sibTrans" cxnId="{7161D12F-5E30-4BAA-82D5-61C33F5EF2FD}">
+      <dgm:prSet/>
+      <dgm:spPr/>
+      <dgm:t>
+        <a:bodyPr/>
+        <a:lstStyle/>
+        <a:p>
+          <a:endParaRPr lang="en-US"/>
+        </a:p>
+      </dgm:t>
+    </dgm:pt>
+    <dgm:pt modelId="{52E31BE8-C2BF-425E-8FCC-F927C93CA244}" type="pres">
+      <dgm:prSet presAssocID="{7D36141B-B2FF-4EC7-A2BB-38B788916CCF}" presName="hierChild1" presStyleCnt="0">
+        <dgm:presLayoutVars>
+          <dgm:orgChart val="1"/>
+          <dgm:chPref val="1"/>
+          <dgm:dir/>
+          <dgm:animOne val="branch"/>
+          <dgm:animLvl val="lvl"/>
+          <dgm:resizeHandles/>
+        </dgm:presLayoutVars>
+      </dgm:prSet>
+      <dgm:spPr/>
+    </dgm:pt>
+    <dgm:pt modelId="{1F02F053-62F0-4D88-8006-8F858AC25F9B}" type="pres">
+      <dgm:prSet presAssocID="{F923B04F-AB23-42C2-A1E8-502EFB92AAAC}" presName="hierRoot1" presStyleCnt="0">
+        <dgm:presLayoutVars>
+          <dgm:hierBranch val="init"/>
+        </dgm:presLayoutVars>
+      </dgm:prSet>
+      <dgm:spPr/>
+    </dgm:pt>
+    <dgm:pt modelId="{8BB557DB-7C6B-45AB-B7E9-E363444FE2E7}" type="pres">
+      <dgm:prSet presAssocID="{F923B04F-AB23-42C2-A1E8-502EFB92AAAC}" presName="rootComposite1" presStyleCnt="0"/>
+      <dgm:spPr/>
+    </dgm:pt>
+    <dgm:pt modelId="{E0594D09-4D4F-4570-BE2C-F041B72201CC}" type="pres">
+      <dgm:prSet presAssocID="{F923B04F-AB23-42C2-A1E8-502EFB92AAAC}" presName="rootText1" presStyleLbl="node0" presStyleIdx="0" presStyleCnt="3">
+        <dgm:presLayoutVars>
+          <dgm:chPref val="3"/>
+        </dgm:presLayoutVars>
+      </dgm:prSet>
+      <dgm:spPr/>
+    </dgm:pt>
+    <dgm:pt modelId="{044BC9F8-0011-41C8-A237-78F9C99EA3D9}" type="pres">
+      <dgm:prSet presAssocID="{F923B04F-AB23-42C2-A1E8-502EFB92AAAC}" presName="rootPict1" presStyleLbl="alignImgPlace1" presStyleIdx="0" presStyleCnt="3"/>
+      <dgm:spPr>
+        <a:blipFill>
+          <a:blip xmlns:r="http://schemas.openxmlformats.org/officeDocument/2006/relationships" r:embed="rId1">
+            <a:extLst>
+              <a:ext uri="{28A0092B-C50C-407E-A947-70E740481C1C}">
+                <a14:useLocalDpi xmlns:a14="http://schemas.microsoft.com/office/drawing/2010/main" val="0"/>
+              </a:ext>
+            </a:extLst>
+          </a:blip>
+          <a:srcRect/>
+          <a:stretch>
+            <a:fillRect l="-17000" r="-17000"/>
+          </a:stretch>
+        </a:blipFill>
+      </dgm:spPr>
+    </dgm:pt>
+    <dgm:pt modelId="{32091961-DF16-46BF-B3D1-75D2410A65C6}" type="pres">
+      <dgm:prSet presAssocID="{F923B04F-AB23-42C2-A1E8-502EFB92AAAC}" presName="rootConnector1" presStyleLbl="node1" presStyleIdx="0" presStyleCnt="0"/>
+      <dgm:spPr/>
+    </dgm:pt>
+    <dgm:pt modelId="{8468A43B-ABDF-42E6-B060-A0E7463B1F1E}" type="pres">
+      <dgm:prSet presAssocID="{F923B04F-AB23-42C2-A1E8-502EFB92AAAC}" presName="hierChild2" presStyleCnt="0"/>
+      <dgm:spPr/>
+    </dgm:pt>
+    <dgm:pt modelId="{4BFFF4E1-1162-4B43-83A9-F0E1AB02C272}" type="pres">
+      <dgm:prSet presAssocID="{F923B04F-AB23-42C2-A1E8-502EFB92AAAC}" presName="hierChild3" presStyleCnt="0"/>
+      <dgm:spPr/>
+    </dgm:pt>
+    <dgm:pt modelId="{D72F7A0D-7081-4573-B22B-F590DBC14E3D}" type="pres">
+      <dgm:prSet presAssocID="{46611710-FB10-4F3A-92B5-24361F8C7A1F}" presName="hierRoot1" presStyleCnt="0">
+        <dgm:presLayoutVars>
+          <dgm:hierBranch val="init"/>
+        </dgm:presLayoutVars>
+      </dgm:prSet>
+      <dgm:spPr/>
+    </dgm:pt>
+    <dgm:pt modelId="{E11472A2-85B6-4984-85CF-584D653297E8}" type="pres">
+      <dgm:prSet presAssocID="{46611710-FB10-4F3A-92B5-24361F8C7A1F}" presName="rootComposite1" presStyleCnt="0"/>
+      <dgm:spPr/>
+    </dgm:pt>
+    <dgm:pt modelId="{7C71F848-9FDE-47A2-8E0A-55360689688C}" type="pres">
+      <dgm:prSet presAssocID="{46611710-FB10-4F3A-92B5-24361F8C7A1F}" presName="rootText1" presStyleLbl="node0" presStyleIdx="1" presStyleCnt="3">
+        <dgm:presLayoutVars>
+          <dgm:chPref val="3"/>
+        </dgm:presLayoutVars>
+      </dgm:prSet>
+      <dgm:spPr/>
+    </dgm:pt>
+    <dgm:pt modelId="{181D4C06-E320-4673-8269-9713F8CDB245}" type="pres">
+      <dgm:prSet presAssocID="{46611710-FB10-4F3A-92B5-24361F8C7A1F}" presName="rootPict1" presStyleLbl="alignImgPlace1" presStyleIdx="1" presStyleCnt="3"/>
+      <dgm:spPr>
+        <a:blipFill>
+          <a:blip xmlns:r="http://schemas.openxmlformats.org/officeDocument/2006/relationships" r:embed="rId2">
+            <a:extLst>
+              <a:ext uri="{28A0092B-C50C-407E-A947-70E740481C1C}">
+                <a14:useLocalDpi xmlns:a14="http://schemas.microsoft.com/office/drawing/2010/main" val="0"/>
+              </a:ext>
+            </a:extLst>
+          </a:blip>
+          <a:srcRect/>
+          <a:stretch>
+            <a:fillRect l="-17000" r="-17000"/>
+          </a:stretch>
+        </a:blipFill>
+      </dgm:spPr>
+    </dgm:pt>
+    <dgm:pt modelId="{FFC55F69-EBEA-4F7C-9F2A-3CE17792B02D}" type="pres">
+      <dgm:prSet presAssocID="{46611710-FB10-4F3A-92B5-24361F8C7A1F}" presName="rootConnector1" presStyleLbl="node1" presStyleIdx="0" presStyleCnt="0"/>
+      <dgm:spPr/>
+    </dgm:pt>
+    <dgm:pt modelId="{F114E60A-2B99-4221-AD3F-BFF732EA09FA}" type="pres">
+      <dgm:prSet presAssocID="{46611710-FB10-4F3A-92B5-24361F8C7A1F}" presName="hierChild2" presStyleCnt="0"/>
+      <dgm:spPr/>
+    </dgm:pt>
+    <dgm:pt modelId="{324B476B-E33F-4E32-9F33-62B0F341EB24}" type="pres">
+      <dgm:prSet presAssocID="{46611710-FB10-4F3A-92B5-24361F8C7A1F}" presName="hierChild3" presStyleCnt="0"/>
+      <dgm:spPr/>
+    </dgm:pt>
+    <dgm:pt modelId="{5938DABA-F2AA-423F-9424-EE3927ACD14E}" type="pres">
+      <dgm:prSet presAssocID="{7995BA59-0620-458D-8341-B74B0B60FDB6}" presName="hierRoot1" presStyleCnt="0">
+        <dgm:presLayoutVars>
+          <dgm:hierBranch val="init"/>
+        </dgm:presLayoutVars>
+      </dgm:prSet>
+      <dgm:spPr/>
+    </dgm:pt>
+    <dgm:pt modelId="{0EE43F2A-8531-4736-8B03-31234EF383EB}" type="pres">
+      <dgm:prSet presAssocID="{7995BA59-0620-458D-8341-B74B0B60FDB6}" presName="rootComposite1" presStyleCnt="0"/>
+      <dgm:spPr/>
+    </dgm:pt>
+    <dgm:pt modelId="{615E95FF-6C65-4336-B376-4D1F20F16F89}" type="pres">
+      <dgm:prSet presAssocID="{7995BA59-0620-458D-8341-B74B0B60FDB6}" presName="rootText1" presStyleLbl="node0" presStyleIdx="2" presStyleCnt="3">
+        <dgm:presLayoutVars>
+          <dgm:chPref val="3"/>
+        </dgm:presLayoutVars>
+      </dgm:prSet>
+      <dgm:spPr/>
+    </dgm:pt>
+    <dgm:pt modelId="{F3CDEF7A-8180-475D-A2D7-083410DF7ABA}" type="pres">
+      <dgm:prSet presAssocID="{7995BA59-0620-458D-8341-B74B0B60FDB6}" presName="rootPict1" presStyleLbl="alignImgPlace1" presStyleIdx="2" presStyleCnt="3"/>
+      <dgm:spPr>
+        <a:blipFill>
+          <a:blip xmlns:r="http://schemas.openxmlformats.org/officeDocument/2006/relationships" r:embed="rId3">
+            <a:extLst>
+              <a:ext uri="{28A0092B-C50C-407E-A947-70E740481C1C}">
+                <a14:useLocalDpi xmlns:a14="http://schemas.microsoft.com/office/drawing/2010/main" val="0"/>
+              </a:ext>
+            </a:extLst>
+          </a:blip>
+          <a:srcRect/>
+          <a:stretch>
+            <a:fillRect l="-17000" r="-17000"/>
+          </a:stretch>
+        </a:blipFill>
+      </dgm:spPr>
+    </dgm:pt>
+    <dgm:pt modelId="{06A63A05-3ADE-4DB2-A77B-9773D44B3607}" type="pres">
+      <dgm:prSet presAssocID="{7995BA59-0620-458D-8341-B74B0B60FDB6}" presName="rootConnector1" presStyleLbl="node1" presStyleIdx="0" presStyleCnt="0"/>
+      <dgm:spPr/>
+    </dgm:pt>
+    <dgm:pt modelId="{858386BF-FD81-49A6-8D16-6678FEF67C13}" type="pres">
+      <dgm:prSet presAssocID="{7995BA59-0620-458D-8341-B74B0B60FDB6}" presName="hierChild2" presStyleCnt="0"/>
+      <dgm:spPr/>
+    </dgm:pt>
+    <dgm:pt modelId="{DE6DD278-7158-44A0-AF68-6314456D0434}" type="pres">
+      <dgm:prSet presAssocID="{7995BA59-0620-458D-8341-B74B0B60FDB6}" presName="hierChild3" presStyleCnt="0"/>
+      <dgm:spPr/>
+    </dgm:pt>
+  </dgm:ptLst>
+  <dgm:cxnLst>
+    <dgm:cxn modelId="{484DB01B-859D-4C15-AB40-F0851FD2043D}" type="presOf" srcId="{46611710-FB10-4F3A-92B5-24361F8C7A1F}" destId="{FFC55F69-EBEA-4F7C-9F2A-3CE17792B02D}" srcOrd="1" destOrd="0" presId="urn:microsoft.com/office/officeart/2005/8/layout/pictureOrgChart+Icon"/>
+    <dgm:cxn modelId="{7237A41D-A306-438D-ABBB-731DDDC6EC8B}" type="presOf" srcId="{F923B04F-AB23-42C2-A1E8-502EFB92AAAC}" destId="{E0594D09-4D4F-4570-BE2C-F041B72201CC}" srcOrd="0" destOrd="0" presId="urn:microsoft.com/office/officeart/2005/8/layout/pictureOrgChart+Icon"/>
+    <dgm:cxn modelId="{7161D12F-5E30-4BAA-82D5-61C33F5EF2FD}" srcId="{7D36141B-B2FF-4EC7-A2BB-38B788916CCF}" destId="{7995BA59-0620-458D-8341-B74B0B60FDB6}" srcOrd="2" destOrd="0" parTransId="{CC66CC04-97A7-4F05-9F0C-2056AEF74EB9}" sibTransId="{1D19F415-ADAA-4960-99D8-0C459E14B06D}"/>
+    <dgm:cxn modelId="{47DD9C32-4F0F-4EF3-AB37-4111A4994F13}" type="presOf" srcId="{46611710-FB10-4F3A-92B5-24361F8C7A1F}" destId="{7C71F848-9FDE-47A2-8E0A-55360689688C}" srcOrd="0" destOrd="0" presId="urn:microsoft.com/office/officeart/2005/8/layout/pictureOrgChart+Icon"/>
+    <dgm:cxn modelId="{1F5ED555-E296-4877-BB51-C0892198407A}" type="presOf" srcId="{F923B04F-AB23-42C2-A1E8-502EFB92AAAC}" destId="{32091961-DF16-46BF-B3D1-75D2410A65C6}" srcOrd="1" destOrd="0" presId="urn:microsoft.com/office/officeart/2005/8/layout/pictureOrgChart+Icon"/>
+    <dgm:cxn modelId="{2AFD2A8C-C7A4-4E2E-825A-5C21AE68A1D5}" type="presOf" srcId="{7995BA59-0620-458D-8341-B74B0B60FDB6}" destId="{06A63A05-3ADE-4DB2-A77B-9773D44B3607}" srcOrd="1" destOrd="0" presId="urn:microsoft.com/office/officeart/2005/8/layout/pictureOrgChart+Icon"/>
+    <dgm:cxn modelId="{331B3893-46DA-4E72-9A4F-3863EEF22CEA}" srcId="{7D36141B-B2FF-4EC7-A2BB-38B788916CCF}" destId="{46611710-FB10-4F3A-92B5-24361F8C7A1F}" srcOrd="1" destOrd="0" parTransId="{01F66AB6-22B7-4862-8B8B-D2BA16285510}" sibTransId="{A01BD352-7F86-4D1F-AC76-25B4B1AB5031}"/>
+    <dgm:cxn modelId="{095BDA9F-5C79-402A-BDF7-009226BB10E2}" type="presOf" srcId="{7995BA59-0620-458D-8341-B74B0B60FDB6}" destId="{615E95FF-6C65-4336-B376-4D1F20F16F89}" srcOrd="0" destOrd="0" presId="urn:microsoft.com/office/officeart/2005/8/layout/pictureOrgChart+Icon"/>
+    <dgm:cxn modelId="{3CEE64CA-B734-4A75-B027-CAB15E58DD1A}" srcId="{7D36141B-B2FF-4EC7-A2BB-38B788916CCF}" destId="{F923B04F-AB23-42C2-A1E8-502EFB92AAAC}" srcOrd="0" destOrd="0" parTransId="{224C2A43-F731-4AEE-BC58-0273D5730F10}" sibTransId="{F2136BC5-A46B-4158-87CD-D64512A1D411}"/>
+    <dgm:cxn modelId="{E5A57CED-EEB4-49AE-BA26-D43A8E6FA9C6}" type="presOf" srcId="{7D36141B-B2FF-4EC7-A2BB-38B788916CCF}" destId="{52E31BE8-C2BF-425E-8FCC-F927C93CA244}" srcOrd="0" destOrd="0" presId="urn:microsoft.com/office/officeart/2005/8/layout/pictureOrgChart+Icon"/>
+    <dgm:cxn modelId="{770C5A04-0BD2-4C0B-B826-A211CB52CD5E}" type="presParOf" srcId="{52E31BE8-C2BF-425E-8FCC-F927C93CA244}" destId="{1F02F053-62F0-4D88-8006-8F858AC25F9B}" srcOrd="0" destOrd="0" presId="urn:microsoft.com/office/officeart/2005/8/layout/pictureOrgChart+Icon"/>
+    <dgm:cxn modelId="{B768DB74-56D9-4FD9-B497-E07587B16B10}" type="presParOf" srcId="{1F02F053-62F0-4D88-8006-8F858AC25F9B}" destId="{8BB557DB-7C6B-45AB-B7E9-E363444FE2E7}" srcOrd="0" destOrd="0" presId="urn:microsoft.com/office/officeart/2005/8/layout/pictureOrgChart+Icon"/>
+    <dgm:cxn modelId="{B6E2B08E-557F-42EC-983D-AB8F4A97C4BF}" type="presParOf" srcId="{8BB557DB-7C6B-45AB-B7E9-E363444FE2E7}" destId="{E0594D09-4D4F-4570-BE2C-F041B72201CC}" srcOrd="0" destOrd="0" presId="urn:microsoft.com/office/officeart/2005/8/layout/pictureOrgChart+Icon"/>
+    <dgm:cxn modelId="{4E35D3A0-C914-4A71-A130-EE7ABB308D88}" type="presParOf" srcId="{8BB557DB-7C6B-45AB-B7E9-E363444FE2E7}" destId="{044BC9F8-0011-41C8-A237-78F9C99EA3D9}" srcOrd="1" destOrd="0" presId="urn:microsoft.com/office/officeart/2005/8/layout/pictureOrgChart+Icon"/>
+    <dgm:cxn modelId="{7BC4DAEE-70F4-4EBC-A6F9-D078CD28037F}" type="presParOf" srcId="{8BB557DB-7C6B-45AB-B7E9-E363444FE2E7}" destId="{32091961-DF16-46BF-B3D1-75D2410A65C6}" srcOrd="2" destOrd="0" presId="urn:microsoft.com/office/officeart/2005/8/layout/pictureOrgChart+Icon"/>
+    <dgm:cxn modelId="{AF794D9A-19F9-4C9D-9EFE-7B6E27271535}" type="presParOf" srcId="{1F02F053-62F0-4D88-8006-8F858AC25F9B}" destId="{8468A43B-ABDF-42E6-B060-A0E7463B1F1E}" srcOrd="1" destOrd="0" presId="urn:microsoft.com/office/officeart/2005/8/layout/pictureOrgChart+Icon"/>
+    <dgm:cxn modelId="{EBF9ABF5-FB04-4DDF-9A71-66E921275B50}" type="presParOf" srcId="{1F02F053-62F0-4D88-8006-8F858AC25F9B}" destId="{4BFFF4E1-1162-4B43-83A9-F0E1AB02C272}" srcOrd="2" destOrd="0" presId="urn:microsoft.com/office/officeart/2005/8/layout/pictureOrgChart+Icon"/>
+    <dgm:cxn modelId="{04CE4E12-42A5-4D40-AB0B-5AC18B96FA2E}" type="presParOf" srcId="{52E31BE8-C2BF-425E-8FCC-F927C93CA244}" destId="{D72F7A0D-7081-4573-B22B-F590DBC14E3D}" srcOrd="1" destOrd="0" presId="urn:microsoft.com/office/officeart/2005/8/layout/pictureOrgChart+Icon"/>
+    <dgm:cxn modelId="{0BC3DCD3-0CF0-48DF-8CD5-EDA92946738D}" type="presParOf" srcId="{D72F7A0D-7081-4573-B22B-F590DBC14E3D}" destId="{E11472A2-85B6-4984-85CF-584D653297E8}" srcOrd="0" destOrd="0" presId="urn:microsoft.com/office/officeart/2005/8/layout/pictureOrgChart+Icon"/>
+    <dgm:cxn modelId="{9B3AEF18-4A89-4B0D-BA93-A89B44453030}" type="presParOf" srcId="{E11472A2-85B6-4984-85CF-584D653297E8}" destId="{7C71F848-9FDE-47A2-8E0A-55360689688C}" srcOrd="0" destOrd="0" presId="urn:microsoft.com/office/officeart/2005/8/layout/pictureOrgChart+Icon"/>
+    <dgm:cxn modelId="{085F80A7-34A9-4948-8812-886D5955302B}" type="presParOf" srcId="{E11472A2-85B6-4984-85CF-584D653297E8}" destId="{181D4C06-E320-4673-8269-9713F8CDB245}" srcOrd="1" destOrd="0" presId="urn:microsoft.com/office/officeart/2005/8/layout/pictureOrgChart+Icon"/>
+    <dgm:cxn modelId="{91D2532B-9DDD-4278-98E1-A21F83F75753}" type="presParOf" srcId="{E11472A2-85B6-4984-85CF-584D653297E8}" destId="{FFC55F69-EBEA-4F7C-9F2A-3CE17792B02D}" srcOrd="2" destOrd="0" presId="urn:microsoft.com/office/officeart/2005/8/layout/pictureOrgChart+Icon"/>
+    <dgm:cxn modelId="{B2BF9AD0-E8F8-4B72-B31E-4941C6675802}" type="presParOf" srcId="{D72F7A0D-7081-4573-B22B-F590DBC14E3D}" destId="{F114E60A-2B99-4221-AD3F-BFF732EA09FA}" srcOrd="1" destOrd="0" presId="urn:microsoft.com/office/officeart/2005/8/layout/pictureOrgChart+Icon"/>
+    <dgm:cxn modelId="{EA6AFB33-AA06-472F-9423-C9AE7E6A812E}" type="presParOf" srcId="{D72F7A0D-7081-4573-B22B-F590DBC14E3D}" destId="{324B476B-E33F-4E32-9F33-62B0F341EB24}" srcOrd="2" destOrd="0" presId="urn:microsoft.com/office/officeart/2005/8/layout/pictureOrgChart+Icon"/>
+    <dgm:cxn modelId="{7308774F-8A7D-4D92-9656-5F17A3C0FF8C}" type="presParOf" srcId="{52E31BE8-C2BF-425E-8FCC-F927C93CA244}" destId="{5938DABA-F2AA-423F-9424-EE3927ACD14E}" srcOrd="2" destOrd="0" presId="urn:microsoft.com/office/officeart/2005/8/layout/pictureOrgChart+Icon"/>
+    <dgm:cxn modelId="{75854CB7-47C5-4964-B0B4-6C3F30900E36}" type="presParOf" srcId="{5938DABA-F2AA-423F-9424-EE3927ACD14E}" destId="{0EE43F2A-8531-4736-8B03-31234EF383EB}" srcOrd="0" destOrd="0" presId="urn:microsoft.com/office/officeart/2005/8/layout/pictureOrgChart+Icon"/>
+    <dgm:cxn modelId="{345535CD-FDE1-4B40-8042-63BCE478292B}" type="presParOf" srcId="{0EE43F2A-8531-4736-8B03-31234EF383EB}" destId="{615E95FF-6C65-4336-B376-4D1F20F16F89}" srcOrd="0" destOrd="0" presId="urn:microsoft.com/office/officeart/2005/8/layout/pictureOrgChart+Icon"/>
+    <dgm:cxn modelId="{366AEEAE-4437-4FE5-BEC3-96876F738B84}" type="presParOf" srcId="{0EE43F2A-8531-4736-8B03-31234EF383EB}" destId="{F3CDEF7A-8180-475D-A2D7-083410DF7ABA}" srcOrd="1" destOrd="0" presId="urn:microsoft.com/office/officeart/2005/8/layout/pictureOrgChart+Icon"/>
+    <dgm:cxn modelId="{D970987A-39E1-43B5-87D8-24D30683335A}" type="presParOf" srcId="{0EE43F2A-8531-4736-8B03-31234EF383EB}" destId="{06A63A05-3ADE-4DB2-A77B-9773D44B3607}" srcOrd="2" destOrd="0" presId="urn:microsoft.com/office/officeart/2005/8/layout/pictureOrgChart+Icon"/>
+    <dgm:cxn modelId="{D800C7B6-F1AB-4DA2-AE86-51783B5B16C0}" type="presParOf" srcId="{5938DABA-F2AA-423F-9424-EE3927ACD14E}" destId="{858386BF-FD81-49A6-8D16-6678FEF67C13}" srcOrd="1" destOrd="0" presId="urn:microsoft.com/office/officeart/2005/8/layout/pictureOrgChart+Icon"/>
+    <dgm:cxn modelId="{0D06EF0A-738A-4D46-9718-B274BDE4DC3C}" type="presParOf" srcId="{5938DABA-F2AA-423F-9424-EE3927ACD14E}" destId="{DE6DD278-7158-44A0-AF68-6314456D0434}" srcOrd="2" destOrd="0" presId="urn:microsoft.com/office/officeart/2005/8/layout/pictureOrgChart+Icon"/>
+  </dgm:cxnLst>
+  <dgm:bg/>
+  <dgm:whole/>
+  <dgm:extLst>
+    <a:ext uri="http://schemas.microsoft.com/office/drawing/2008/diagram">
+      <dsp:dataModelExt xmlns:dsp="http://schemas.microsoft.com/office/drawing/2008/diagram" relId="rId6" minVer="http://schemas.openxmlformats.org/drawingml/2006/diagram"/>
+    </a:ext>
+  </dgm:extLst>
+</dgm:dataModel>
+</file>
+
+<file path=ppt/diagrams/drawing1.xml><?xml version="1.0" encoding="utf-8"?>
+<dsp:drawing xmlns:dgm="http://schemas.openxmlformats.org/drawingml/2006/diagram" xmlns:dsp="http://schemas.microsoft.com/office/drawing/2008/diagram" xmlns:a="http://schemas.openxmlformats.org/drawingml/2006/main">
+  <dsp:spTree>
+    <dsp:nvGrpSpPr>
+      <dsp:cNvPr id="0" name=""/>
+      <dsp:cNvGrpSpPr/>
+    </dsp:nvGrpSpPr>
+    <dsp:grpSpPr/>
+    <dsp:sp modelId="{E0594D09-4D4F-4570-BE2C-F041B72201CC}">
+      <dsp:nvSpPr>
+        <dsp:cNvPr id="0" name=""/>
+        <dsp:cNvSpPr/>
+      </dsp:nvSpPr>
+      <dsp:spPr>
+        <a:xfrm>
+          <a:off x="675" y="1276198"/>
+          <a:ext cx="2940657" cy="1470328"/>
+        </a:xfrm>
+        <a:prstGeom prst="rect">
+          <a:avLst/>
+        </a:prstGeom>
+        <a:solidFill>
+          <a:schemeClr val="accent1">
+            <a:hueOff val="0"/>
+            <a:satOff val="0"/>
+            <a:lumOff val="0"/>
+            <a:alphaOff val="0"/>
+          </a:schemeClr>
+        </a:solidFill>
+        <a:ln w="15875" cap="flat" cmpd="sng" algn="ctr">
+          <a:solidFill>
+            <a:schemeClr val="lt1">
+              <a:hueOff val="0"/>
+              <a:satOff val="0"/>
+              <a:lumOff val="0"/>
+              <a:alphaOff val="0"/>
+            </a:schemeClr>
+          </a:solidFill>
+          <a:prstDash val="solid"/>
+        </a:ln>
+        <a:effectLst/>
+      </dsp:spPr>
+      <dsp:style>
+        <a:lnRef idx="2">
+          <a:scrgbClr r="0" g="0" b="0"/>
+        </a:lnRef>
+        <a:fillRef idx="1">
+          <a:scrgbClr r="0" g="0" b="0"/>
+        </a:fillRef>
+        <a:effectRef idx="0">
+          <a:scrgbClr r="0" g="0" b="0"/>
+        </a:effectRef>
+        <a:fontRef idx="minor">
+          <a:schemeClr val="lt1"/>
+        </a:fontRef>
+      </dsp:style>
+      <dsp:txBody>
+        <a:bodyPr spcFirstLastPara="0" vert="horz" wrap="square" lIns="1089269" tIns="23495" rIns="23495" bIns="23495" numCol="1" spcCol="1270" anchor="ctr" anchorCtr="0">
+          <a:noAutofit/>
+        </a:bodyPr>
+        <a:lstStyle/>
+        <a:p>
+          <a:pPr marL="0" lvl="0" indent="0" algn="ctr" defTabSz="1644650">
+            <a:lnSpc>
+              <a:spcPct val="90000"/>
+            </a:lnSpc>
+            <a:spcBef>
+              <a:spcPct val="0"/>
+            </a:spcBef>
+            <a:spcAft>
+              <a:spcPct val="35000"/>
+            </a:spcAft>
+            <a:buNone/>
+          </a:pPr>
+          <a:r>
+            <a:rPr lang="en-US" sz="3700" kern="1200" dirty="0"/>
+            <a:t>Juliet Goldstein</a:t>
+          </a:r>
+        </a:p>
+      </dsp:txBody>
+      <dsp:txXfrm>
+        <a:off x="675" y="1276198"/>
+        <a:ext cx="2940657" cy="1470328"/>
+      </dsp:txXfrm>
+    </dsp:sp>
+    <dsp:sp modelId="{044BC9F8-0011-41C8-A237-78F9C99EA3D9}">
+      <dsp:nvSpPr>
+        <dsp:cNvPr id="0" name=""/>
+        <dsp:cNvSpPr/>
+      </dsp:nvSpPr>
+      <dsp:spPr>
+        <a:xfrm>
+          <a:off x="147708" y="1423230"/>
+          <a:ext cx="882197" cy="1176263"/>
+        </a:xfrm>
+        <a:prstGeom prst="rect">
+          <a:avLst/>
+        </a:prstGeom>
+        <a:blipFill>
+          <a:blip xmlns:r="http://schemas.openxmlformats.org/officeDocument/2006/relationships" r:embed="rId1">
+            <a:extLst>
+              <a:ext uri="{28A0092B-C50C-407E-A947-70E740481C1C}">
+                <a14:useLocalDpi xmlns:a14="http://schemas.microsoft.com/office/drawing/2010/main" val="0"/>
+              </a:ext>
+            </a:extLst>
+          </a:blip>
+          <a:srcRect/>
+          <a:stretch>
+            <a:fillRect l="-17000" r="-17000"/>
+          </a:stretch>
+        </a:blipFill>
+        <a:ln w="15875" cap="flat" cmpd="sng" algn="ctr">
+          <a:solidFill>
+            <a:schemeClr val="lt1">
+              <a:hueOff val="0"/>
+              <a:satOff val="0"/>
+              <a:lumOff val="0"/>
+              <a:alphaOff val="0"/>
+            </a:schemeClr>
+          </a:solidFill>
+          <a:prstDash val="solid"/>
+        </a:ln>
+        <a:effectLst/>
+      </dsp:spPr>
+      <dsp:style>
+        <a:lnRef idx="2">
+          <a:scrgbClr r="0" g="0" b="0"/>
+        </a:lnRef>
+        <a:fillRef idx="1">
+          <a:scrgbClr r="0" g="0" b="0"/>
+        </a:fillRef>
+        <a:effectRef idx="0">
+          <a:scrgbClr r="0" g="0" b="0"/>
+        </a:effectRef>
+        <a:fontRef idx="minor"/>
+      </dsp:style>
+    </dsp:sp>
+    <dsp:sp modelId="{7C71F848-9FDE-47A2-8E0A-55360689688C}">
+      <dsp:nvSpPr>
+        <dsp:cNvPr id="0" name=""/>
+        <dsp:cNvSpPr/>
+      </dsp:nvSpPr>
+      <dsp:spPr>
+        <a:xfrm>
+          <a:off x="3558871" y="1276198"/>
+          <a:ext cx="2940657" cy="1470328"/>
+        </a:xfrm>
+        <a:prstGeom prst="rect">
+          <a:avLst/>
+        </a:prstGeom>
+        <a:solidFill>
+          <a:schemeClr val="accent1">
+            <a:hueOff val="0"/>
+            <a:satOff val="0"/>
+            <a:lumOff val="0"/>
+            <a:alphaOff val="0"/>
+          </a:schemeClr>
+        </a:solidFill>
+        <a:ln w="15875" cap="flat" cmpd="sng" algn="ctr">
+          <a:solidFill>
+            <a:schemeClr val="lt1">
+              <a:hueOff val="0"/>
+              <a:satOff val="0"/>
+              <a:lumOff val="0"/>
+              <a:alphaOff val="0"/>
+            </a:schemeClr>
+          </a:solidFill>
+          <a:prstDash val="solid"/>
+        </a:ln>
+        <a:effectLst/>
+      </dsp:spPr>
+      <dsp:style>
+        <a:lnRef idx="2">
+          <a:scrgbClr r="0" g="0" b="0"/>
+        </a:lnRef>
+        <a:fillRef idx="1">
+          <a:scrgbClr r="0" g="0" b="0"/>
+        </a:fillRef>
+        <a:effectRef idx="0">
+          <a:scrgbClr r="0" g="0" b="0"/>
+        </a:effectRef>
+        <a:fontRef idx="minor">
+          <a:schemeClr val="lt1"/>
+        </a:fontRef>
+      </dsp:style>
+      <dsp:txBody>
+        <a:bodyPr spcFirstLastPara="0" vert="horz" wrap="square" lIns="1089269" tIns="23495" rIns="23495" bIns="23495" numCol="1" spcCol="1270" anchor="ctr" anchorCtr="0">
+          <a:noAutofit/>
+        </a:bodyPr>
+        <a:lstStyle/>
+        <a:p>
+          <a:pPr marL="0" lvl="0" indent="0" algn="ctr" defTabSz="1644650">
+            <a:lnSpc>
+              <a:spcPct val="90000"/>
+            </a:lnSpc>
+            <a:spcBef>
+              <a:spcPct val="0"/>
+            </a:spcBef>
+            <a:spcAft>
+              <a:spcPct val="35000"/>
+            </a:spcAft>
+            <a:buNone/>
+          </a:pPr>
+          <a:r>
+            <a:rPr lang="en-US" sz="3700" kern="1200" dirty="0"/>
+            <a:t>Krystal Duran</a:t>
+          </a:r>
+        </a:p>
+      </dsp:txBody>
+      <dsp:txXfrm>
+        <a:off x="3558871" y="1276198"/>
+        <a:ext cx="2940657" cy="1470328"/>
+      </dsp:txXfrm>
+    </dsp:sp>
+    <dsp:sp modelId="{181D4C06-E320-4673-8269-9713F8CDB245}">
+      <dsp:nvSpPr>
+        <dsp:cNvPr id="0" name=""/>
+        <dsp:cNvSpPr/>
+      </dsp:nvSpPr>
+      <dsp:spPr>
+        <a:xfrm>
+          <a:off x="3705904" y="1423230"/>
+          <a:ext cx="882197" cy="1176263"/>
+        </a:xfrm>
+        <a:prstGeom prst="rect">
+          <a:avLst/>
+        </a:prstGeom>
+        <a:blipFill>
+          <a:blip xmlns:r="http://schemas.openxmlformats.org/officeDocument/2006/relationships" r:embed="rId2">
+            <a:extLst>
+              <a:ext uri="{28A0092B-C50C-407E-A947-70E740481C1C}">
+                <a14:useLocalDpi xmlns:a14="http://schemas.microsoft.com/office/drawing/2010/main" val="0"/>
+              </a:ext>
+            </a:extLst>
+          </a:blip>
+          <a:srcRect/>
+          <a:stretch>
+            <a:fillRect l="-17000" r="-17000"/>
+          </a:stretch>
+        </a:blipFill>
+        <a:ln w="15875" cap="flat" cmpd="sng" algn="ctr">
+          <a:solidFill>
+            <a:schemeClr val="lt1">
+              <a:hueOff val="0"/>
+              <a:satOff val="0"/>
+              <a:lumOff val="0"/>
+              <a:alphaOff val="0"/>
+            </a:schemeClr>
+          </a:solidFill>
+          <a:prstDash val="solid"/>
+        </a:ln>
+        <a:effectLst/>
+      </dsp:spPr>
+      <dsp:style>
+        <a:lnRef idx="2">
+          <a:scrgbClr r="0" g="0" b="0"/>
+        </a:lnRef>
+        <a:fillRef idx="1">
+          <a:scrgbClr r="0" g="0" b="0"/>
+        </a:fillRef>
+        <a:effectRef idx="0">
+          <a:scrgbClr r="0" g="0" b="0"/>
+        </a:effectRef>
+        <a:fontRef idx="minor"/>
+      </dsp:style>
+    </dsp:sp>
+    <dsp:sp modelId="{615E95FF-6C65-4336-B376-4D1F20F16F89}">
+      <dsp:nvSpPr>
+        <dsp:cNvPr id="0" name=""/>
+        <dsp:cNvSpPr/>
+      </dsp:nvSpPr>
+      <dsp:spPr>
+        <a:xfrm>
+          <a:off x="7117066" y="1276198"/>
+          <a:ext cx="2940657" cy="1470328"/>
+        </a:xfrm>
+        <a:prstGeom prst="rect">
+          <a:avLst/>
+        </a:prstGeom>
+        <a:solidFill>
+          <a:schemeClr val="accent1">
+            <a:hueOff val="0"/>
+            <a:satOff val="0"/>
+            <a:lumOff val="0"/>
+            <a:alphaOff val="0"/>
+          </a:schemeClr>
+        </a:solidFill>
+        <a:ln w="15875" cap="flat" cmpd="sng" algn="ctr">
+          <a:solidFill>
+            <a:schemeClr val="lt1">
+              <a:hueOff val="0"/>
+              <a:satOff val="0"/>
+              <a:lumOff val="0"/>
+              <a:alphaOff val="0"/>
+            </a:schemeClr>
+          </a:solidFill>
+          <a:prstDash val="solid"/>
+        </a:ln>
+        <a:effectLst/>
+      </dsp:spPr>
+      <dsp:style>
+        <a:lnRef idx="2">
+          <a:scrgbClr r="0" g="0" b="0"/>
+        </a:lnRef>
+        <a:fillRef idx="1">
+          <a:scrgbClr r="0" g="0" b="0"/>
+        </a:fillRef>
+        <a:effectRef idx="0">
+          <a:scrgbClr r="0" g="0" b="0"/>
+        </a:effectRef>
+        <a:fontRef idx="minor">
+          <a:schemeClr val="lt1"/>
+        </a:fontRef>
+      </dsp:style>
+      <dsp:txBody>
+        <a:bodyPr spcFirstLastPara="0" vert="horz" wrap="square" lIns="1089269" tIns="23495" rIns="23495" bIns="23495" numCol="1" spcCol="1270" anchor="ctr" anchorCtr="0">
+          <a:noAutofit/>
+        </a:bodyPr>
+        <a:lstStyle/>
+        <a:p>
+          <a:pPr marL="0" lvl="0" indent="0" algn="ctr" defTabSz="1644650">
+            <a:lnSpc>
+              <a:spcPct val="90000"/>
+            </a:lnSpc>
+            <a:spcBef>
+              <a:spcPct val="0"/>
+            </a:spcBef>
+            <a:spcAft>
+              <a:spcPct val="35000"/>
+            </a:spcAft>
+            <a:buNone/>
+          </a:pPr>
+          <a:r>
+            <a:rPr lang="en-US" sz="3700" kern="1200" dirty="0" err="1"/>
+            <a:t>Vandolph</a:t>
+          </a:r>
+          <a:r>
+            <a:rPr lang="en-US" sz="3700" kern="1200" dirty="0"/>
+            <a:t> Baptiste</a:t>
+          </a:r>
+        </a:p>
+      </dsp:txBody>
+      <dsp:txXfrm>
+        <a:off x="7117066" y="1276198"/>
+        <a:ext cx="2940657" cy="1470328"/>
+      </dsp:txXfrm>
+    </dsp:sp>
+    <dsp:sp modelId="{F3CDEF7A-8180-475D-A2D7-083410DF7ABA}">
+      <dsp:nvSpPr>
+        <dsp:cNvPr id="0" name=""/>
+        <dsp:cNvSpPr/>
+      </dsp:nvSpPr>
+      <dsp:spPr>
+        <a:xfrm>
+          <a:off x="7264099" y="1423230"/>
+          <a:ext cx="882197" cy="1176263"/>
+        </a:xfrm>
+        <a:prstGeom prst="rect">
+          <a:avLst/>
+        </a:prstGeom>
+        <a:blipFill>
+          <a:blip xmlns:r="http://schemas.openxmlformats.org/officeDocument/2006/relationships" r:embed="rId3">
+            <a:extLst>
+              <a:ext uri="{28A0092B-C50C-407E-A947-70E740481C1C}">
+                <a14:useLocalDpi xmlns:a14="http://schemas.microsoft.com/office/drawing/2010/main" val="0"/>
+              </a:ext>
+            </a:extLst>
+          </a:blip>
+          <a:srcRect/>
+          <a:stretch>
+            <a:fillRect l="-17000" r="-17000"/>
+          </a:stretch>
+        </a:blipFill>
+        <a:ln w="15875" cap="flat" cmpd="sng" algn="ctr">
+          <a:solidFill>
+            <a:schemeClr val="lt1">
+              <a:hueOff val="0"/>
+              <a:satOff val="0"/>
+              <a:lumOff val="0"/>
+              <a:alphaOff val="0"/>
+            </a:schemeClr>
+          </a:solidFill>
+          <a:prstDash val="solid"/>
+        </a:ln>
+        <a:effectLst/>
+      </dsp:spPr>
+      <dsp:style>
+        <a:lnRef idx="2">
+          <a:scrgbClr r="0" g="0" b="0"/>
+        </a:lnRef>
+        <a:fillRef idx="1">
+          <a:scrgbClr r="0" g="0" b="0"/>
+        </a:fillRef>
+        <a:effectRef idx="0">
+          <a:scrgbClr r="0" g="0" b="0"/>
+        </a:effectRef>
+        <a:fontRef idx="minor"/>
+      </dsp:style>
+    </dsp:sp>
+  </dsp:spTree>
+</dsp:drawing>
+</file>
+
+<file path=ppt/diagrams/layout1.xml><?xml version="1.0" encoding="utf-8"?>
+<dgm:layoutDef xmlns:dgm="http://schemas.openxmlformats.org/drawingml/2006/diagram" xmlns:a="http://schemas.openxmlformats.org/drawingml/2006/main" uniqueId="urn:microsoft.com/office/officeart/2005/8/layout/pictureOrgChart+Icon">
+  <dgm:title val="Picture Organization Chart"/>
+  <dgm:desc val="Use to show hierarchical information or reporting relationships in an organization, with corresponding pictures. The assistant shape and the Org Chart hanging layouts are available with this layout."/>
+  <dgm:catLst>
+    <dgm:cat type="hierarchy" pri="1050"/>
+    <dgm:cat type="officeonline" pri="1000"/>
+  </dgm:catLst>
+  <dgm:sampData>
+    <dgm:dataModel>
+      <dgm:ptLst>
+        <dgm:pt modelId="0" type="doc"/>
+        <dgm:pt modelId="1">
+          <dgm:prSet phldr="1"/>
+        </dgm:pt>
+        <dgm:pt modelId="2" type="asst">
+          <dgm:prSet phldr="1"/>
+        </dgm:pt>
+        <dgm:pt modelId="3">
+          <dgm:prSet phldr="1"/>
+        </dgm:pt>
+        <dgm:pt modelId="4">
+          <dgm:prSet phldr="1"/>
+        </dgm:pt>
+        <dgm:pt modelId="5">
+          <dgm:prSet phldr="1"/>
+        </dgm:pt>
+      </dgm:ptLst>
+      <dgm:cxnLst>
+        <dgm:cxn modelId="5" srcId="0" destId="1" srcOrd="0" destOrd="0"/>
+        <dgm:cxn modelId="6" srcId="1" destId="2" srcOrd="0" destOrd="0"/>
+        <dgm:cxn modelId="7" srcId="1" destId="3" srcOrd="1" destOrd="0"/>
+        <dgm:cxn modelId="8" srcId="1" destId="4" srcOrd="2" destOrd="0"/>
+        <dgm:cxn modelId="9" srcId="1" destId="5" srcOrd="3" destOrd="0"/>
+      </dgm:cxnLst>
+      <dgm:bg/>
+      <dgm:whole/>
+    </dgm:dataModel>
+  </dgm:sampData>
+  <dgm:styleData>
+    <dgm:dataModel>
+      <dgm:ptLst>
+        <dgm:pt modelId="0" type="doc"/>
+        <dgm:pt modelId="1"/>
+        <dgm:pt modelId="12"/>
+        <dgm:pt modelId="13"/>
+      </dgm:ptLst>
+      <dgm:cxnLst>
+        <dgm:cxn modelId="2" srcId="0" destId="1" srcOrd="0" destOrd="0"/>
+        <dgm:cxn modelId="16" srcId="1" destId="12" srcOrd="1" destOrd="0"/>
+        <dgm:cxn modelId="17" srcId="1" destId="13" srcOrd="2" destOrd="0"/>
+      </dgm:cxnLst>
+      <dgm:bg/>
+      <dgm:whole/>
+    </dgm:dataModel>
+  </dgm:styleData>
+  <dgm:clrData>
+    <dgm:dataModel>
+      <dgm:ptLst>
+        <dgm:pt modelId="0" type="doc"/>
+        <dgm:pt modelId="1"/>
+        <dgm:pt modelId="11" type="asst"/>
+        <dgm:pt modelId="12"/>
+        <dgm:pt modelId="13"/>
+        <dgm:pt modelId="14"/>
+      </dgm:ptLst>
+      <dgm:cxnLst>
+        <dgm:cxn modelId="2" srcId="0" destId="1" srcOrd="0" destOrd="0"/>
+        <dgm:cxn modelId="15" srcId="1" destId="11" srcOrd="0" destOrd="0"/>
+        <dgm:cxn modelId="16" srcId="1" destId="12" srcOrd="1" destOrd="0"/>
+        <dgm:cxn modelId="17" srcId="1" destId="13" srcOrd="2" destOrd="0"/>
+        <dgm:cxn modelId="18" srcId="1" destId="14" srcOrd="2" destOrd="0"/>
+      </dgm:cxnLst>
+      <dgm:bg/>
+      <dgm:whole/>
+    </dgm:dataModel>
+  </dgm:clrData>
+  <dgm:layoutNode name="hierChild1">
+    <dgm:varLst>
+      <dgm:orgChart val="1"/>
+      <dgm:chPref val="1"/>
+      <dgm:dir/>
+      <dgm:animOne val="branch"/>
+      <dgm:animLvl val="lvl"/>
+      <dgm:resizeHandles/>
+    </dgm:varLst>
+    <dgm:choose name="Name0">
+      <dgm:if name="Name1" func="var" arg="dir" op="equ" val="norm">
+        <dgm:alg type="hierChild">
+          <dgm:param type="linDir" val="fromL"/>
+        </dgm:alg>
+      </dgm:if>
+      <dgm:else name="Name2">
+        <dgm:alg type="hierChild">
+          <dgm:param type="linDir" val="fromR"/>
+        </dgm:alg>
+      </dgm:else>
+    </dgm:choose>
+    <dgm:shape xmlns:r="http://schemas.openxmlformats.org/officeDocument/2006/relationships" r:blip="">
+      <dgm:adjLst/>
+    </dgm:shape>
+    <dgm:presOf/>
+    <dgm:constrLst>
+      <dgm:constr type="w" for="des" forName="rootComposite1" refType="w" fact="10"/>
+      <dgm:constr type="h" for="des" forName="rootComposite1" refType="w" refFor="des" refForName="rootComposite1" fact="0.5"/>
+      <dgm:constr type="w" for="des" forName="rootComposite" refType="w" fact="10"/>
+      <dgm:constr type="h" for="des" forName="rootComposite" refType="w" refFor="des" refForName="rootComposite1" fact="0.5"/>
+      <dgm:constr type="w" for="des" forName="rootComposite3" refType="w" fact="10"/>
+      <dgm:constr type="h" for="des" forName="rootComposite3" refType="w" refFor="des" refForName="rootComposite1" fact="0.5"/>
+      <dgm:constr type="primFontSz" for="des" ptType="node" op="equ"/>
+      <dgm:constr type="sp" for="des" op="equ"/>
+      <dgm:constr type="sp" for="des" forName="hierRoot1" refType="w" refFor="des" refForName="rootComposite1" fact="0.21"/>
+      <dgm:constr type="sp" for="des" forName="hierRoot2" refType="sp" refFor="des" refForName="hierRoot1"/>
+      <dgm:constr type="sp" for="des" forName="hierRoot3" refType="sp" refFor="des" refForName="hierRoot1"/>
+      <dgm:constr type="sibSp" refType="w" refFor="des" refForName="rootComposite1" fact="0.21"/>
+      <dgm:constr type="sibSp" for="des" forName="hierChild2" refType="sibSp"/>
+      <dgm:constr type="sibSp" for="des" forName="hierChild3" refType="sibSp"/>
+      <dgm:constr type="sibSp" for="des" forName="hierChild4" refType="sibSp"/>
+      <dgm:constr type="sibSp" for="des" forName="hierChild5" refType="sibSp"/>
+      <dgm:constr type="sibSp" for="des" forName="hierChild6" refType="sibSp"/>
+      <dgm:constr type="sibSp" for="des" forName="hierChild7" refType="sibSp"/>
+      <dgm:constr type="secSibSp" refType="w" refFor="des" refForName="rootComposite1" fact="0.21"/>
+      <dgm:constr type="secSibSp" for="des" forName="hierChild2" refType="secSibSp"/>
+      <dgm:constr type="secSibSp" for="des" forName="hierChild3" refType="secSibSp"/>
+      <dgm:constr type="secSibSp" for="des" forName="hierChild4" refType="secSibSp"/>
+      <dgm:constr type="secSibSp" for="des" forName="hierChild5" refType="secSibSp"/>
+      <dgm:constr type="secSibSp" for="des" forName="hierChild6" refType="secSibSp"/>
+      <dgm:constr type="secSibSp" for="des" forName="hierChild7" refType="secSibSp"/>
+    </dgm:constrLst>
+    <dgm:ruleLst/>
+    <dgm:forEach name="Name3" axis="ch">
+      <dgm:forEach name="Name4" axis="self" ptType="node">
+        <dgm:layoutNode name="hierRoot1">
+          <dgm:varLst>
+            <dgm:hierBranch val="init"/>
+          </dgm:varLst>
+          <dgm:choose name="Name5">
+            <dgm:if name="Name6" func="var" arg="hierBranch" op="equ" val="l">
+              <dgm:choose name="Name7">
+                <dgm:if name="Name8" axis="ch" ptType="asst" func="cnt" op="gte" val="1">
+                  <dgm:alg type="hierRoot">
+                    <dgm:param type="hierAlign" val="tR"/>
+                  </dgm:alg>
+                  <dgm:constrLst>
+                    <dgm:constr type="alignOff" val="0.65"/>
+                  </dgm:constrLst>
+                </dgm:if>
+                <dgm:else name="Name9">
+                  <dgm:alg type="hierRoot">
+                    <dgm:param type="hierAlign" val="tR"/>
+                  </dgm:alg>
+                  <dgm:constrLst>
+                    <dgm:constr type="alignOff" val="0.25"/>
+                  </dgm:constrLst>
+                </dgm:else>
+              </dgm:choose>
+            </dgm:if>
+            <dgm:if name="Name10" func="var" arg="hierBranch" op="equ" val="r">
+              <dgm:choose name="Name11">
+                <dgm:if name="Name12" axis="ch" ptType="asst" func="cnt" op="gte" val="1">
+                  <dgm:alg type="hierRoot">
+                    <dgm:param type="hierAlign" val="tL"/>
+                  </dgm:alg>
+                  <dgm:constrLst>
+                    <dgm:constr type="alignOff" val="0.65"/>
+                  </dgm:constrLst>
+                </dgm:if>
+                <dgm:else name="Name13">
+                  <dgm:alg type="hierRoot">
+                    <dgm:param type="hierAlign" val="tL"/>
+                  </dgm:alg>
+                  <dgm:constrLst>
+                    <dgm:constr type="alignOff" val="0.25"/>
+                  </dgm:constrLst>
+                </dgm:else>
+              </dgm:choose>
+            </dgm:if>
+            <dgm:if name="Name14" func="var" arg="hierBranch" op="equ" val="hang">
+              <dgm:alg type="hierRoot"/>
+              <dgm:constrLst>
+                <dgm:constr type="alignOff" val="0.65"/>
+              </dgm:constrLst>
+            </dgm:if>
+            <dgm:else name="Name15">
+              <dgm:alg type="hierRoot"/>
+              <dgm:constrLst>
+                <dgm:constr type="alignOff"/>
+                <dgm:constr type="bendDist" for="des" ptType="parTrans" refType="sp" fact="0.5"/>
+              </dgm:constrLst>
+            </dgm:else>
+          </dgm:choose>
+          <dgm:shape xmlns:r="http://schemas.openxmlformats.org/officeDocument/2006/relationships" r:blip="">
+            <dgm:adjLst/>
+          </dgm:shape>
+          <dgm:presOf/>
+          <dgm:ruleLst/>
+          <dgm:layoutNode name="rootComposite1">
+            <dgm:alg type="composite"/>
+            <dgm:shape xmlns:r="http://schemas.openxmlformats.org/officeDocument/2006/relationships" r:blip="">
+              <dgm:adjLst/>
+            </dgm:shape>
+            <dgm:presOf axis="self" ptType="node" cnt="1"/>
+            <dgm:choose name="Name16">
+              <dgm:if name="Name17" func="var" arg="hierBranch" op="equ" val="init">
+                <dgm:constrLst>
+                  <dgm:constr type="l" for="ch" forName="rootText1"/>
+                  <dgm:constr type="t" for="ch" forName="rootText1"/>
+                  <dgm:constr type="w" for="ch" forName="rootText1" refType="w"/>
+                  <dgm:constr type="h" for="ch" forName="rootText1" refType="h"/>
+                  <dgm:constr type="lMarg" for="ch" forName="rootText1" refType="w" fact="1.05"/>
+                  <dgm:constr type="l" for="ch" forName="rootPict1" refType="w" refFor="ch" refForName="rootText1" op="equ" fact="0.05"/>
+                  <dgm:constr type="t" for="ch" forName="rootPict1" refType="h" refFor="ch" refForName="rootText1" op="equ" fact="0.1"/>
+                  <dgm:constr type="w" for="ch" forName="rootPict1" refType="w" refFor="ch" refForName="rootText1" op="equ" fact="0.3"/>
+                  <dgm:constr type="h" for="ch" forName="rootPict1" refType="h" refFor="ch" refForName="rootText1" op="equ" fact="0.8"/>
+                  <dgm:constr type="l" for="ch" forName="rootConnector1"/>
+                  <dgm:constr type="t" for="ch" forName="rootConnector1"/>
+                  <dgm:constr type="w" for="ch" forName="rootConnector1" refType="w" refFor="ch" refForName="rootText1" fact="0.2"/>
+                  <dgm:constr type="h" for="ch" forName="rootConnector1" refType="h" refFor="ch" refForName="rootText1"/>
+                </dgm:constrLst>
+              </dgm:if>
+              <dgm:if name="Name18" func="var" arg="hierBranch" op="equ" val="l">
+                <dgm:constrLst>
+                  <dgm:constr type="l" for="ch" forName="rootText1"/>
+                  <dgm:constr type="t" for="ch" forName="rootText1"/>
+                  <dgm:constr type="w" for="ch" forName="rootText1" refType="w"/>
+                  <dgm:constr type="h" for="ch" forName="rootText1" refType="h"/>
+                  <dgm:constr type="lMarg" for="ch" forName="rootText1" refType="w" fact="1.05"/>
+                  <dgm:constr type="l" for="ch" forName="rootPict1" refType="w" refFor="ch" refForName="rootText1" op="equ" fact="0.05"/>
+                  <dgm:constr type="t" for="ch" forName="rootPict1" refType="h" refFor="ch" refForName="rootText1" op="equ" fact="0.1"/>
+                  <dgm:constr type="w" for="ch" forName="rootPict1" refType="w" refFor="ch" refForName="rootText1" op="equ" fact="0.3"/>
+                  <dgm:constr type="h" for="ch" forName="rootPict1" refType="h" refFor="ch" refForName="rootText1" op="equ" fact="0.8"/>
+                  <dgm:constr type="r" for="ch" forName="rootConnector1" refType="w"/>
+                  <dgm:constr type="t" for="ch" forName="rootConnector1"/>
+                  <dgm:constr type="w" for="ch" forName="rootConnector1" refType="w" refFor="ch" refForName="rootText1" fact="0.2"/>
+                  <dgm:constr type="h" for="ch" forName="rootConnector1" refType="h" refFor="ch" refForName="rootText1"/>
+                </dgm:constrLst>
+              </dgm:if>
+              <dgm:if name="Name19" func="var" arg="hierBranch" op="equ" val="r">
+                <dgm:constrLst>
+                  <dgm:constr type="l" for="ch" forName="rootText1"/>
+                  <dgm:constr type="t" for="ch" forName="rootText1"/>
+                  <dgm:constr type="w" for="ch" forName="rootText1" refType="w"/>
+                  <dgm:constr type="h" for="ch" forName="rootText1" refType="h"/>
+                  <dgm:constr type="lMarg" for="ch" forName="rootText1" refType="w" fact="1.05"/>
+                  <dgm:constr type="l" for="ch" forName="rootPict1" refType="w" refFor="ch" refForName="rootText1" op="equ" fact="0.05"/>
+                  <dgm:constr type="t" for="ch" forName="rootPict1" refType="h" refFor="ch" refForName="rootText1" op="equ" fact="0.1"/>
+                  <dgm:constr type="w" for="ch" forName="rootPict1" refType="w" refFor="ch" refForName="rootText1" op="equ" fact="0.3"/>
+                  <dgm:constr type="h" for="ch" forName="rootPict1" refType="h" refFor="ch" refForName="rootText1" op="equ" fact="0.8"/>
+                  <dgm:constr type="l" for="ch" forName="rootConnector1"/>
+                  <dgm:constr type="t" for="ch" forName="rootConnector1"/>
+                  <dgm:constr type="w" for="ch" forName="rootConnector1" refType="w" refFor="ch" refForName="rootText1" fact="0.2"/>
+                  <dgm:constr type="h" for="ch" forName="rootConnector1" refType="h" refFor="ch" refForName="rootText1"/>
+                </dgm:constrLst>
+              </dgm:if>
+              <dgm:else name="Name20">
+                <dgm:constrLst>
+                  <dgm:constr type="l" for="ch" forName="rootText1"/>
+                  <dgm:constr type="t" for="ch" forName="rootText1"/>
+                  <dgm:constr type="w" for="ch" forName="rootText1" refType="w"/>
+                  <dgm:constr type="h" for="ch" forName="rootText1" refType="h"/>
+                  <dgm:constr type="lMarg" for="ch" forName="rootText1" refType="w" fact="1.05"/>
+                  <dgm:constr type="l" for="ch" forName="rootPict1" refType="w" refFor="ch" refForName="rootText1" op="equ" fact="0.05"/>
+                  <dgm:constr type="t" for="ch" forName="rootPict1" refType="h" refFor="ch" refForName="rootText1" op="equ" fact="0.1"/>
+                  <dgm:constr type="w" for="ch" forName="rootPict1" refType="w" refFor="ch" refForName="rootText1" op="equ" fact="0.3"/>
+                  <dgm:constr type="h" for="ch" forName="rootPict1" refType="h" refFor="ch" refForName="rootText1" op="equ" fact="0.8"/>
+                  <dgm:constr type="r" for="ch" forName="rootConnector1" refType="w"/>
+                  <dgm:constr type="t" for="ch" forName="rootConnector1"/>
+                  <dgm:constr type="w" for="ch" forName="rootConnector1" refType="w" refFor="ch" refForName="rootText1" fact="0.2"/>
+                  <dgm:constr type="h" for="ch" forName="rootConnector1" refType="h" refFor="ch" refForName="rootText1"/>
+                </dgm:constrLst>
+              </dgm:else>
+            </dgm:choose>
+            <dgm:ruleLst/>
+            <dgm:layoutNode name="rootText1" styleLbl="node0">
+              <dgm:varLst>
+                <dgm:chPref val="3"/>
+              </dgm:varLst>
+              <dgm:alg type="tx"/>
+              <dgm:shape xmlns:r="http://schemas.openxmlformats.org/officeDocument/2006/relationships" type="rect" r:blip="">
+                <dgm:adjLst/>
+              </dgm:shape>
+              <dgm:presOf axis="self" ptType="node" cnt="1"/>
+              <dgm:constrLst>
+                <dgm:constr type="primFontSz" val="65"/>
+                <dgm:constr type="lMarg" refType="primFontSz" fact="0.05"/>
+                <dgm:constr type="rMarg" refType="primFontSz" fact="0.05"/>
+                <dgm:constr type="tMarg" refType="primFontSz" fact="0.05"/>
+                <dgm:constr type="bMarg" refType="primFontSz" fact="0.05"/>
+              </dgm:constrLst>
+              <dgm:ruleLst>
+                <dgm:rule type="primFontSz" val="5" fact="NaN" max="NaN"/>
+              </dgm:ruleLst>
+            </dgm:layoutNode>
+            <dgm:layoutNode name="rootPict1" styleLbl="alignImgPlace1">
+              <dgm:alg type="sp"/>
+              <dgm:shape xmlns:r="http://schemas.openxmlformats.org/officeDocument/2006/relationships" type="rect" r:blip="" blipPhldr="1">
+                <dgm:adjLst/>
+              </dgm:shape>
+              <dgm:presOf/>
+              <dgm:constrLst/>
+              <dgm:ruleLst/>
+            </dgm:layoutNode>
+            <dgm:layoutNode name="rootConnector1" moveWith="rootText1">
+              <dgm:alg type="sp"/>
+              <dgm:shape xmlns:r="http://schemas.openxmlformats.org/officeDocument/2006/relationships" type="rect" r:blip="" hideGeom="1">
+                <dgm:adjLst/>
+              </dgm:shape>
+              <dgm:presOf axis="self" ptType="node" cnt="1"/>
+              <dgm:constrLst/>
+              <dgm:ruleLst/>
+            </dgm:layoutNode>
+          </dgm:layoutNode>
+          <dgm:layoutNode name="hierChild2">
+            <dgm:choose name="Name21">
+              <dgm:if name="Name22" func="var" arg="hierBranch" op="equ" val="l">
+                <dgm:alg type="hierChild">
+                  <dgm:param type="chAlign" val="r"/>
+                  <dgm:param type="linDir" val="fromT"/>
+                </dgm:alg>
+              </dgm:if>
+              <dgm:if name="Name23" func="var" arg="hierBranch" op="equ" val="r">
+                <dgm:alg type="hierChild">
+                  <dgm:param type="chAlign" val="l"/>
+                  <dgm:param type="linDir" val="fromT"/>
+                </dgm:alg>
+              </dgm:if>
+              <dgm:if name="Name24" func="var" arg="hierBranch" op="equ" val="hang">
+                <dgm:choose name="Name25">
+                  <dgm:if name="Name26" func="var" arg="dir" op="equ" val="norm">
+                    <dgm:alg type="hierChild">
+                      <dgm:param type="chAlign" val="l"/>
+                      <dgm:param type="linDir" val="fromL"/>
+                      <dgm:param type="secChAlign" val="t"/>
+                      <dgm:param type="secLinDir" val="fromT"/>
+                    </dgm:alg>
+                  </dgm:if>
+                  <dgm:else name="Name27">
+                    <dgm:alg type="hierChild">
+                      <dgm:param type="chAlign" val="l"/>
+                      <dgm:param type="linDir" val="fromR"/>
+                      <dgm:param type="secChAlign" val="t"/>
+                      <dgm:param type="secLinDir" val="fromT"/>
+                    </dgm:alg>
+                  </dgm:else>
+                </dgm:choose>
+              </dgm:if>
+              <dgm:else name="Name28">
+                <dgm:choose name="Name29">
+                  <dgm:if name="Name30" func="var" arg="dir" op="equ" val="norm">
+                    <dgm:alg type="hierChild"/>
+                  </dgm:if>
+                  <dgm:else name="Name31">
+                    <dgm:alg type="hierChild">
+                      <dgm:param type="linDir" val="fromR"/>
+                    </dgm:alg>
+                  </dgm:else>
+                </dgm:choose>
+              </dgm:else>
+            </dgm:choose>
+            <dgm:shape xmlns:r="http://schemas.openxmlformats.org/officeDocument/2006/relationships" r:blip="">
+              <dgm:adjLst/>
+            </dgm:shape>
+            <dgm:presOf/>
+            <dgm:constrLst/>
+            <dgm:ruleLst/>
+            <dgm:forEach name="rep2a" axis="ch" ptType="nonAsst">
+              <dgm:forEach name="Name32" axis="precedSib" ptType="parTrans" st="-1" cnt="1">
+                <dgm:choose name="Name33">
+                  <dgm:if name="Name34" func="var" arg="hierBranch" op="equ" val="std">
+                    <dgm:layoutNode name="Name35">
+                      <dgm:alg type="conn">
+                        <dgm:param type="connRout" val="bend"/>
+                        <dgm:param type="dim" val="1D"/>
+                        <dgm:param type="endSty" val="noArr"/>
+                        <dgm:param type="begPts" val="bCtr"/>
+                        <dgm:param type="endPts" val="tCtr"/>
+                        <dgm:param type="bendPt" val="end"/>
+                      </dgm:alg>
+                      <dgm:shape xmlns:r="http://schemas.openxmlformats.org/officeDocument/2006/relationships" type="conn" r:blip="" zOrderOff="-99999">
+                        <dgm:adjLst/>
+                      </dgm:shape>
+                      <dgm:presOf axis="self"/>
+                      <dgm:constrLst>
+                        <dgm:constr type="begPad"/>
+                        <dgm:constr type="endPad"/>
+                      </dgm:constrLst>
+                      <dgm:ruleLst/>
+                    </dgm:layoutNode>
+                  </dgm:if>
+                  <dgm:if name="Name36" func="var" arg="hierBranch" op="equ" val="init">
+                    <dgm:layoutNode name="Name37">
+                      <dgm:choose name="Name38">
+                        <dgm:if name="Name39" axis="self" func="depth" op="lte" val="2">
+                          <dgm:alg type="conn">
+                            <dgm:param type="connRout" val="bend"/>
+                            <dgm:param type="dim" val="1D"/>
+                            <dgm:param type="endSty" val="noArr"/>
+                            <dgm:param type="begPts" val="bCtr"/>
+                            <dgm:param type="endPts" val="tCtr"/>
+                            <dgm:param type="bendPt" val="end"/>
+                          </dgm:alg>
+                        </dgm:if>
+                        <dgm:else name="Name40">
+                          <dgm:choose name="Name41">
+                            <dgm:if name="Name42" axis="par des" func="maxDepth" op="lte" val="1">
+                              <dgm:choose name="Name43">
+                                <dgm:if name="Name44" axis="par ch" ptType="node asst" func="cnt" op="gte" val="1">
+                                  <dgm:alg type="conn">
+                                    <dgm:param type="connRout" val="bend"/>
+                                    <dgm:param type="dim" val="1D"/>
+                                    <dgm:param type="endSty" val="noArr"/>
+                                    <dgm:param type="begPts" val="bCtr"/>
+                                    <dgm:param type="endPts" val="midL midR"/>
+                                  </dgm:alg>
+                                </dgm:if>
+                                <dgm:else name="Name45">
+                                  <dgm:alg type="conn">
+                                    <dgm:param type="connRout" val="bend"/>
+                                    <dgm:param type="dim" val="1D"/>
+                                    <dgm:param type="endSty" val="noArr"/>
+                                    <dgm:param type="begPts" val="bCtr"/>
+                                    <dgm:param type="endPts" val="midL midR"/>
+                                    <dgm:param type="srcNode" val="rootConnector"/>
+                                  </dgm:alg>
+                                </dgm:else>
+                              </dgm:choose>
+                            </dgm:if>
+                            <dgm:else name="Name46">
+                              <dgm:alg type="conn">
+                                <dgm:param type="connRout" val="bend"/>
+                                <dgm:param type="dim" val="1D"/>
+                                <dgm:param type="endSty" val="noArr"/>
+                                <dgm:param type="begPts" val="bCtr"/>
+                                <dgm:param type="endPts" val="tCtr"/>
+                                <dgm:param type="bendPt" val="end"/>
+                              </dgm:alg>
+                            </dgm:else>
+                          </dgm:choose>
+                        </dgm:else>
+                      </dgm:choose>
+                      <dgm:shape xmlns:r="http://schemas.openxmlformats.org/officeDocument/2006/relationships" type="conn" r:blip="" zOrderOff="-99999">
+                        <dgm:adjLst/>
+                      </dgm:shape>
+                      <dgm:presOf axis="self"/>
+                      <dgm:constrLst>
+                        <dgm:constr type="begPad"/>
+                        <dgm:constr type="endPad"/>
+                      </dgm:constrLst>
+                      <dgm:ruleLst/>
+                    </dgm:layoutNode>
+                  </dgm:if>
+                  <dgm:if name="Name47" func="var" arg="hierBranch" op="equ" val="hang">
+                    <dgm:layoutNode name="Name48">
+                      <dgm:alg type="conn">
+                        <dgm:param type="connRout" val="bend"/>
+                        <dgm:param type="dim" val="1D"/>
+                        <dgm:param type="endSty" val="noArr"/>
+                        <dgm:param type="begPts" val="bCtr"/>
+                        <dgm:param type="endPts" val="midL midR"/>
+                      </dgm:alg>
+                      <dgm:shape xmlns:r="http://schemas.openxmlformats.org/officeDocument/2006/relationships" type="conn" r:blip="" zOrderOff="-99999">
+                        <dgm:adjLst/>
+                      </dgm:shape>
+                      <dgm:presOf axis="self"/>
+                      <dgm:constrLst>
+                        <dgm:constr type="begPad"/>
+                        <dgm:constr type="endPad"/>
+                      </dgm:constrLst>
+                      <dgm:ruleLst/>
+                    </dgm:layoutNode>
+                  </dgm:if>
+                  <dgm:else name="Name49">
+                    <dgm:layoutNode name="Name50">
+                      <dgm:choose name="Name51">
+                        <dgm:if name="Name52" axis="self" func="depth" op="lte" val="2">
+                          <dgm:choose name="Name53">
+                            <dgm:if name="Name54" axis="par ch" ptType="node asst" func="cnt" op="gte" val="1">
+                              <dgm:alg type="conn">
+                                <dgm:param type="connRout" val="bend"/>
+                                <dgm:param type="dim" val="1D"/>
+                                <dgm:param type="endSty" val="noArr"/>
+                                <dgm:param type="begPts" val="bCtr"/>
+                                <dgm:param type="endPts" val="midL midR"/>
+                              </dgm:alg>
+                            </dgm:if>
+                            <dgm:else name="Name55">
+                              <dgm:alg type="conn">
+                                <dgm:param type="connRout" val="bend"/>
+                                <dgm:param type="dim" val="1D"/>
+                                <dgm:param type="endSty" val="noArr"/>
+                                <dgm:param type="begPts" val="bCtr"/>
+                                <dgm:param type="endPts" val="midL midR"/>
+                                <dgm:param type="srcNode" val="rootConnector1"/>
+                              </dgm:alg>
+                            </dgm:else>
+                          </dgm:choose>
+                        </dgm:if>
+                        <dgm:else name="Name56">
+                          <dgm:choose name="Name57">
+                            <dgm:if name="Name58" axis="par ch" ptType="node asst" func="cnt" op="gte" val="1">
+                              <dgm:alg type="conn">
+                                <dgm:param type="connRout" val="bend"/>
+                                <dgm:param type="dim" val="1D"/>
+                                <dgm:param type="endSty" val="noArr"/>
+                                <dgm:param type="begPts" val="bCtr"/>
+                                <dgm:param type="endPts" val="midL midR"/>
+                              </dgm:alg>
+                            </dgm:if>
+                            <dgm:else name="Name59">
+                              <dgm:alg type="conn">
+                                <dgm:param type="connRout" val="bend"/>
+                                <dgm:param type="dim" val="1D"/>
+                                <dgm:param type="endSty" val="noArr"/>
+                                <dgm:param type="begPts" val="bCtr"/>
+                                <dgm:param type="endPts" val="midL midR"/>
+                                <dgm:param type="srcNode" val="rootConnector"/>
+                              </dgm:alg>
+                            </dgm:else>
+                          </dgm:choose>
+                        </dgm:else>
+                      </dgm:choose>
+                      <dgm:shape xmlns:r="http://schemas.openxmlformats.org/officeDocument/2006/relationships" type="conn" r:blip="" zOrderOff="-99999">
+                        <dgm:adjLst/>
+                      </dgm:shape>
+                      <dgm:presOf axis="self"/>
+                      <dgm:constrLst>
+                        <dgm:constr type="begPad"/>
+                        <dgm:constr type="endPad"/>
+                      </dgm:constrLst>
+                      <dgm:ruleLst/>
+                    </dgm:layoutNode>
+                  </dgm:else>
+                </dgm:choose>
+              </dgm:forEach>
+              <dgm:layoutNode name="hierRoot2">
+                <dgm:varLst>
+                  <dgm:hierBranch val="init"/>
+                </dgm:varLst>
+                <dgm:choose name="Name60">
+                  <dgm:if name="Name61" func="var" arg="hierBranch" op="equ" val="l">
+                    <dgm:choose name="Name62">
+                      <dgm:if name="Name63" axis="ch" ptType="asst" func="cnt" op="gte" val="1">
+                        <dgm:alg type="hierRoot">
+                          <dgm:param type="hierAlign" val="tR"/>
+                        </dgm:alg>
+                        <dgm:shape xmlns:r="http://schemas.openxmlformats.org/officeDocument/2006/relationships" r:blip="">
+                          <dgm:adjLst/>
+                        </dgm:shape>
+                        <dgm:presOf/>
+                        <dgm:constrLst>
+                          <dgm:constr type="alignOff" val="0.65"/>
+                        </dgm:constrLst>
+                      </dgm:if>
+                      <dgm:else name="Name64">
+                        <dgm:alg type="hierRoot">
+                          <dgm:param type="hierAlign" val="tR"/>
+                        </dgm:alg>
+                        <dgm:shape xmlns:r="http://schemas.openxmlformats.org/officeDocument/2006/relationships" r:blip="">
+                          <dgm:adjLst/>
+                        </dgm:shape>
+                        <dgm:presOf/>
+                        <dgm:constrLst>
+                          <dgm:constr type="alignOff" val="0.25"/>
+                        </dgm:constrLst>
+                      </dgm:else>
+                    </dgm:choose>
+                  </dgm:if>
+                  <dgm:if name="Name65" func="var" arg="hierBranch" op="equ" val="r">
+                    <dgm:choose name="Name66">
+                      <dgm:if name="Name67" axis="ch" ptType="asst" func="cnt" op="gte" val="1">
+                        <dgm:alg type="hierRoot">
+                          <dgm:param type="hierAlign" val="tL"/>
+                        </dgm:alg>
+                        <dgm:shape xmlns:r="http://schemas.openxmlformats.org/officeDocument/2006/relationships" r:blip="">
+                          <dgm:adjLst/>
+                        </dgm:shape>
+                        <dgm:presOf/>
+                        <dgm:constrLst>
+                          <dgm:constr type="alignOff" val="0.65"/>
+                        </dgm:constrLst>
+                      </dgm:if>
+                      <dgm:else name="Name68">
+                        <dgm:alg type="hierRoot">
+                          <dgm:param type="hierAlign" val="tL"/>
+                        </dgm:alg>
+                        <dgm:shape xmlns:r="http://schemas.openxmlformats.org/officeDocument/2006/relationships" r:blip="">
+                          <dgm:adjLst/>
+                        </dgm:shape>
+                        <dgm:presOf/>
+                        <dgm:constrLst>
+                          <dgm:constr type="alignOff" val="0.25"/>
+                        </dgm:constrLst>
+                      </dgm:else>
+                    </dgm:choose>
+                  </dgm:if>
+                  <dgm:if name="Name69" func="var" arg="hierBranch" op="equ" val="std">
+                    <dgm:alg type="hierRoot"/>
+                    <dgm:shape xmlns:r="http://schemas.openxmlformats.org/officeDocument/2006/relationships" r:blip="">
+                      <dgm:adjLst/>
+                    </dgm:shape>
+                    <dgm:presOf/>
+                    <dgm:constrLst>
+                      <dgm:constr type="alignOff"/>
+                      <dgm:constr type="bendDist" for="des" ptType="parTrans" refType="sp" fact="0.5"/>
+                    </dgm:constrLst>
+                  </dgm:if>
+                  <dgm:if name="Name70" func="var" arg="hierBranch" op="equ" val="init">
+                    <dgm:choose name="Name71">
+                      <dgm:if name="Name72" axis="des" func="maxDepth" op="lte" val="1">
+                        <dgm:choose name="Name73">
+                          <dgm:if name="Name74" axis="ch" ptType="asst" func="cnt" op="gte" val="1">
+                            <dgm:alg type="hierRoot">
+                              <dgm:param type="hierAlign" val="tL"/>
+                            </dgm:alg>
+                            <dgm:shape xmlns:r="http://schemas.openxmlformats.org/officeDocument/2006/relationships" r:blip="">
+                              <dgm:adjLst/>
+                            </dgm:shape>
+                            <dgm:presOf/>
+                            <dgm:constrLst>
+                              <dgm:constr type="alignOff" val="0.65"/>
+                            </dgm:constrLst>
+                          </dgm:if>
+                          <dgm:else name="Name75">
+                            <dgm:alg type="hierRoot">
+                              <dgm:param type="hierAlign" val="tL"/>
+                            </dgm:alg>
+                            <dgm:shape xmlns:r="http://schemas.openxmlformats.org/officeDocument/2006/relationships" r:blip="">
+                              <dgm:adjLst/>
+                            </dgm:shape>
+                            <dgm:presOf/>
+                            <dgm:constrLst>
+                              <dgm:constr type="alignOff" val="0.25"/>
+                            </dgm:constrLst>
+                          </dgm:else>
+                        </dgm:choose>
+                      </dgm:if>
+                      <dgm:else name="Name76">
+                        <dgm:alg type="hierRoot"/>
+                        <dgm:shape xmlns:r="http://schemas.openxmlformats.org/officeDocument/2006/relationships" r:blip="">
+                          <dgm:adjLst/>
+                        </dgm:shape>
+                        <dgm:presOf/>
+                        <dgm:constrLst>
+                          <dgm:constr type="alignOff"/>
+                          <dgm:constr type="bendDist" for="des" ptType="parTrans" refType="sp" fact="0.5"/>
+                        </dgm:constrLst>
+                      </dgm:else>
+                    </dgm:choose>
+                  </dgm:if>
+                  <dgm:else name="Name77">
+                    <dgm:alg type="hierRoot"/>
+                    <dgm:shape xmlns:r="http://schemas.openxmlformats.org/officeDocument/2006/relationships" r:blip="">
+                      <dgm:adjLst/>
+                    </dgm:shape>
+                    <dgm:presOf/>
+                    <dgm:constrLst>
+                      <dgm:constr type="alignOff" val="0.65"/>
+                    </dgm:constrLst>
+                  </dgm:else>
+                </dgm:choose>
+                <dgm:ruleLst/>
+                <dgm:layoutNode name="rootComposite">
+                  <dgm:alg type="composite"/>
+                  <dgm:shape xmlns:r="http://schemas.openxmlformats.org/officeDocument/2006/relationships" r:blip="">
+                    <dgm:adjLst/>
+                  </dgm:shape>
+                  <dgm:presOf axis="self" ptType="node" cnt="1"/>
+                  <dgm:choose name="Name78">
+                    <dgm:if name="Name79" func="var" arg="hierBranch" op="equ" val="init">
+                      <dgm:constrLst>
+                        <dgm:constr type="l" for="ch" forName="rootText"/>
+                        <dgm:constr type="t" for="ch" forName="rootText"/>
+                        <dgm:constr type="w" for="ch" forName="rootText" refType="w"/>
+                        <dgm:constr type="h" for="ch" forName="rootText" refType="h"/>
+                        <dgm:constr type="lMarg" for="ch" forName="rootText" refType="w" fact="1.05"/>
+                        <dgm:constr type="l" for="ch" forName="rootPict" refType="w" fact="0.05"/>
+                        <dgm:constr type="t" for="ch" forName="rootPict" refType="h" refFor="ch" refForName="rootText" fact="0.1"/>
+                        <dgm:constr type="w" for="ch" forName="rootPict" refType="w" fact="0.3"/>
+                        <dgm:constr type="h" for="ch" forName="rootPict" refType="h" refFor="ch" refForName="rootText" fact="0.8"/>
+                        <dgm:constr type="l" for="ch" forName="rootConnector"/>
+                        <dgm:constr type="t" for="ch" forName="rootConnector"/>
+                        <dgm:constr type="w" for="ch" forName="rootConnector" refType="w" refFor="ch" refForName="rootText" fact="0.2"/>
+                        <dgm:constr type="h" for="ch" forName="rootConnector" refType="h" refFor="ch" refForName="rootText"/>
+                      </dgm:constrLst>
+                    </dgm:if>
+                    <dgm:if name="Name80" func="var" arg="hierBranch" op="equ" val="l">
+                      <dgm:constrLst>
+                        <dgm:constr type="l" for="ch" forName="rootText"/>
+                        <dgm:constr type="t" for="ch" forName="rootText"/>
+                        <dgm:constr type="w" for="ch" forName="rootText" refType="w"/>
+                        <dgm:constr type="h" for="ch" forName="rootText" refType="h"/>
+                        <dgm:constr type="lMarg" for="ch" forName="rootText" refType="w" fact="1.05"/>
+                        <dgm:constr type="l" for="ch" forName="rootPict" refType="w" fact="0.05"/>
+                        <dgm:constr type="t" for="ch" forName="rootPict" refType="h" refFor="ch" refForName="rootText" fact="0.1"/>
+                        <dgm:constr type="w" for="ch" forName="rootPict" refType="w" fact="0.3"/>
+                        <dgm:constr type="h" for="ch" forName="rootPict" refType="h" refFor="ch" refForName="rootText" fact="0.8"/>
+                        <dgm:constr type="r" for="ch" forName="rootConnector" refType="w"/>
+                        <dgm:constr type="t" for="ch" forName="rootConnector"/>
+                        <dgm:constr type="w" for="ch" forName="rootConnector" refType="w" refFor="ch" refForName="rootText" fact="0.2"/>
+                        <dgm:constr type="h" for="ch" forName="rootConnector" refType="h" refFor="ch" refForName="rootText"/>
+                      </dgm:constrLst>
+                    </dgm:if>
+                    <dgm:if name="Name81" func="var" arg="hierBranch" op="equ" val="r">
+                      <dgm:constrLst>
+                        <dgm:constr type="l" for="ch" forName="rootText"/>
+                        <dgm:constr type="t" for="ch" forName="rootText"/>
+                        <dgm:constr type="w" for="ch" forName="rootText" refType="w"/>
+                        <dgm:constr type="h" for="ch" forName="rootText" refType="h"/>
+                        <dgm:constr type="lMarg" for="ch" forName="rootText" refType="w" fact="1.05"/>
+                        <dgm:constr type="l" for="ch" forName="rootPict" refType="w" fact="0.05"/>
+                        <dgm:constr type="t" for="ch" forName="rootPict" refType="h" refFor="ch" refForName="rootText" fact="0.1"/>
+                        <dgm:constr type="w" for="ch" forName="rootPict" refType="w" fact="0.3"/>
+                        <dgm:constr type="h" for="ch" forName="rootPict" refType="h" refFor="ch" refForName="rootText" fact="0.8"/>
+                        <dgm:constr type="l" for="ch" forName="rootConnector"/>
+                        <dgm:constr type="t" for="ch" forName="rootConnector"/>
+                        <dgm:constr type="w" for="ch" forName="rootConnector" refType="w" refFor="ch" refForName="rootText" fact="0.2"/>
+                        <dgm:constr type="h" for="ch" forName="rootConnector" refType="h" refFor="ch" refForName="rootText"/>
+                      </dgm:constrLst>
+                    </dgm:if>
+                    <dgm:else name="Name82">
+                      <dgm:constrLst>
+                        <dgm:constr type="l" for="ch" forName="rootText"/>
+                        <dgm:constr type="t" for="ch" forName="rootText"/>
+                        <dgm:constr type="w" for="ch" forName="rootText" refType="w"/>
+                        <dgm:constr type="h" for="ch" forName="rootText" refType="h"/>
+                        <dgm:constr type="lMarg" for="ch" forName="rootText" refType="w" fact="1.05"/>
+                        <dgm:constr type="l" for="ch" forName="rootPict" refType="w" fact="0.05"/>
+                        <dgm:constr type="t" for="ch" forName="rootPict" refType="h" refFor="ch" refForName="rootText" fact="0.1"/>
+                        <dgm:constr type="w" for="ch" forName="rootPict" refType="w" fact="0.3"/>
+                        <dgm:constr type="h" for="ch" forName="rootPict" refType="h" refFor="ch" refForName="rootText" fact="0.8"/>
+                        <dgm:constr type="r" for="ch" forName="rootConnector" refType="w"/>
+                        <dgm:constr type="t" for="ch" forName="rootConnector"/>
+                        <dgm:constr type="w" for="ch" forName="rootConnector" refType="w" refFor="ch" refForName="rootText" fact="0.2"/>
+                        <dgm:constr type="h" for="ch" forName="rootConnector" refType="h" refFor="ch" refForName="rootText"/>
+                      </dgm:constrLst>
+                    </dgm:else>
+                  </dgm:choose>
+                  <dgm:ruleLst/>
+                  <dgm:layoutNode name="rootText">
+                    <dgm:varLst>
+                      <dgm:chPref val="3"/>
+                    </dgm:varLst>
+                    <dgm:alg type="tx"/>
+                    <dgm:shape xmlns:r="http://schemas.openxmlformats.org/officeDocument/2006/relationships" type="rect" r:blip="">
+                      <dgm:adjLst/>
+                    </dgm:shape>
+                    <dgm:presOf axis="self" ptType="node" cnt="1"/>
+                    <dgm:constrLst>
+                      <dgm:constr type="primFontSz" val="65"/>
+                      <dgm:constr type="lMarg" refType="primFontSz" fact="0.05"/>
+                      <dgm:constr type="rMarg" refType="primFontSz" fact="0.05"/>
+                      <dgm:constr type="tMarg" refType="primFontSz" fact="0.05"/>
+                      <dgm:constr type="bMarg" refType="primFontSz" fact="0.05"/>
+                    </dgm:constrLst>
+                    <dgm:ruleLst>
+                      <dgm:rule type="primFontSz" val="5" fact="NaN" max="NaN"/>
+                    </dgm:ruleLst>
+                  </dgm:layoutNode>
+                  <dgm:layoutNode name="rootPict" styleLbl="alignImgPlace1">
+                    <dgm:alg type="sp"/>
+                    <dgm:shape xmlns:r="http://schemas.openxmlformats.org/officeDocument/2006/relationships" type="rect" r:blip="" blipPhldr="1">
+                      <dgm:adjLst/>
+                    </dgm:shape>
+                    <dgm:presOf/>
+                    <dgm:constrLst/>
+                    <dgm:ruleLst/>
+                  </dgm:layoutNode>
+                  <dgm:layoutNode name="rootConnector" moveWith="rootText">
+                    <dgm:alg type="sp"/>
+                    <dgm:shape xmlns:r="http://schemas.openxmlformats.org/officeDocument/2006/relationships" type="rect" r:blip="" hideGeom="1">
+                      <dgm:adjLst/>
+                    </dgm:shape>
+                    <dgm:presOf axis="self" ptType="node" cnt="1"/>
+                    <dgm:constrLst/>
+                    <dgm:ruleLst/>
+                  </dgm:layoutNode>
+                </dgm:layoutNode>
+                <dgm:layoutNode name="hierChild4">
+                  <dgm:choose name="Name83">
+                    <dgm:if name="Name84" func="var" arg="hierBranch" op="equ" val="l">
+                      <dgm:alg type="hierChild">
+                        <dgm:param type="chAlign" val="r"/>
+                        <dgm:param type="linDir" val="fromT"/>
+                      </dgm:alg>
+                    </dgm:if>
+                    <dgm:if name="Name85" func="var" arg="hierBranch" op="equ" val="r">
+                      <dgm:alg type="hierChild">
+                        <dgm:param type="chAlign" val="l"/>
+                        <dgm:param type="linDir" val="fromT"/>
+                      </dgm:alg>
+                    </dgm:if>
+                    <dgm:if name="Name86" func="var" arg="hierBranch" op="equ" val="hang">
+                      <dgm:choose name="Name87">
+                        <dgm:if name="Name88" func="var" arg="dir" op="equ" val="norm">
+                          <dgm:alg type="hierChild">
+                            <dgm:param type="chAlign" val="l"/>
+                            <dgm:param type="linDir" val="fromL"/>
+                            <dgm:param type="secChAlign" val="t"/>
+                            <dgm:param type="secLinDir" val="fromT"/>
+                          </dgm:alg>
+                        </dgm:if>
+                        <dgm:else name="Name89">
+                          <dgm:alg type="hierChild">
+                            <dgm:param type="chAlign" val="l"/>
+                            <dgm:param type="linDir" val="fromR"/>
+                            <dgm:param type="secChAlign" val="t"/>
+                            <dgm:param type="secLinDir" val="fromT"/>
+                          </dgm:alg>
+                        </dgm:else>
+                      </dgm:choose>
+                    </dgm:if>
+                    <dgm:if name="Name90" func="var" arg="hierBranch" op="equ" val="std">
+                      <dgm:choose name="Name91">
+                        <dgm:if name="Name92" func="var" arg="dir" op="equ" val="norm">
+                          <dgm:alg type="hierChild"/>
+                        </dgm:if>
+                        <dgm:else name="Name93">
+                          <dgm:alg type="hierChild">
+                            <dgm:param type="linDir" val="fromR"/>
+                          </dgm:alg>
+                        </dgm:else>
+                      </dgm:choose>
+                    </dgm:if>
+                    <dgm:if name="Name94" func="var" arg="hierBranch" op="equ" val="init">
+                      <dgm:choose name="Name95">
+                        <dgm:if name="Name96" axis="des" func="maxDepth" op="lte" val="1">
+                          <dgm:alg type="hierChild">
+                            <dgm:param type="chAlign" val="l"/>
+                            <dgm:param type="linDir" val="fromT"/>
+                          </dgm:alg>
+                        </dgm:if>
+                        <dgm:else name="Name97">
+                          <dgm:choose name="Name98">
+                            <dgm:if name="Name99" func="var" arg="dir" op="equ" val="norm">
+                              <dgm:alg type="hierChild"/>
+                            </dgm:if>
+                            <dgm:else name="Name100">
+                              <dgm:alg type="hierChild">
+                                <dgm:param type="linDir" val="fromR"/>
+                              </dgm:alg>
+                            </dgm:else>
+                          </dgm:choose>
+                        </dgm:else>
+                      </dgm:choose>
+                    </dgm:if>
+                    <dgm:else name="Name101"/>
+                  </dgm:choose>
+                  <dgm:shape xmlns:r="http://schemas.openxmlformats.org/officeDocument/2006/relationships" r:blip="">
+                    <dgm:adjLst/>
+                  </dgm:shape>
+                  <dgm:presOf/>
+                  <dgm:constrLst/>
+                  <dgm:ruleLst/>
+                  <dgm:forEach name="Name102" ref="rep2a"/>
+                </dgm:layoutNode>
+                <dgm:layoutNode name="hierChild5">
+                  <dgm:choose name="Name103">
+                    <dgm:if name="Name104" func="var" arg="dir" op="equ" val="norm">
+                      <dgm:alg type="hierChild">
+                        <dgm:param type="chAlign" val="l"/>
+                        <dgm:param type="linDir" val="fromL"/>
+                        <dgm:param type="secChAlign" val="t"/>
+                        <dgm:param type="secLinDir" val="fromT"/>
+                      </dgm:alg>
+                    </dgm:if>
+                    <dgm:else name="Name105">
+                      <dgm:alg type="hierChild">
+                        <dgm:param type="chAlign" val="l"/>
+                        <dgm:param type="linDir" val="fromR"/>
+                        <dgm:param type="secChAlign" val="t"/>
+                        <dgm:param type="secLinDir" val="fromT"/>
+                      </dgm:alg>
+                    </dgm:else>
+                  </dgm:choose>
+                  <dgm:shape xmlns:r="http://schemas.openxmlformats.org/officeDocument/2006/relationships" r:blip="">
+                    <dgm:adjLst/>
+                  </dgm:shape>
+                  <dgm:presOf/>
+                  <dgm:constrLst/>
+                  <dgm:ruleLst/>
+                  <dgm:forEach name="Name106" ref="rep2b"/>
+                </dgm:layoutNode>
+              </dgm:layoutNode>
+            </dgm:forEach>
+          </dgm:layoutNode>
+          <dgm:layoutNode name="hierChild3">
+            <dgm:choose name="Name107">
+              <dgm:if name="Name108" func="var" arg="dir" op="equ" val="norm">
+                <dgm:alg type="hierChild">
+                  <dgm:param type="chAlign" val="l"/>
+                  <dgm:param type="linDir" val="fromL"/>
+                  <dgm:param type="secChAlign" val="t"/>
+                  <dgm:param type="secLinDir" val="fromT"/>
+                </dgm:alg>
+              </dgm:if>
+              <dgm:else name="Name109">
+                <dgm:alg type="hierChild">
+                  <dgm:param type="chAlign" val="l"/>
+                  <dgm:param type="linDir" val="fromR"/>
+                  <dgm:param type="secChAlign" val="t"/>
+                  <dgm:param type="secLinDir" val="fromT"/>
+                </dgm:alg>
+              </dgm:else>
+            </dgm:choose>
+            <dgm:shape xmlns:r="http://schemas.openxmlformats.org/officeDocument/2006/relationships" r:blip="">
+              <dgm:adjLst/>
+            </dgm:shape>
+            <dgm:presOf/>
+            <dgm:constrLst/>
+            <dgm:ruleLst/>
+            <dgm:forEach name="rep2b" axis="ch" ptType="asst">
+              <dgm:forEach name="Name110" axis="precedSib" ptType="parTrans" st="-1" cnt="1">
+                <dgm:layoutNode name="Name111">
+                  <dgm:alg type="conn">
+                    <dgm:param type="connRout" val="bend"/>
+                    <dgm:param type="dim" val="1D"/>
+                    <dgm:param type="endSty" val="noArr"/>
+                    <dgm:param type="begPts" val="bCtr"/>
+                    <dgm:param type="endPts" val="midL midR"/>
+                  </dgm:alg>
+                  <dgm:shape xmlns:r="http://schemas.openxmlformats.org/officeDocument/2006/relationships" type="conn" r:blip="" zOrderOff="-99999">
+                    <dgm:adjLst/>
+                  </dgm:shape>
+                  <dgm:presOf axis="self"/>
+                  <dgm:constrLst>
+                    <dgm:constr type="begPad"/>
+                    <dgm:constr type="endPad"/>
+                  </dgm:constrLst>
+                  <dgm:ruleLst/>
+                </dgm:layoutNode>
+              </dgm:forEach>
+              <dgm:layoutNode name="hierRoot3">
+                <dgm:varLst>
+                  <dgm:hierBranch val="init"/>
+                </dgm:varLst>
+                <dgm:choose name="Name112">
+                  <dgm:if name="Name113" func="var" arg="hierBranch" op="equ" val="l">
+                    <dgm:alg type="hierRoot">
+                      <dgm:param type="hierAlign" val="tR"/>
+                    </dgm:alg>
+                    <dgm:shape xmlns:r="http://schemas.openxmlformats.org/officeDocument/2006/relationships" r:blip="">
+                      <dgm:adjLst/>
+                    </dgm:shape>
+                    <dgm:presOf/>
+                    <dgm:constrLst>
+                      <dgm:constr type="alignOff" val="0.65"/>
+                    </dgm:constrLst>
+                  </dgm:if>
+                  <dgm:if name="Name114" func="var" arg="hierBranch" op="equ" val="r">
+                    <dgm:alg type="hierRoot">
+                      <dgm:param type="hierAlign" val="tL"/>
+                    </dgm:alg>
+                    <dgm:shape xmlns:r="http://schemas.openxmlformats.org/officeDocument/2006/relationships" r:blip="">
+                      <dgm:adjLst/>
+                    </dgm:shape>
+                    <dgm:presOf/>
+                    <dgm:constrLst>
+                      <dgm:constr type="alignOff" val="0.65"/>
+                    </dgm:constrLst>
+                  </dgm:if>
+                  <dgm:if name="Name115" func="var" arg="hierBranch" op="equ" val="hang">
+                    <dgm:alg type="hierRoot"/>
+                    <dgm:shape xmlns:r="http://schemas.openxmlformats.org/officeDocument/2006/relationships" r:blip="">
+                      <dgm:adjLst/>
+                    </dgm:shape>
+                    <dgm:presOf/>
+                    <dgm:constrLst>
+                      <dgm:constr type="alignOff" val="0.65"/>
+                    </dgm:constrLst>
+                  </dgm:if>
+                  <dgm:if name="Name116" func="var" arg="hierBranch" op="equ" val="std">
+                    <dgm:alg type="hierRoot"/>
+                    <dgm:shape xmlns:r="http://schemas.openxmlformats.org/officeDocument/2006/relationships" r:blip="">
+                      <dgm:adjLst/>
+                    </dgm:shape>
+                    <dgm:presOf/>
+                    <dgm:constrLst>
+                      <dgm:constr type="alignOff"/>
+                      <dgm:constr type="bendDist" for="des" ptType="parTrans" refType="sp" fact="0.5"/>
+                    </dgm:constrLst>
+                  </dgm:if>
+                  <dgm:if name="Name117" func="var" arg="hierBranch" op="equ" val="init">
+                    <dgm:choose name="Name118">
+                      <dgm:if name="Name119" axis="des" func="maxDepth" op="lte" val="1">
+                        <dgm:alg type="hierRoot">
+                          <dgm:param type="hierAlign" val="tL"/>
+                        </dgm:alg>
+                        <dgm:shape xmlns:r="http://schemas.openxmlformats.org/officeDocument/2006/relationships" r:blip="">
+                          <dgm:adjLst/>
+                        </dgm:shape>
+                        <dgm:presOf/>
+                        <dgm:constrLst>
+                          <dgm:constr type="alignOff" val="0.65"/>
+                        </dgm:constrLst>
+                      </dgm:if>
+                      <dgm:else name="Name120">
+                        <dgm:alg type="hierRoot"/>
+                        <dgm:shape xmlns:r="http://schemas.openxmlformats.org/officeDocument/2006/relationships" r:blip="">
+                          <dgm:adjLst/>
+                        </dgm:shape>
+                        <dgm:presOf/>
+                        <dgm:constrLst>
+                          <dgm:constr type="alignOff"/>
+                          <dgm:constr type="bendDist" for="des" ptType="parTrans" refType="sp" fact="0.5"/>
+                        </dgm:constrLst>
+                      </dgm:else>
+                    </dgm:choose>
+                  </dgm:if>
+                  <dgm:else name="Name121"/>
+                </dgm:choose>
+                <dgm:ruleLst/>
+                <dgm:layoutNode name="rootComposite3">
+                  <dgm:alg type="composite"/>
+                  <dgm:shape xmlns:r="http://schemas.openxmlformats.org/officeDocument/2006/relationships" r:blip="">
+                    <dgm:adjLst/>
+                  </dgm:shape>
+                  <dgm:presOf axis="self" ptType="node" cnt="1"/>
+                  <dgm:choose name="Name122">
+                    <dgm:if name="Name123" func="var" arg="hierBranch" op="equ" val="init">
+                      <dgm:constrLst>
+                        <dgm:constr type="l" for="ch" forName="rootText3"/>
+                        <dgm:constr type="t" for="ch" forName="rootText3"/>
+                        <dgm:constr type="w" for="ch" forName="rootText3" refType="w"/>
+                        <dgm:constr type="h" for="ch" forName="rootText3" refType="h"/>
+                        <dgm:constr type="lMarg" for="ch" forName="rootText3" refType="w" fact="1.05"/>
+                        <dgm:constr type="l" for="ch" forName="rootPict3" refType="w" fact="0.05"/>
+                        <dgm:constr type="t" for="ch" forName="rootPict3" refType="h" refFor="ch" refForName="rootText3" fact="0.1"/>
+                        <dgm:constr type="w" for="ch" forName="rootPict3" refType="w" fact="0.3"/>
+                        <dgm:constr type="h" for="ch" forName="rootPict3" refType="h" refFor="ch" refForName="rootText3" fact="0.8"/>
+                        <dgm:constr type="l" for="ch" forName="rootConnector3"/>
+                        <dgm:constr type="t" for="ch" forName="rootConnector3"/>
+                        <dgm:constr type="w" for="ch" forName="rootConnector3" refType="w" refFor="ch" refForName="rootText3" fact="0.2"/>
+                        <dgm:constr type="h" for="ch" forName="rootConnector3" refType="h" refFor="ch" refForName="rootText3"/>
+                      </dgm:constrLst>
+                    </dgm:if>
+                    <dgm:if name="Name124" func="var" arg="hierBranch" op="equ" val="l">
+                      <dgm:constrLst>
+                        <dgm:constr type="l" for="ch" forName="rootText3"/>
+                        <dgm:constr type="t" for="ch" forName="rootText3"/>
+                        <dgm:constr type="w" for="ch" forName="rootText3" refType="w"/>
+                        <dgm:constr type="h" for="ch" forName="rootText3" refType="h"/>
+                        <dgm:constr type="lMarg" for="ch" forName="rootText3" refType="w" fact="1.05"/>
+                        <dgm:constr type="l" for="ch" forName="rootPict3" refType="w" fact="0.05"/>
+                        <dgm:constr type="t" for="ch" forName="rootPict3" refType="h" refFor="ch" refForName="rootText3" fact="0.1"/>
+                        <dgm:constr type="w" for="ch" forName="rootPict3" refType="w" fact="0.3"/>
+                        <dgm:constr type="h" for="ch" forName="rootPict3" refType="h" refFor="ch" refForName="rootText3" fact="0.8"/>
+                        <dgm:constr type="r" for="ch" forName="rootConnector3" refType="w"/>
+                        <dgm:constr type="t" for="ch" forName="rootConnector3"/>
+                        <dgm:constr type="w" for="ch" forName="rootConnector3" refType="w" refFor="ch" refForName="rootText3" fact="0.2"/>
+                        <dgm:constr type="h" for="ch" forName="rootConnector3" refType="h" refFor="ch" refForName="rootText3"/>
+                      </dgm:constrLst>
+                    </dgm:if>
+                    <dgm:if name="Name125" func="var" arg="hierBranch" op="equ" val="r">
+                      <dgm:constrLst>
+                        <dgm:constr type="l" for="ch" forName="rootText3"/>
+                        <dgm:constr type="t" for="ch" forName="rootText3"/>
+                        <dgm:constr type="w" for="ch" forName="rootText3" refType="w"/>
+                        <dgm:constr type="h" for="ch" forName="rootText3" refType="h"/>
+                        <dgm:constr type="lMarg" for="ch" forName="rootText3" refType="w" fact="1.05"/>
+                        <dgm:constr type="l" for="ch" forName="rootPict3" refType="w" fact="0.05"/>
+                        <dgm:constr type="t" for="ch" forName="rootPict3" refType="h" refFor="ch" refForName="rootText3" fact="0.1"/>
+                        <dgm:constr type="w" for="ch" forName="rootPict3" refType="w" fact="0.3"/>
+                        <dgm:constr type="h" for="ch" forName="rootPict3" refType="h" refFor="ch" refForName="rootText3" fact="0.8"/>
+                        <dgm:constr type="l" for="ch" forName="rootConnector3"/>
+                        <dgm:constr type="t" for="ch" forName="rootConnector3"/>
+                        <dgm:constr type="w" for="ch" forName="rootConnector3" refType="w" refFor="ch" refForName="rootText3" fact="0.2"/>
+                        <dgm:constr type="h" for="ch" forName="rootConnector3" refType="h" refFor="ch" refForName="rootText3"/>
+                      </dgm:constrLst>
+                    </dgm:if>
+                    <dgm:else name="Name126">
+                      <dgm:constrLst>
+                        <dgm:constr type="l" for="ch" forName="rootText3"/>
+                        <dgm:constr type="t" for="ch" forName="rootText3"/>
+                        <dgm:constr type="w" for="ch" forName="rootText3" refType="w"/>
+                        <dgm:constr type="h" for="ch" forName="rootText3" refType="h"/>
+                        <dgm:constr type="lMarg" for="ch" forName="rootText3" refType="w" fact="1.05"/>
+                        <dgm:constr type="l" for="ch" forName="rootPict3" refType="w" fact="0.05"/>
+                        <dgm:constr type="t" for="ch" forName="rootPict3" refType="h" refFor="ch" refForName="rootText3" fact="0.1"/>
+                        <dgm:constr type="w" for="ch" forName="rootPict3" refType="w" fact="0.3"/>
+                        <dgm:constr type="h" for="ch" forName="rootPict3" refType="h" refFor="ch" refForName="rootText3" fact="0.8"/>
+                        <dgm:constr type="r" for="ch" forName="rootConnector3" refType="w"/>
+                        <dgm:constr type="t" for="ch" forName="rootConnector3"/>
+                        <dgm:constr type="w" for="ch" forName="rootConnector3" refType="w" refFor="ch" refForName="rootText3" fact="0.2"/>
+                        <dgm:constr type="h" for="ch" forName="rootConnector3" refType="h" refFor="ch" refForName="rootText3"/>
+                      </dgm:constrLst>
+                    </dgm:else>
+                  </dgm:choose>
+                  <dgm:ruleLst/>
+                  <dgm:layoutNode name="rootText3">
+                    <dgm:varLst>
+                      <dgm:chPref val="3"/>
+                    </dgm:varLst>
+                    <dgm:alg type="tx"/>
+                    <dgm:shape xmlns:r="http://schemas.openxmlformats.org/officeDocument/2006/relationships" type="rect" r:blip="">
+                      <dgm:adjLst/>
+                    </dgm:shape>
+                    <dgm:presOf axis="self" ptType="node" cnt="1"/>
+                    <dgm:constrLst>
+                      <dgm:constr type="primFontSz" val="65"/>
+                      <dgm:constr type="lMarg" refType="primFontSz" fact="0.05"/>
+                      <dgm:constr type="rMarg" refType="primFontSz" fact="0.05"/>
+                      <dgm:constr type="tMarg" refType="primFontSz" fact="0.05"/>
+                      <dgm:constr type="bMarg" refType="primFontSz" fact="0.05"/>
+                    </dgm:constrLst>
+                    <dgm:ruleLst>
+                      <dgm:rule type="primFontSz" val="5" fact="NaN" max="NaN"/>
+                    </dgm:ruleLst>
+                  </dgm:layoutNode>
+                  <dgm:layoutNode name="rootPict3" styleLbl="alignImgPlace1">
+                    <dgm:alg type="sp"/>
+                    <dgm:shape xmlns:r="http://schemas.openxmlformats.org/officeDocument/2006/relationships" type="rect" r:blip="" blipPhldr="1">
+                      <dgm:adjLst/>
+                    </dgm:shape>
+                    <dgm:presOf/>
+                    <dgm:constrLst/>
+                    <dgm:ruleLst/>
+                  </dgm:layoutNode>
+                  <dgm:layoutNode name="rootConnector3" moveWith="rootText1">
+                    <dgm:alg type="sp"/>
+                    <dgm:shape xmlns:r="http://schemas.openxmlformats.org/officeDocument/2006/relationships" type="rect" r:blip="" hideGeom="1">
+                      <dgm:adjLst/>
+                    </dgm:shape>
+                    <dgm:presOf axis="self" ptType="node" cnt="1"/>
+                    <dgm:constrLst/>
+                    <dgm:ruleLst/>
+                  </dgm:layoutNode>
+                </dgm:layoutNode>
+                <dgm:layoutNode name="hierChild6">
+                  <dgm:choose name="Name127">
+                    <dgm:if name="Name128" func="var" arg="hierBranch" op="equ" val="l">
+                      <dgm:alg type="hierChild">
+                        <dgm:param type="chAlign" val="r"/>
+                        <dgm:param type="linDir" val="fromT"/>
+                      </dgm:alg>
+                    </dgm:if>
+                    <dgm:if name="Name129" func="var" arg="hierBranch" op="equ" val="r">
+                      <dgm:alg type="hierChild">
+                        <dgm:param type="chAlign" val="l"/>
+                        <dgm:param type="linDir" val="fromT"/>
+                      </dgm:alg>
+                    </dgm:if>
+                    <dgm:if name="Name130" func="var" arg="hierBranch" op="equ" val="hang">
+                      <dgm:choose name="Name131">
+                        <dgm:if name="Name132" func="var" arg="dir" op="equ" val="norm">
+                          <dgm:alg type="hierChild">
+                            <dgm:param type="chAlign" val="l"/>
+                            <dgm:param type="linDir" val="fromL"/>
+                            <dgm:param type="secChAlign" val="t"/>
+                            <dgm:param type="secLinDir" val="fromT"/>
+                          </dgm:alg>
+                        </dgm:if>
+                        <dgm:else name="Name133">
+                          <dgm:alg type="hierChild">
+                            <dgm:param type="chAlign" val="l"/>
+                            <dgm:param type="linDir" val="fromR"/>
+                            <dgm:param type="secChAlign" val="t"/>
+                            <dgm:param type="secLinDir" val="fromT"/>
+                          </dgm:alg>
+                        </dgm:else>
+                      </dgm:choose>
+                    </dgm:if>
+                    <dgm:if name="Name134" func="var" arg="hierBranch" op="equ" val="std">
+                      <dgm:choose name="Name135">
+                        <dgm:if name="Name136" func="var" arg="dir" op="equ" val="norm">
+                          <dgm:alg type="hierChild"/>
+                        </dgm:if>
+                        <dgm:else name="Name137">
+                          <dgm:alg type="hierChild">
+                            <dgm:param type="linDir" val="fromR"/>
+                          </dgm:alg>
+                        </dgm:else>
+                      </dgm:choose>
+                    </dgm:if>
+                    <dgm:if name="Name138" func="var" arg="hierBranch" op="equ" val="init">
+                      <dgm:choose name="Name139">
+                        <dgm:if name="Name140" axis="des" func="maxDepth" op="lte" val="1">
+                          <dgm:alg type="hierChild">
+                            <dgm:param type="chAlign" val="l"/>
+                            <dgm:param type="linDir" val="fromT"/>
+                          </dgm:alg>
+                        </dgm:if>
+                        <dgm:else name="Name141">
+                          <dgm:alg type="hierChild"/>
+                        </dgm:else>
+                      </dgm:choose>
+                    </dgm:if>
+                    <dgm:else name="Name142"/>
+                  </dgm:choose>
+                  <dgm:shape xmlns:r="http://schemas.openxmlformats.org/officeDocument/2006/relationships" r:blip="">
+                    <dgm:adjLst/>
+                  </dgm:shape>
+                  <dgm:presOf/>
+                  <dgm:constrLst/>
+                  <dgm:ruleLst/>
+                  <dgm:forEach name="Name143" ref="rep2a"/>
+                </dgm:layoutNode>
+                <dgm:layoutNode name="hierChild7">
+                  <dgm:choose name="Name144">
+                    <dgm:if name="Name145" func="var" arg="dir" op="equ" val="norm">
+                      <dgm:alg type="hierChild">
+                        <dgm:param type="chAlign" val="l"/>
+                        <dgm:param type="linDir" val="fromL"/>
+                        <dgm:param type="secChAlign" val="t"/>
+                        <dgm:param type="secLinDir" val="fromT"/>
+                      </dgm:alg>
+                    </dgm:if>
+                    <dgm:else name="Name146">
+                      <dgm:alg type="hierChild">
+                        <dgm:param type="chAlign" val="l"/>
+                        <dgm:param type="linDir" val="fromR"/>
+                        <dgm:param type="secChAlign" val="t"/>
+                        <dgm:param type="secLinDir" val="fromT"/>
+                      </dgm:alg>
+                    </dgm:else>
+                  </dgm:choose>
+                  <dgm:shape xmlns:r="http://schemas.openxmlformats.org/officeDocument/2006/relationships" r:blip="">
+                    <dgm:adjLst/>
+                  </dgm:shape>
+                  <dgm:presOf/>
+                  <dgm:constrLst/>
+                  <dgm:ruleLst/>
+                  <dgm:forEach name="Name147" ref="rep2b"/>
+                </dgm:layoutNode>
+              </dgm:layoutNode>
+            </dgm:forEach>
+          </dgm:layoutNode>
+        </dgm:layoutNode>
+      </dgm:forEach>
+    </dgm:forEach>
+  </dgm:layoutNode>
+</dgm:layoutDef>
+</file>
+
+<file path=ppt/diagrams/quickStyle1.xml><?xml version="1.0" encoding="utf-8"?>
+<dgm:styleDef xmlns:dgm="http://schemas.openxmlformats.org/drawingml/2006/diagram" xmlns:a="http://schemas.openxmlformats.org/drawingml/2006/main" uniqueId="urn:microsoft.com/office/officeart/2005/8/quickstyle/simple1">
+  <dgm:title val=""/>
+  <dgm:desc val=""/>
+  <dgm:catLst>
+    <dgm:cat type="simple" pri="10100"/>
+  </dgm:catLst>
+  <dgm:scene3d>
+    <a:camera prst="orthographicFront"/>
+    <a:lightRig rig="threePt" dir="t"/>
+  </dgm:scene3d>
+  <dgm:styleLbl name="node0">
+    <dgm:scene3d>
+      <a:camera prst="orthographicFront"/>
+      <a:lightRig rig="threePt" dir="t"/>
+    </dgm:scene3d>
+    <dgm:sp3d/>
+    <dgm:txPr/>
+    <dgm:style>
+      <a:lnRef idx="2">
+        <a:scrgbClr r="0" g="0" b="0"/>
+      </a:lnRef>
+      <a:fillRef idx="1">
+        <a:scrgbClr r="0" g="0" b="0"/>
+      </a:fillRef>
+      <a:effectRef idx="0">
+        <a:scrgbClr r="0" g="0" b="0"/>
+      </a:effectRef>
+      <a:fontRef idx="minor">
+        <a:schemeClr val="lt1"/>
+      </a:fontRef>
+    </dgm:style>
+  </dgm:styleLbl>
+  <dgm:styleLbl name="lnNode1">
+    <dgm:scene3d>
+      <a:camera prst="orthographicFront"/>
+      <a:lightRig rig="threePt" dir="t"/>
+    </dgm:scene3d>
+    <dgm:sp3d/>
+    <dgm:txPr/>
+    <dgm:style>
+      <a:lnRef idx="2">
+        <a:scrgbClr r="0" g="0" b="0"/>
+      </a:lnRef>
+      <a:fillRef idx="1">
+        <a:scrgbClr r="0" g="0" b="0"/>
+      </a:fillRef>
+      <a:effectRef idx="0">
+        <a:scrgbClr r="0" g="0" b="0"/>
+      </a:effectRef>
+      <a:fontRef idx="minor">
+        <a:schemeClr val="lt1"/>
+      </a:fontRef>
+    </dgm:style>
+  </dgm:styleLbl>
+  <dgm:styleLbl name="vennNode1">
+    <dgm:scene3d>
+      <a:camera prst="orthographicFront"/>
+      <a:lightRig rig="threePt" dir="t"/>
+    </dgm:scene3d>
+    <dgm:sp3d/>
+    <dgm:txPr/>
+    <dgm:style>
+      <a:lnRef idx="2">
+        <a:scrgbClr r="0" g="0" b="0"/>
+      </a:lnRef>
+      <a:fillRef idx="1">
+        <a:scrgbClr r="0" g="0" b="0"/>
+      </a:fillRef>
+      <a:effectRef idx="0">
+        <a:scrgbClr r="0" g="0" b="0"/>
+      </a:effectRef>
+      <a:fontRef idx="minor">
+        <a:schemeClr val="tx1"/>
+      </a:fontRef>
+    </dgm:style>
+  </dgm:styleLbl>
+  <dgm:styleLbl name="alignNode1">
+    <dgm:scene3d>
+      <a:camera prst="orthographicFront"/>
+      <a:lightRig rig="threePt" dir="t"/>
+    </dgm:scene3d>
+    <dgm:sp3d/>
+    <dgm:txPr/>
+    <dgm:style>
+      <a:lnRef idx="2">
+        <a:scrgbClr r="0" g="0" b="0"/>
+      </a:lnRef>
+      <a:fillRef idx="1">
+        <a:scrgbClr r="0" g="0" b="0"/>
+      </a:fillRef>
+      <a:effectRef idx="0">
+        <a:scrgbClr r="0" g="0" b="0"/>
+      </a:effectRef>
+      <a:fontRef idx="minor">
+        <a:schemeClr val="lt1"/>
+      </a:fontRef>
+    </dgm:style>
+  </dgm:styleLbl>
+  <dgm:styleLbl name="node1">
+    <dgm:scene3d>
+      <a:camera prst="orthographicFront"/>
+      <a:lightRig rig="threePt" dir="t"/>
+    </dgm:scene3d>
+    <dgm:sp3d/>
+    <dgm:txPr/>
+    <dgm:style>
+      <a:lnRef idx="2">
+        <a:scrgbClr r="0" g="0" b="0"/>
+      </a:lnRef>
+      <a:fillRef idx="1">
+        <a:scrgbClr r="0" g="0" b="0"/>
+      </a:fillRef>
+      <a:effectRef idx="0">
+        <a:scrgbClr r="0" g="0" b="0"/>
+      </a:effectRef>
+      <a:fontRef idx="minor">
+        <a:schemeClr val="lt1"/>
+      </a:fontRef>
+    </dgm:style>
+  </dgm:styleLbl>
+  <dgm:styleLbl name="node2">
+    <dgm:scene3d>
+      <a:camera prst="orthographicFront"/>
+      <a:lightRig rig="threePt" dir="t"/>
+    </dgm:scene3d>
+    <dgm:sp3d/>
+    <dgm:txPr/>
+    <dgm:style>
+      <a:lnRef idx="2">
+        <a:scrgbClr r="0" g="0" b="0"/>
+      </a:lnRef>
+      <a:fillRef idx="1">
+        <a:scrgbClr r="0" g="0" b="0"/>
+      </a:fillRef>
+      <a:effectRef idx="0">
+        <a:scrgbClr r="0" g="0" b="0"/>
+      </a:effectRef>
+      <a:fontRef idx="minor">
+        <a:schemeClr val="lt1"/>
+      </a:fontRef>
+    </dgm:style>
+  </dgm:styleLbl>
+  <dgm:styleLbl name="node3">
+    <dgm:scene3d>
+      <a:camera prst="orthographicFront"/>
+      <a:lightRig rig="threePt" dir="t"/>
+    </dgm:scene3d>
+    <dgm:sp3d/>
+    <dgm:txPr/>
+    <dgm:style>
+      <a:lnRef idx="2">
+        <a:scrgbClr r="0" g="0" b="0"/>
+      </a:lnRef>
+      <a:fillRef idx="1">
+        <a:scrgbClr r="0" g="0" b="0"/>
+      </a:fillRef>
+      <a:effectRef idx="0">
+        <a:scrgbClr r="0" g="0" b="0"/>
+      </a:effectRef>
+      <a:fontRef idx="minor">
+        <a:schemeClr val="lt1"/>
+      </a:fontRef>
+    </dgm:style>
+  </dgm:styleLbl>
+  <dgm:styleLbl name="node4">
+    <dgm:scene3d>
+      <a:camera prst="orthographicFront"/>
+      <a:lightRig rig="threePt" dir="t"/>
+    </dgm:scene3d>
+    <dgm:sp3d/>
+    <dgm:txPr/>
+    <dgm:style>
+      <a:lnRef idx="2">
+        <a:scrgbClr r="0" g="0" b="0"/>
+      </a:lnRef>
+      <a:fillRef idx="1">
+        <a:scrgbClr r="0" g="0" b="0"/>
+      </a:fillRef>
+      <a:effectRef idx="0">
+        <a:scrgbClr r="0" g="0" b="0"/>
+      </a:effectRef>
+      <a:fontRef idx="minor">
+        <a:schemeClr val="lt1"/>
+      </a:fontRef>
+    </dgm:style>
+  </dgm:styleLbl>
+  <dgm:styleLbl name="fgImgPlace1">
+    <dgm:scene3d>
+      <a:camera prst="orthographicFront"/>
+      <a:lightRig rig="threePt" dir="t"/>
+    </dgm:scene3d>
+    <dgm:sp3d/>
+    <dgm:txPr/>
+    <dgm:style>
+      <a:lnRef idx="2">
+        <a:scrgbClr r="0" g="0" b="0"/>
+      </a:lnRef>
+      <a:fillRef idx="1">
+        <a:scrgbClr r="0" g="0" b="0"/>
+      </a:fillRef>
+      <a:effectRef idx="0">
+        <a:scrgbClr r="0" g="0" b="0"/>
+      </a:effectRef>
+      <a:fontRef idx="minor"/>
+    </dgm:style>
+  </dgm:styleLbl>
+  <dgm:styleLbl name="alignImgPlace1">
+    <dgm:scene3d>
+      <a:camera prst="orthographicFront"/>
+      <a:lightRig rig="threePt" dir="t"/>
+    </dgm:scene3d>
+    <dgm:sp3d/>
+    <dgm:txPr/>
+    <dgm:style>
+      <a:lnRef idx="2">
+        <a:scrgbClr r="0" g="0" b="0"/>
+      </a:lnRef>
+      <a:fillRef idx="1">
+        <a:scrgbClr r="0" g="0" b="0"/>
+      </a:fillRef>
+      <a:effectRef idx="0">
+        <a:scrgbClr r="0" g="0" b="0"/>
+      </a:effectRef>
+      <a:fontRef idx="minor"/>
+    </dgm:style>
+  </dgm:styleLbl>
+  <dgm:styleLbl name="bgImgPlace1">
+    <dgm:scene3d>
+      <a:camera prst="orthographicFront"/>
+      <a:lightRig rig="threePt" dir="t"/>
+    </dgm:scene3d>
+    <dgm:sp3d/>
+    <dgm:txPr/>
+    <dgm:style>
+      <a:lnRef idx="2">
+        <a:scrgbClr r="0" g="0" b="0"/>
+      </a:lnRef>
+      <a:fillRef idx="1">
+        <a:scrgbClr r="0" g="0" b="0"/>
+      </a:fillRef>
+      <a:effectRef idx="0">
+        <a:scrgbClr r="0" g="0" b="0"/>
+      </a:effectRef>
+      <a:fontRef idx="minor"/>
+    </dgm:style>
+  </dgm:styleLbl>
+  <dgm:styleLbl name="sibTrans2D1">
+    <dgm:scene3d>
+      <a:camera prst="orthographicFront"/>
+      <a:lightRig rig="threePt" dir="t"/>
+    </dgm:scene3d>
+    <dgm:sp3d/>
+    <dgm:txPr/>
+    <dgm:style>
+      <a:lnRef idx="0">
+        <a:scrgbClr r="0" g="0" b="0"/>
+      </a:lnRef>
+      <a:fillRef idx="1">
+        <a:scrgbClr r="0" g="0" b="0"/>
+      </a:fillRef>
+      <a:effectRef idx="0">
+        <a:scrgbClr r="0" g="0" b="0"/>
+      </a:effectRef>
+      <a:fontRef idx="minor">
+        <a:schemeClr val="lt1"/>
+      </a:fontRef>
+    </dgm:style>
+  </dgm:styleLbl>
+  <dgm:styleLbl name="fgSibTrans2D1">
+    <dgm:scene3d>
+      <a:camera prst="orthographicFront"/>
+      <a:lightRig rig="threePt" dir="t"/>
+    </dgm:scene3d>
+    <dgm:sp3d/>
+    <dgm:txPr/>
+    <dgm:style>
+      <a:lnRef idx="0">
+        <a:scrgbClr r="0" g="0" b="0"/>
+      </a:lnRef>
+      <a:fillRef idx="1">
+        <a:scrgbClr r="0" g="0" b="0"/>
+      </a:fillRef>
+      <a:effectRef idx="0">
+        <a:scrgbClr r="0" g="0" b="0"/>
+      </a:effectRef>
+      <a:fontRef idx="minor">
+        <a:schemeClr val="lt1"/>
+      </a:fontRef>
+    </dgm:style>
+  </dgm:styleLbl>
+  <dgm:styleLbl name="bgSibTrans2D1">
+    <dgm:scene3d>
+      <a:camera prst="orthographicFront"/>
+      <a:lightRig rig="threePt" dir="t"/>
+    </dgm:scene3d>
+    <dgm:sp3d/>
+    <dgm:txPr/>
+    <dgm:style>
+      <a:lnRef idx="0">
+        <a:scrgbClr r="0" g="0" b="0"/>
+      </a:lnRef>
+      <a:fillRef idx="1">
+        <a:scrgbClr r="0" g="0" b="0"/>
+      </a:fillRef>
+      <a:effectRef idx="0">
+        <a:scrgbClr r="0" g="0" b="0"/>
+      </a:effectRef>
+      <a:fontRef idx="minor">
+        <a:schemeClr val="lt1"/>
+      </a:fontRef>
+    </dgm:style>
+  </dgm:styleLbl>
+  <dgm:styleLbl name="sibTrans1D1">
+    <dgm:scene3d>
+      <a:camera prst="orthographicFront"/>
+      <a:lightRig rig="threePt" dir="t"/>
+    </dgm:scene3d>
+    <dgm:sp3d/>
+    <dgm:txPr/>
+    <dgm:style>
+      <a:lnRef idx="1">
+        <a:scrgbClr r="0" g="0" b="0"/>
+      </a:lnRef>
+      <a:fillRef idx="0">
+        <a:scrgbClr r="0" g="0" b="0"/>
+      </a:fillRef>
+      <a:effectRef idx="0">
+        <a:scrgbClr r="0" g="0" b="0"/>
+      </a:effectRef>
+      <a:fontRef idx="minor"/>
+    </dgm:style>
+  </dgm:styleLbl>
+  <dgm:styleLbl name="callout">
+    <dgm:scene3d>
+      <a:camera prst="orthographicFront"/>
+      <a:lightRig rig="threePt" dir="t"/>
+    </dgm:scene3d>
+    <dgm:sp3d/>
+    <dgm:txPr/>
+    <dgm:style>
+      <a:lnRef idx="2">
+        <a:scrgbClr r="0" g="0" b="0"/>
+      </a:lnRef>
+      <a:fillRef idx="1">
+        <a:scrgbClr r="0" g="0" b="0"/>
+      </a:fillRef>
+      <a:effectRef idx="0">
+        <a:scrgbClr r="0" g="0" b="0"/>
+      </a:effectRef>
+      <a:fontRef idx="minor"/>
+    </dgm:style>
+  </dgm:styleLbl>
+  <dgm:styleLbl name="asst0">
+    <dgm:scene3d>
+      <a:camera prst="orthographicFront"/>
+      <a:lightRig rig="threePt" dir="t"/>
+    </dgm:scene3d>
+    <dgm:sp3d/>
+    <dgm:txPr/>
+    <dgm:style>
+      <a:lnRef idx="2">
+        <a:scrgbClr r="0" g="0" b="0"/>
+      </a:lnRef>
+      <a:fillRef idx="1">
+        <a:scrgbClr r="0" g="0" b="0"/>
+      </a:fillRef>
+      <a:effectRef idx="0">
+        <a:scrgbClr r="0" g="0" b="0"/>
+      </a:effectRef>
+      <a:fontRef idx="minor">
+        <a:schemeClr val="lt1"/>
+      </a:fontRef>
+    </dgm:style>
+  </dgm:styleLbl>
+  <dgm:styleLbl name="asst1">
+    <dgm:scene3d>
+      <a:camera prst="orthographicFront"/>
+      <a:lightRig rig="threePt" dir="t"/>
+    </dgm:scene3d>
+    <dgm:sp3d/>
+    <dgm:txPr/>
+    <dgm:style>
+      <a:lnRef idx="2">
+        <a:scrgbClr r="0" g="0" b="0"/>
+      </a:lnRef>
+      <a:fillRef idx="1">
+        <a:scrgbClr r="0" g="0" b="0"/>
+      </a:fillRef>
+      <a:effectRef idx="0">
+        <a:scrgbClr r="0" g="0" b="0"/>
+      </a:effectRef>
+      <a:fontRef idx="minor">
+        <a:schemeClr val="lt1"/>
+      </a:fontRef>
+    </dgm:style>
+  </dgm:styleLbl>
+  <dgm:styleLbl name="asst2">
+    <dgm:scene3d>
+      <a:camera prst="orthographicFront"/>
+      <a:lightRig rig="threePt" dir="t"/>
+    </dgm:scene3d>
+    <dgm:sp3d/>
+    <dgm:txPr/>
+    <dgm:style>
+      <a:lnRef idx="2">
+        <a:scrgbClr r="0" g="0" b="0"/>
+      </a:lnRef>
+      <a:fillRef idx="1">
+        <a:scrgbClr r="0" g="0" b="0"/>
+      </a:fillRef>
+      <a:effectRef idx="0">
+        <a:scrgbClr r="0" g="0" b="0"/>
+      </a:effectRef>
+      <a:fontRef idx="minor">
+        <a:schemeClr val="lt1"/>
+      </a:fontRef>
+    </dgm:style>
+  </dgm:styleLbl>
+  <dgm:styleLbl name="asst3">
+    <dgm:scene3d>
+      <a:camera prst="orthographicFront"/>
+      <a:lightRig rig="threePt" dir="t"/>
+    </dgm:scene3d>
+    <dgm:sp3d/>
+    <dgm:txPr/>
+    <dgm:style>
+      <a:lnRef idx="2">
+        <a:scrgbClr r="0" g="0" b="0"/>
+      </a:lnRef>
+      <a:fillRef idx="1">
+        <a:scrgbClr r="0" g="0" b="0"/>
+      </a:fillRef>
+      <a:effectRef idx="0">
+        <a:scrgbClr r="0" g="0" b="0"/>
+      </a:effectRef>
+      <a:fontRef idx="minor">
+        <a:schemeClr val="lt1"/>
+      </a:fontRef>
+    </dgm:style>
+  </dgm:styleLbl>
+  <dgm:styleLbl name="asst4">
+    <dgm:scene3d>
+      <a:camera prst="orthographicFront"/>
+      <a:lightRig rig="threePt" dir="t"/>
+    </dgm:scene3d>
+    <dgm:sp3d/>
+    <dgm:txPr/>
+    <dgm:style>
+      <a:lnRef idx="2">
+        <a:scrgbClr r="0" g="0" b="0"/>
+      </a:lnRef>
+      <a:fillRef idx="1">
+        <a:scrgbClr r="0" g="0" b="0"/>
+      </a:fillRef>
+      <a:effectRef idx="0">
+        <a:scrgbClr r="0" g="0" b="0"/>
+      </a:effectRef>
+      <a:fontRef idx="minor">
+        <a:schemeClr val="lt1"/>
+      </a:fontRef>
+    </dgm:style>
+  </dgm:styleLbl>
+  <dgm:styleLbl name="parChTrans2D1">
+    <dgm:scene3d>
+      <a:camera prst="orthographicFront"/>
+      <a:lightRig rig="threePt" dir="t"/>
+    </dgm:scene3d>
+    <dgm:sp3d/>
+    <dgm:txPr/>
+    <dgm:style>
+      <a:lnRef idx="2">
+        <a:scrgbClr r="0" g="0" b="0"/>
+      </a:lnRef>
+      <a:fillRef idx="1">
+        <a:scrgbClr r="0" g="0" b="0"/>
+      </a:fillRef>
+      <a:effectRef idx="0">
+        <a:scrgbClr r="0" g="0" b="0"/>
+      </a:effectRef>
+      <a:fontRef idx="minor">
+        <a:schemeClr val="lt1"/>
+      </a:fontRef>
+    </dgm:style>
+  </dgm:styleLbl>
+  <dgm:styleLbl name="parChTrans2D2">
+    <dgm:scene3d>
+      <a:camera prst="orthographicFront"/>
+      <a:lightRig rig="threePt" dir="t"/>
+    </dgm:scene3d>
+    <dgm:sp3d/>
+    <dgm:txPr/>
+    <dgm:style>
+      <a:lnRef idx="2">
+        <a:scrgbClr r="0" g="0" b="0"/>
+      </a:lnRef>
+      <a:fillRef idx="1">
+        <a:scrgbClr r="0" g="0" b="0"/>
+      </a:fillRef>
+      <a:effectRef idx="0">
+        <a:scrgbClr r="0" g="0" b="0"/>
+      </a:effectRef>
+      <a:fontRef idx="minor">
+        <a:schemeClr val="lt1"/>
+      </a:fontRef>
+    </dgm:style>
+  </dgm:styleLbl>
+  <dgm:styleLbl name="parChTrans2D3">
+    <dgm:scene3d>
+      <a:camera prst="orthographicFront"/>
+      <a:lightRig rig="threePt" dir="t"/>
+    </dgm:scene3d>
+    <dgm:sp3d/>
+    <dgm:txPr/>
+    <dgm:style>
+      <a:lnRef idx="2">
+        <a:scrgbClr r="0" g="0" b="0"/>
+      </a:lnRef>
+      <a:fillRef idx="1">
+        <a:scrgbClr r="0" g="0" b="0"/>
+      </a:fillRef>
+      <a:effectRef idx="0">
+        <a:scrgbClr r="0" g="0" b="0"/>
+      </a:effectRef>
+      <a:fontRef idx="minor">
+        <a:schemeClr val="lt1"/>
+      </a:fontRef>
+    </dgm:style>
+  </dgm:styleLbl>
+  <dgm:styleLbl name="parChTrans2D4">
+    <dgm:scene3d>
+      <a:camera prst="orthographicFront"/>
+      <a:lightRig rig="threePt" dir="t"/>
+    </dgm:scene3d>
+    <dgm:sp3d/>
+    <dgm:txPr/>
+    <dgm:style>
+      <a:lnRef idx="2">
+        <a:scrgbClr r="0" g="0" b="0"/>
+      </a:lnRef>
+      <a:fillRef idx="1">
+        <a:scrgbClr r="0" g="0" b="0"/>
+      </a:fillRef>
+      <a:effectRef idx="0">
+        <a:scrgbClr r="0" g="0" b="0"/>
+      </a:effectRef>
+      <a:fontRef idx="minor">
+        <a:schemeClr val="lt1"/>
+      </a:fontRef>
+    </dgm:style>
+  </dgm:styleLbl>
+  <dgm:styleLbl name="parChTrans1D1">
+    <dgm:scene3d>
+      <a:camera prst="orthographicFront"/>
+      <a:lightRig rig="threePt" dir="t"/>
+    </dgm:scene3d>
+    <dgm:sp3d/>
+    <dgm:txPr/>
+    <dgm:style>
+      <a:lnRef idx="2">
+        <a:scrgbClr r="0" g="0" b="0"/>
+      </a:lnRef>
+      <a:fillRef idx="0">
+        <a:scrgbClr r="0" g="0" b="0"/>
+      </a:fillRef>
+      <a:effectRef idx="0">
+        <a:scrgbClr r="0" g="0" b="0"/>
+      </a:effectRef>
+      <a:fontRef idx="minor"/>
+    </dgm:style>
+  </dgm:styleLbl>
+  <dgm:styleLbl name="parChTrans1D2">
+    <dgm:scene3d>
+      <a:camera prst="orthographicFront"/>
+      <a:lightRig rig="threePt" dir="t"/>
+    </dgm:scene3d>
+    <dgm:sp3d/>
+    <dgm:txPr/>
+    <dgm:style>
+      <a:lnRef idx="2">
+        <a:scrgbClr r="0" g="0" b="0"/>
+      </a:lnRef>
+      <a:fillRef idx="0">
+        <a:scrgbClr r="0" g="0" b="0"/>
+      </a:fillRef>
+      <a:effectRef idx="0">
+        <a:scrgbClr r="0" g="0" b="0"/>
+      </a:effectRef>
+      <a:fontRef idx="minor"/>
+    </dgm:style>
+  </dgm:styleLbl>
+  <dgm:styleLbl name="parChTrans1D3">
+    <dgm:scene3d>
+      <a:camera prst="orthographicFront"/>
+      <a:lightRig rig="threePt" dir="t"/>
+    </dgm:scene3d>
+    <dgm:sp3d/>
+    <dgm:txPr/>
+    <dgm:style>
+      <a:lnRef idx="2">
+        <a:scrgbClr r="0" g="0" b="0"/>
+      </a:lnRef>
+      <a:fillRef idx="0">
+        <a:scrgbClr r="0" g="0" b="0"/>
+      </a:fillRef>
+      <a:effectRef idx="0">
+        <a:scrgbClr r="0" g="0" b="0"/>
+      </a:effectRef>
+      <a:fontRef idx="minor"/>
+    </dgm:style>
+  </dgm:styleLbl>
+  <dgm:styleLbl name="parChTrans1D4">
+    <dgm:scene3d>
+      <a:camera prst="orthographicFront"/>
+      <a:lightRig rig="threePt" dir="t"/>
+    </dgm:scene3d>
+    <dgm:sp3d/>
+    <dgm:txPr/>
+    <dgm:style>
+      <a:lnRef idx="2">
+        <a:scrgbClr r="0" g="0" b="0"/>
+      </a:lnRef>
+      <a:fillRef idx="0">
+        <a:scrgbClr r="0" g="0" b="0"/>
+      </a:fillRef>
+      <a:effectRef idx="0">
+        <a:scrgbClr r="0" g="0" b="0"/>
+      </a:effectRef>
+      <a:fontRef idx="minor"/>
+    </dgm:style>
+  </dgm:styleLbl>
+  <dgm:styleLbl name="fgAcc1">
+    <dgm:scene3d>
+      <a:camera prst="orthographicFront"/>
+      <a:lightRig rig="threePt" dir="t"/>
+    </dgm:scene3d>
+    <dgm:sp3d/>
+    <dgm:txPr/>
+    <dgm:style>
+      <a:lnRef idx="2">
+        <a:scrgbClr r="0" g="0" b="0"/>
+      </a:lnRef>
+      <a:fillRef idx="1">
+        <a:scrgbClr r="0" g="0" b="0"/>
+      </a:fillRef>
+      <a:effectRef idx="0">
+        <a:scrgbClr r="0" g="0" b="0"/>
+      </a:effectRef>
+      <a:fontRef idx="minor"/>
+    </dgm:style>
+  </dgm:styleLbl>
+  <dgm:styleLbl name="conFgAcc1">
+    <dgm:scene3d>
+      <a:camera prst="orthographicFront"/>
+      <a:lightRig rig="threePt" dir="t"/>
+    </dgm:scene3d>
+    <dgm:sp3d/>
+    <dgm:txPr/>
+    <dgm:style>
+      <a:lnRef idx="2">
+        <a:scrgbClr r="0" g="0" b="0"/>
+      </a:lnRef>
+      <a:fillRef idx="1">
+        <a:scrgbClr r="0" g="0" b="0"/>
+      </a:fillRef>
+      <a:effectRef idx="0">
+        <a:scrgbClr r="0" g="0" b="0"/>
+      </a:effectRef>
+      <a:fontRef idx="minor"/>
+    </dgm:style>
+  </dgm:styleLbl>
+  <dgm:styleLbl name="alignAcc1">
+    <dgm:scene3d>
+      <a:camera prst="orthographicFront"/>
+      <a:lightRig rig="threePt" dir="t"/>
+    </dgm:scene3d>
+    <dgm:sp3d/>
+    <dgm:txPr/>
+    <dgm:style>
+      <a:lnRef idx="2">
+        <a:scrgbClr r="0" g="0" b="0"/>
+      </a:lnRef>
+      <a:fillRef idx="1">
+        <a:scrgbClr r="0" g="0" b="0"/>
+      </a:fillRef>
+      <a:effectRef idx="0">
+        <a:scrgbClr r="0" g="0" b="0"/>
+      </a:effectRef>
+      <a:fontRef idx="minor"/>
+    </dgm:style>
+  </dgm:styleLbl>
+  <dgm:styleLbl name="trAlignAcc1">
+    <dgm:scene3d>
+      <a:camera prst="orthographicFront"/>
+      <a:lightRig rig="threePt" dir="t"/>
+    </dgm:scene3d>
+    <dgm:sp3d/>
+    <dgm:txPr/>
+    <dgm:style>
+      <a:lnRef idx="1">
+        <a:scrgbClr r="0" g="0" b="0"/>
+      </a:lnRef>
+      <a:fillRef idx="1">
+        <a:scrgbClr r="0" g="0" b="0"/>
+      </a:fillRef>
+      <a:effectRef idx="0">
+        <a:scrgbClr r="0" g="0" b="0"/>
+      </a:effectRef>
+      <a:fontRef idx="minor"/>
+    </dgm:style>
+  </dgm:styleLbl>
+  <dgm:styleLbl name="bgAcc1">
+    <dgm:scene3d>
+      <a:camera prst="orthographicFront"/>
+      <a:lightRig rig="threePt" dir="t"/>
+    </dgm:scene3d>
+    <dgm:sp3d/>
+    <dgm:txPr/>
+    <dgm:style>
+      <a:lnRef idx="2">
+        <a:scrgbClr r="0" g="0" b="0"/>
+      </a:lnRef>
+      <a:fillRef idx="1">
+        <a:scrgbClr r="0" g="0" b="0"/>
+      </a:fillRef>
+      <a:effectRef idx="0">
+        <a:scrgbClr r="0" g="0" b="0"/>
+      </a:effectRef>
+      <a:fontRef idx="minor"/>
+    </dgm:style>
+  </dgm:styleLbl>
+  <dgm:styleLbl name="solidFgAcc1">
+    <dgm:scene3d>
+      <a:camera prst="orthographicFront"/>
+      <a:lightRig rig="threePt" dir="t"/>
+    </dgm:scene3d>
+    <dgm:sp3d/>
+    <dgm:txPr/>
+    <dgm:style>
+      <a:lnRef idx="2">
+        <a:scrgbClr r="0" g="0" b="0"/>
+      </a:lnRef>
+      <a:fillRef idx="1">
+        <a:scrgbClr r="0" g="0" b="0"/>
+      </a:fillRef>
+      <a:effectRef idx="0">
+        <a:scrgbClr r="0" g="0" b="0"/>
+      </a:effectRef>
+      <a:fontRef idx="minor"/>
+    </dgm:style>
+  </dgm:styleLbl>
+  <dgm:styleLbl name="solidAlignAcc1">
+    <dgm:scene3d>
+      <a:camera prst="orthographicFront"/>
+      <a:lightRig rig="threePt" dir="t"/>
+    </dgm:scene3d>
+    <dgm:sp3d/>
+    <dgm:txPr/>
+    <dgm:style>
+      <a:lnRef idx="2">
+        <a:scrgbClr r="0" g="0" b="0"/>
+      </a:lnRef>
+      <a:fillRef idx="1">
+        <a:scrgbClr r="0" g="0" b="0"/>
+      </a:fillRef>
+      <a:effectRef idx="0">
+        <a:scrgbClr r="0" g="0" b="0"/>
+      </a:effectRef>
+      <a:fontRef idx="minor"/>
+    </dgm:style>
+  </dgm:styleLbl>
+  <dgm:styleLbl name="solidBgAcc1">
+    <dgm:scene3d>
+      <a:camera prst="orthographicFront"/>
+      <a:lightRig rig="threePt" dir="t"/>
+    </dgm:scene3d>
+    <dgm:sp3d/>
+    <dgm:txPr/>
+    <dgm:style>
+      <a:lnRef idx="2">
+        <a:scrgbClr r="0" g="0" b="0"/>
+      </a:lnRef>
+      <a:fillRef idx="1">
+        <a:scrgbClr r="0" g="0" b="0"/>
+      </a:fillRef>
+      <a:effectRef idx="0">
+        <a:scrgbClr r="0" g="0" b="0"/>
+      </a:effectRef>
+      <a:fontRef idx="minor"/>
+    </dgm:style>
+  </dgm:styleLbl>
+  <dgm:styleLbl name="fgAccFollowNode1">
+    <dgm:scene3d>
+      <a:camera prst="orthographicFront"/>
+      <a:lightRig rig="threePt" dir="t"/>
+    </dgm:scene3d>
+    <dgm:sp3d/>
+    <dgm:txPr/>
+    <dgm:style>
+      <a:lnRef idx="2">
+        <a:scrgbClr r="0" g="0" b="0"/>
+      </a:lnRef>
+      <a:fillRef idx="1">
+        <a:scrgbClr r="0" g="0" b="0"/>
+      </a:fillRef>
+      <a:effectRef idx="0">
+        <a:scrgbClr r="0" g="0" b="0"/>
+      </a:effectRef>
+      <a:fontRef idx="minor"/>
+    </dgm:style>
+  </dgm:styleLbl>
+  <dgm:styleLbl name="alignAccFollowNode1">
+    <dgm:scene3d>
+      <a:camera prst="orthographicFront"/>
+      <a:lightRig rig="threePt" dir="t"/>
+    </dgm:scene3d>
+    <dgm:sp3d/>
+    <dgm:txPr/>
+    <dgm:style>
+      <a:lnRef idx="2">
+        <a:scrgbClr r="0" g="0" b="0"/>
+      </a:lnRef>
+      <a:fillRef idx="1">
+        <a:scrgbClr r="0" g="0" b="0"/>
+      </a:fillRef>
+      <a:effectRef idx="0">
+        <a:scrgbClr r="0" g="0" b="0"/>
+      </a:effectRef>
+      <a:fontRef idx="minor"/>
+    </dgm:style>
+  </dgm:styleLbl>
+  <dgm:styleLbl name="bgAccFollowNode1">
+    <dgm:scene3d>
+      <a:camera prst="orthographicFront"/>
+      <a:lightRig rig="threePt" dir="t"/>
+    </dgm:scene3d>
+    <dgm:sp3d/>
+    <dgm:txPr/>
+    <dgm:style>
+      <a:lnRef idx="2">
+        <a:scrgbClr r="0" g="0" b="0"/>
+      </a:lnRef>
+      <a:fillRef idx="1">
+        <a:scrgbClr r="0" g="0" b="0"/>
+      </a:fillRef>
+      <a:effectRef idx="0">
+        <a:scrgbClr r="0" g="0" b="0"/>
+      </a:effectRef>
+      <a:fontRef idx="minor"/>
+    </dgm:style>
+  </dgm:styleLbl>
+  <dgm:styleLbl name="fgAcc0">
+    <dgm:scene3d>
+      <a:camera prst="orthographicFront"/>
+      <a:lightRig rig="threePt" dir="t"/>
+    </dgm:scene3d>
+    <dgm:sp3d/>
+    <dgm:txPr/>
+    <dgm:style>
+      <a:lnRef idx="2">
+        <a:scrgbClr r="0" g="0" b="0"/>
+      </a:lnRef>
+      <a:fillRef idx="1">
+        <a:scrgbClr r="0" g="0" b="0"/>
+      </a:fillRef>
+      <a:effectRef idx="0">
+        <a:scrgbClr r="0" g="0" b="0"/>
+      </a:effectRef>
+      <a:fontRef idx="minor"/>
+    </dgm:style>
+  </dgm:styleLbl>
+  <dgm:styleLbl name="fgAcc2">
+    <dgm:scene3d>
+      <a:camera prst="orthographicFront"/>
+      <a:lightRig rig="threePt" dir="t"/>
+    </dgm:scene3d>
+    <dgm:sp3d/>
+    <dgm:txPr/>
+    <dgm:style>
+      <a:lnRef idx="2">
+        <a:scrgbClr r="0" g="0" b="0"/>
+      </a:lnRef>
+      <a:fillRef idx="1">
+        <a:scrgbClr r="0" g="0" b="0"/>
+      </a:fillRef>
+      <a:effectRef idx="0">
+        <a:scrgbClr r="0" g="0" b="0"/>
+      </a:effectRef>
+      <a:fontRef idx="minor"/>
+    </dgm:style>
+  </dgm:styleLbl>
+  <dgm:styleLbl name="fgAcc3">
+    <dgm:scene3d>
+      <a:camera prst="orthographicFront"/>
+      <a:lightRig rig="threePt" dir="t"/>
+    </dgm:scene3d>
+    <dgm:sp3d/>
+    <dgm:txPr/>
+    <dgm:style>
+      <a:lnRef idx="2">
+        <a:scrgbClr r="0" g="0" b="0"/>
+      </a:lnRef>
+      <a:fillRef idx="1">
+        <a:scrgbClr r="0" g="0" b="0"/>
+      </a:fillRef>
+      <a:effectRef idx="0">
+        <a:scrgbClr r="0" g="0" b="0"/>
+      </a:effectRef>
+      <a:fontRef idx="minor"/>
+    </dgm:style>
+  </dgm:styleLbl>
+  <dgm:styleLbl name="fgAcc4">
+    <dgm:scene3d>
+      <a:camera prst="orthographicFront"/>
+      <a:lightRig rig="threePt" dir="t"/>
+    </dgm:scene3d>
+    <dgm:sp3d/>
+    <dgm:txPr/>
+    <dgm:style>
+      <a:lnRef idx="2">
+        <a:scrgbClr r="0" g="0" b="0"/>
+      </a:lnRef>
+      <a:fillRef idx="1">
+        <a:scrgbClr r="0" g="0" b="0"/>
+      </a:fillRef>
+      <a:effectRef idx="0">
+        <a:scrgbClr r="0" g="0" b="0"/>
+      </a:effectRef>
+      <a:fontRef idx="minor"/>
+    </dgm:style>
+  </dgm:styleLbl>
+  <dgm:styleLbl name="bgShp">
+    <dgm:scene3d>
+      <a:camera prst="orthographicFront"/>
+      <a:lightRig rig="threePt" dir="t"/>
+    </dgm:scene3d>
+    <dgm:sp3d/>
+    <dgm:txPr/>
+    <dgm:style>
+      <a:lnRef idx="0">
+        <a:scrgbClr r="0" g="0" b="0"/>
+      </a:lnRef>
+      <a:fillRef idx="1">
+        <a:scrgbClr r="0" g="0" b="0"/>
+      </a:fillRef>
+      <a:effectRef idx="0">
+        <a:scrgbClr r="0" g="0" b="0"/>
+      </a:effectRef>
+      <a:fontRef idx="minor"/>
+    </dgm:style>
+  </dgm:styleLbl>
+  <dgm:styleLbl name="dkBgShp">
+    <dgm:scene3d>
+      <a:camera prst="orthographicFront"/>
+      <a:lightRig rig="threePt" dir="t"/>
+    </dgm:scene3d>
+    <dgm:sp3d/>
+    <dgm:txPr/>
+    <dgm:style>
+      <a:lnRef idx="0">
+        <a:scrgbClr r="0" g="0" b="0"/>
+      </a:lnRef>
+      <a:fillRef idx="1">
+        <a:scrgbClr r="0" g="0" b="0"/>
+      </a:fillRef>
+      <a:effectRef idx="0">
+        <a:scrgbClr r="0" g="0" b="0"/>
+      </a:effectRef>
+      <a:fontRef idx="minor"/>
+    </dgm:style>
+  </dgm:styleLbl>
+  <dgm:styleLbl name="trBgShp">
+    <dgm:scene3d>
+      <a:camera prst="orthographicFront"/>
+      <a:lightRig rig="threePt" dir="t"/>
+    </dgm:scene3d>
+    <dgm:sp3d/>
+    <dgm:txPr/>
+    <dgm:style>
+      <a:lnRef idx="0">
+        <a:scrgbClr r="0" g="0" b="0"/>
+      </a:lnRef>
+      <a:fillRef idx="1">
+        <a:scrgbClr r="0" g="0" b="0"/>
+      </a:fillRef>
+      <a:effectRef idx="0">
+        <a:scrgbClr r="0" g="0" b="0"/>
+      </a:effectRef>
+      <a:fontRef idx="minor"/>
+    </dgm:style>
+  </dgm:styleLbl>
+  <dgm:styleLbl name="fgShp">
+    <dgm:scene3d>
+      <a:camera prst="orthographicFront"/>
+      <a:lightRig rig="threePt" dir="t"/>
+    </dgm:scene3d>
+    <dgm:sp3d/>
+    <dgm:txPr/>
+    <dgm:style>
+      <a:lnRef idx="2">
+        <a:scrgbClr r="0" g="0" b="0"/>
+      </a:lnRef>
+      <a:fillRef idx="1">
+        <a:scrgbClr r="0" g="0" b="0"/>
+      </a:fillRef>
+      <a:effectRef idx="0">
+        <a:scrgbClr r="0" g="0" b="0"/>
+      </a:effectRef>
+      <a:fontRef idx="minor"/>
+    </dgm:style>
+  </dgm:styleLbl>
+  <dgm:styleLbl name="revTx">
+    <dgm:scene3d>
+      <a:camera prst="orthographicFront"/>
+      <a:lightRig rig="threePt" dir="t"/>
+    </dgm:scene3d>
+    <dgm:sp3d/>
+    <dgm:txPr/>
+    <dgm:style>
+      <a:lnRef idx="0">
+        <a:scrgbClr r="0" g="0" b="0"/>
+      </a:lnRef>
+      <a:fillRef idx="0">
+        <a:scrgbClr r="0" g="0" b="0"/>
+      </a:fillRef>
+      <a:effectRef idx="0">
+        <a:scrgbClr r="0" g="0" b="0"/>
+      </a:effectRef>
+      <a:fontRef idx="minor"/>
+    </dgm:style>
+  </dgm:styleLbl>
+</dgm:styleDef>
 </file>
 
 <file path=ppt/slideLayouts/slideLayout1.xml><?xml version="1.0" encoding="utf-8"?>
@@ -4066,31 +7816,37 @@
           </a:p>
         </p:txBody>
       </p:sp>
-      <p:sp>
-        <p:nvSpPr>
-          <p:cNvPr id="3" name="Content Placeholder 2">
+      <p:graphicFrame>
+        <p:nvGraphicFramePr>
+          <p:cNvPr id="4" name="Content Placeholder 3">
             <a:extLst>
               <a:ext uri="{FF2B5EF4-FFF2-40B4-BE49-F238E27FC236}">
-                <a16:creationId xmlns:a16="http://schemas.microsoft.com/office/drawing/2014/main" id="{D60F30C1-22BE-4BD7-91AF-CC45D0806162}"/>
+                <a16:creationId xmlns:a16="http://schemas.microsoft.com/office/drawing/2014/main" id="{D4277466-4A3C-4DA4-80F5-CED809A10B18}"/>
               </a:ext>
             </a:extLst>
           </p:cNvPr>
-          <p:cNvSpPr>
-            <a:spLocks noGrp="1"/>
-          </p:cNvSpPr>
+          <p:cNvGraphicFramePr>
+            <a:graphicFrameLocks noGrp="1"/>
+          </p:cNvGraphicFramePr>
           <p:nvPr>
             <p:ph idx="1"/>
+            <p:extLst>
+              <p:ext uri="{D42A27DB-BD31-4B8C-83A1-F6EECF244321}">
+                <p14:modId xmlns:p14="http://schemas.microsoft.com/office/powerpoint/2010/main" val="63459016"/>
+              </p:ext>
+            </p:extLst>
           </p:nvPr>
-        </p:nvSpPr>
-        <p:spPr/>
-        <p:txBody>
-          <a:bodyPr/>
-          <a:lstStyle/>
-          <a:p>
-            <a:endParaRPr lang="en-US"/>
-          </a:p>
-        </p:txBody>
-      </p:sp>
+        </p:nvGraphicFramePr>
+        <p:xfrm>
+          <a:off x="1096963" y="1846263"/>
+          <a:ext cx="10058400" cy="4022725"/>
+        </p:xfrm>
+        <a:graphic>
+          <a:graphicData uri="http://schemas.openxmlformats.org/drawingml/2006/diagram">
+            <dgm:relIds xmlns:dgm="http://schemas.openxmlformats.org/drawingml/2006/diagram" xmlns:r="http://schemas.openxmlformats.org/officeDocument/2006/relationships" r:dm="rId2" r:lo="rId3" r:qs="rId4" r:cs="rId5"/>
+          </a:graphicData>
+        </a:graphic>
+      </p:graphicFrame>
     </p:spTree>
     <p:extLst>
       <p:ext uri="{BB962C8B-B14F-4D97-AF65-F5344CB8AC3E}">
@@ -4167,10 +7923,72 @@
         </p:nvSpPr>
         <p:spPr/>
         <p:txBody>
-          <a:bodyPr/>
+          <a:bodyPr>
+            <a:normAutofit/>
+          </a:bodyPr>
           <a:lstStyle/>
           <a:p>
-            <a:endParaRPr lang="en-US"/>
+            <a:r>
+              <a:rPr lang="en-US" b="1" dirty="0"/>
+              <a:t>Project Goal</a:t>
+            </a:r>
+          </a:p>
+          <a:p>
+            <a:r>
+              <a:rPr lang="en-US" dirty="0"/>
+              <a:t>Develop a responsive web application, with a mobile-first UI, that the would allow users to search through the content of their movie streaming applications to help them find the right movie or show to watch according to the following selection criteria:</a:t>
+            </a:r>
+          </a:p>
+          <a:p>
+            <a:pPr>
+              <a:lnSpc>
+                <a:spcPct val="0"/>
+              </a:lnSpc>
+            </a:pPr>
+            <a:endParaRPr lang="en-US" dirty="0"/>
+          </a:p>
+          <a:p>
+            <a:pPr lvl="1">
+              <a:buFont typeface="Courier New" panose="02070309020205020404" pitchFamily="49" charset="0"/>
+              <a:buChar char="o"/>
+            </a:pPr>
+            <a:r>
+              <a:rPr lang="en-US" dirty="0"/>
+              <a:t>Movie streaming applications (Netflix, Amazon, Hulu)</a:t>
+            </a:r>
+          </a:p>
+          <a:p>
+            <a:pPr lvl="1">
+              <a:buFont typeface="Courier New" panose="02070309020205020404" pitchFamily="49" charset="0"/>
+              <a:buChar char="o"/>
+            </a:pPr>
+            <a:r>
+              <a:rPr lang="en-US" dirty="0"/>
+              <a:t>Genre</a:t>
+            </a:r>
+          </a:p>
+          <a:p>
+            <a:pPr lvl="1">
+              <a:buFont typeface="Courier New" panose="02070309020205020404" pitchFamily="49" charset="0"/>
+              <a:buChar char="o"/>
+            </a:pPr>
+            <a:r>
+              <a:rPr lang="en-US" dirty="0"/>
+              <a:t>Movie vs show series</a:t>
+            </a:r>
+          </a:p>
+          <a:p>
+            <a:pPr lvl="1">
+              <a:buFont typeface="Courier New" panose="02070309020205020404" pitchFamily="49" charset="0"/>
+              <a:buChar char="o"/>
+            </a:pPr>
+            <a:r>
+              <a:rPr lang="en-US" dirty="0"/>
+              <a:t>Assigned movie rating (G, PG, PG-13, R)</a:t>
+            </a:r>
+          </a:p>
+          <a:p>
+            <a:endParaRPr lang="en-US" dirty="0"/>
           </a:p>
         </p:txBody>
       </p:sp>
@@ -4204,12 +8022,47 @@
           <a:chExt cx="0" cy="0"/>
         </a:xfrm>
       </p:grpSpPr>
-      <p:sp>
-        <p:nvSpPr>
-          <p:cNvPr id="18" name="Title 17">
+      <p:pic>
+        <p:nvPicPr>
+          <p:cNvPr id="10" name="Content Placeholder 9">
             <a:extLst>
               <a:ext uri="{FF2B5EF4-FFF2-40B4-BE49-F238E27FC236}">
-                <a16:creationId xmlns:a16="http://schemas.microsoft.com/office/drawing/2014/main" id="{382BE2DA-2D7B-4309-955D-F85AD658DC91}"/>
+                <a16:creationId xmlns:a16="http://schemas.microsoft.com/office/drawing/2014/main" id="{BC8E9390-0D34-46A9-B34D-24C80B5BF228}"/>
+              </a:ext>
+            </a:extLst>
+          </p:cNvPr>
+          <p:cNvPicPr>
+            <a:picLocks noGrp="1" noChangeAspect="1"/>
+          </p:cNvPicPr>
+          <p:nvPr>
+            <p:ph sz="quarter" idx="4"/>
+          </p:nvPr>
+        </p:nvPicPr>
+        <p:blipFill>
+          <a:blip r:embed="rId2">
+            <a:extLst>
+              <a:ext uri="{28A0092B-C50C-407E-A947-70E740481C1C}">
+                <a14:useLocalDpi xmlns:a14="http://schemas.microsoft.com/office/drawing/2010/main" val="0"/>
+              </a:ext>
+            </a:extLst>
+          </a:blip>
+          <a:stretch>
+            <a:fillRect/>
+          </a:stretch>
+        </p:blipFill>
+        <p:spPr>
+          <a:xfrm>
+            <a:off x="7085667" y="2310756"/>
+            <a:ext cx="3687225" cy="3687225"/>
+          </a:xfrm>
+        </p:spPr>
+      </p:pic>
+      <p:sp>
+        <p:nvSpPr>
+          <p:cNvPr id="4" name="Title 3">
+            <a:extLst>
+              <a:ext uri="{FF2B5EF4-FFF2-40B4-BE49-F238E27FC236}">
+                <a16:creationId xmlns:a16="http://schemas.microsoft.com/office/drawing/2014/main" id="{9D217995-CF48-453D-9F72-7A0FB0F49A4D}"/>
               </a:ext>
             </a:extLst>
           </p:cNvPr>
@@ -4227,17 +8080,17 @@
           <a:p>
             <a:r>
               <a:rPr lang="en-US" dirty="0"/>
-              <a:t>Project Requirements</a:t>
+              <a:t>Beginning Development</a:t>
             </a:r>
           </a:p>
         </p:txBody>
       </p:sp>
       <p:sp>
         <p:nvSpPr>
-          <p:cNvPr id="19" name="Content Placeholder 18">
+          <p:cNvPr id="7" name="Text Placeholder 6">
             <a:extLst>
               <a:ext uri="{FF2B5EF4-FFF2-40B4-BE49-F238E27FC236}">
-                <a16:creationId xmlns:a16="http://schemas.microsoft.com/office/drawing/2014/main" id="{55B74B31-AA31-4C04-AA40-099F1C74F53F}"/>
+                <a16:creationId xmlns:a16="http://schemas.microsoft.com/office/drawing/2014/main" id="{77212D67-04F3-487D-855E-4C0D2F2EF2E1}"/>
               </a:ext>
             </a:extLst>
           </p:cNvPr>
@@ -4245,7 +8098,7 @@
             <a:spLocks noGrp="1"/>
           </p:cNvSpPr>
           <p:nvPr>
-            <p:ph idx="1"/>
+            <p:ph type="body" idx="1"/>
           </p:nvPr>
         </p:nvSpPr>
         <p:spPr/>
@@ -4253,116 +8106,80 @@
           <a:bodyPr/>
           <a:lstStyle/>
           <a:p>
-            <a:pPr>
-              <a:buFont typeface="Wingdings" panose="05000000000000000000" pitchFamily="2" charset="2"/>
-              <a:buChar char="ü"/>
-            </a:pPr>
             <a:r>
               <a:rPr lang="en-US" dirty="0"/>
-              <a:t>Must use at least two server-side APIs</a:t>
-            </a:r>
-          </a:p>
-          <a:p>
-            <a:pPr>
-              <a:buFont typeface="Wingdings" panose="05000000000000000000" pitchFamily="2" charset="2"/>
-              <a:buChar char="ü"/>
-            </a:pPr>
+              <a:t>Flowchart</a:t>
+            </a:r>
+          </a:p>
+        </p:txBody>
+      </p:sp>
+      <p:pic>
+        <p:nvPicPr>
+          <p:cNvPr id="3" name="Content Placeholder 2">
+            <a:extLst>
+              <a:ext uri="{FF2B5EF4-FFF2-40B4-BE49-F238E27FC236}">
+                <a16:creationId xmlns:a16="http://schemas.microsoft.com/office/drawing/2014/main" id="{5D73F183-87D2-4E11-B065-D1C9CD0C0E2F}"/>
+              </a:ext>
+            </a:extLst>
+          </p:cNvPr>
+          <p:cNvPicPr>
+            <a:picLocks noGrp="1" noChangeAspect="1"/>
+          </p:cNvPicPr>
+          <p:nvPr>
+            <p:ph sz="half" idx="2"/>
+          </p:nvPr>
+        </p:nvPicPr>
+        <p:blipFill>
+          <a:blip r:embed="rId3">
+            <a:extLst>
+              <a:ext uri="{28A0092B-C50C-407E-A947-70E740481C1C}">
+                <a14:useLocalDpi xmlns:a14="http://schemas.microsoft.com/office/drawing/2010/main" val="0"/>
+              </a:ext>
+            </a:extLst>
+          </a:blip>
+          <a:stretch>
+            <a:fillRect/>
+          </a:stretch>
+        </p:blipFill>
+        <p:spPr>
+          <a:xfrm>
+            <a:off x="1486094" y="2536500"/>
+            <a:ext cx="3687226" cy="3457062"/>
+          </a:xfrm>
+        </p:spPr>
+      </p:pic>
+      <p:sp>
+        <p:nvSpPr>
+          <p:cNvPr id="8" name="Text Placeholder 7">
+            <a:extLst>
+              <a:ext uri="{FF2B5EF4-FFF2-40B4-BE49-F238E27FC236}">
+                <a16:creationId xmlns:a16="http://schemas.microsoft.com/office/drawing/2014/main" id="{FAD44BBC-30D1-46E6-A86F-A3AF8A22251A}"/>
+              </a:ext>
+            </a:extLst>
+          </p:cNvPr>
+          <p:cNvSpPr>
+            <a:spLocks noGrp="1"/>
+          </p:cNvSpPr>
+          <p:nvPr>
+            <p:ph type="body" sz="quarter" idx="3"/>
+          </p:nvPr>
+        </p:nvSpPr>
+        <p:spPr/>
+        <p:txBody>
+          <a:bodyPr/>
+          <a:lstStyle/>
+          <a:p>
             <a:r>
               <a:rPr lang="en-US" dirty="0"/>
-              <a:t>Must use a CSS framework </a:t>
-            </a:r>
-            <a:r>
-              <a:rPr lang="en-US" i="1" dirty="0"/>
-              <a:t>other than </a:t>
-            </a:r>
-            <a:r>
-              <a:rPr lang="en-US" dirty="0"/>
-              <a:t>Bootstrap</a:t>
-            </a:r>
-          </a:p>
-          <a:p>
-            <a:pPr>
-              <a:buFont typeface="Wingdings" panose="05000000000000000000" pitchFamily="2" charset="2"/>
-              <a:buChar char="ü"/>
-            </a:pPr>
-            <a:r>
-              <a:rPr lang="en-US" dirty="0"/>
-              <a:t>Use at least one new third-party API</a:t>
-            </a:r>
-          </a:p>
-          <a:p>
-            <a:pPr>
-              <a:buFont typeface="Wingdings" panose="05000000000000000000" pitchFamily="2" charset="2"/>
-              <a:buChar char="ü"/>
-            </a:pPr>
-            <a:r>
-              <a:rPr lang="en-US" dirty="0"/>
-              <a:t>Must have a polished, mobile-first UI</a:t>
-            </a:r>
-          </a:p>
-          <a:p>
-            <a:pPr>
-              <a:buFont typeface="Wingdings" panose="05000000000000000000" pitchFamily="2" charset="2"/>
-              <a:buChar char="ü"/>
-            </a:pPr>
-            <a:r>
-              <a:rPr lang="en-US" dirty="0"/>
-              <a:t>Must meet good quality coding standards (indentation, scoping, naming, etc.)</a:t>
-            </a:r>
-          </a:p>
-          <a:p>
-            <a:pPr>
-              <a:buFont typeface="Wingdings" panose="05000000000000000000" pitchFamily="2" charset="2"/>
-              <a:buChar char="ü"/>
-            </a:pPr>
-            <a:r>
-              <a:rPr lang="en-US" dirty="0"/>
-              <a:t>Does NOT use alerts, confirms, or prompts (look into </a:t>
-            </a:r>
-            <a:r>
-              <a:rPr lang="en-US" i="1" dirty="0"/>
-              <a:t>modals</a:t>
-            </a:r>
-            <a:r>
-              <a:rPr lang="en-US" dirty="0"/>
-              <a:t>).</a:t>
-            </a:r>
-          </a:p>
-          <a:p>
-            <a:pPr>
-              <a:buFont typeface="Wingdings" panose="05000000000000000000" pitchFamily="2" charset="2"/>
-              <a:buChar char="ü"/>
-            </a:pPr>
-            <a:r>
-              <a:rPr lang="en-US" dirty="0"/>
-              <a:t>Must be deployed to GitHub Pages</a:t>
-            </a:r>
-          </a:p>
-          <a:p>
-            <a:pPr>
-              <a:buFont typeface="Wingdings" panose="05000000000000000000" pitchFamily="2" charset="2"/>
-              <a:buChar char="ü"/>
-            </a:pPr>
-            <a:r>
-              <a:rPr lang="en-US" dirty="0"/>
-              <a:t>Must be interactive (</a:t>
-            </a:r>
-            <a:r>
-              <a:rPr lang="en-US" dirty="0" err="1"/>
-              <a:t>i.e</a:t>
-            </a:r>
-            <a:r>
-              <a:rPr lang="en-US" dirty="0"/>
-              <a:t>: accept and respond to user input)</a:t>
-            </a:r>
-            <a:endParaRPr lang="en-US" b="1" dirty="0"/>
+              <a:t>wireframe</a:t>
+            </a:r>
           </a:p>
         </p:txBody>
       </p:sp>
     </p:spTree>
     <p:extLst>
       <p:ext uri="{BB962C8B-B14F-4D97-AF65-F5344CB8AC3E}">
-        <p14:creationId xmlns:p14="http://schemas.microsoft.com/office/powerpoint/2010/main" val="280059492"/>
+        <p14:creationId xmlns:p14="http://schemas.microsoft.com/office/powerpoint/2010/main" val="1319871924"/>
       </p:ext>
     </p:extLst>
   </p:cSld>
@@ -4391,10 +8208,10 @@
       </p:grpSpPr>
       <p:sp>
         <p:nvSpPr>
-          <p:cNvPr id="2" name="Title 1">
+          <p:cNvPr id="18" name="Title 17">
             <a:extLst>
               <a:ext uri="{FF2B5EF4-FFF2-40B4-BE49-F238E27FC236}">
-                <a16:creationId xmlns:a16="http://schemas.microsoft.com/office/drawing/2014/main" id="{EFBF182F-32AB-46F7-8CBA-8FB215C6A87A}"/>
+                <a16:creationId xmlns:a16="http://schemas.microsoft.com/office/drawing/2014/main" id="{382BE2DA-2D7B-4309-955D-F85AD658DC91}"/>
               </a:ext>
             </a:extLst>
           </p:cNvPr>
@@ -4412,17 +8229,17 @@
           <a:p>
             <a:r>
               <a:rPr lang="en-US" dirty="0"/>
-              <a:t>Meeting Our Project MVP</a:t>
+              <a:t>Project Requirements</a:t>
             </a:r>
           </a:p>
         </p:txBody>
       </p:sp>
       <p:sp>
         <p:nvSpPr>
-          <p:cNvPr id="3" name="Text Placeholder 2">
+          <p:cNvPr id="19" name="Content Placeholder 18">
             <a:extLst>
               <a:ext uri="{FF2B5EF4-FFF2-40B4-BE49-F238E27FC236}">
-                <a16:creationId xmlns:a16="http://schemas.microsoft.com/office/drawing/2014/main" id="{2ED03923-908E-44FF-B0A2-CFE25CF0FF86}"/>
+                <a16:creationId xmlns:a16="http://schemas.microsoft.com/office/drawing/2014/main" id="{55B74B31-AA31-4C04-AA40-099F1C74F53F}"/>
               </a:ext>
             </a:extLst>
           </p:cNvPr>
@@ -4430,7 +8247,7 @@
             <a:spLocks noGrp="1"/>
           </p:cNvSpPr>
           <p:nvPr>
-            <p:ph type="body" idx="1"/>
+            <p:ph idx="1"/>
           </p:nvPr>
         </p:nvSpPr>
         <p:spPr/>
@@ -4438,93 +8255,116 @@
           <a:bodyPr/>
           <a:lstStyle/>
           <a:p>
-            <a:r>
-              <a:rPr lang="en-US"/>
-              <a:t>User </a:t>
-            </a:r>
-            <a:endParaRPr lang="en-US" dirty="0"/>
-          </a:p>
-        </p:txBody>
-      </p:sp>
-      <p:sp>
-        <p:nvSpPr>
-          <p:cNvPr id="4" name="Content Placeholder 3">
-            <a:extLst>
-              <a:ext uri="{FF2B5EF4-FFF2-40B4-BE49-F238E27FC236}">
-                <a16:creationId xmlns:a16="http://schemas.microsoft.com/office/drawing/2014/main" id="{24AF89E1-8FAD-4036-94A2-F725CCAD0765}"/>
-              </a:ext>
-            </a:extLst>
-          </p:cNvPr>
-          <p:cNvSpPr>
-            <a:spLocks noGrp="1"/>
-          </p:cNvSpPr>
-          <p:nvPr>
-            <p:ph sz="half" idx="2"/>
-          </p:nvPr>
-        </p:nvSpPr>
-        <p:spPr/>
-        <p:txBody>
-          <a:bodyPr/>
-          <a:lstStyle/>
-          <a:p>
-            <a:endParaRPr lang="en-US" dirty="0"/>
-          </a:p>
-        </p:txBody>
-      </p:sp>
-      <p:sp>
-        <p:nvSpPr>
-          <p:cNvPr id="5" name="Text Placeholder 4">
-            <a:extLst>
-              <a:ext uri="{FF2B5EF4-FFF2-40B4-BE49-F238E27FC236}">
-                <a16:creationId xmlns:a16="http://schemas.microsoft.com/office/drawing/2014/main" id="{C9575EAE-319D-47A7-B7FD-DF5EA631BA32}"/>
-              </a:ext>
-            </a:extLst>
-          </p:cNvPr>
-          <p:cNvSpPr>
-            <a:spLocks noGrp="1"/>
-          </p:cNvSpPr>
-          <p:nvPr>
-            <p:ph type="body" sz="quarter" idx="3"/>
-          </p:nvPr>
-        </p:nvSpPr>
-        <p:spPr/>
-        <p:txBody>
-          <a:bodyPr/>
-          <a:lstStyle/>
-          <a:p>
-            <a:endParaRPr lang="en-US"/>
-          </a:p>
-        </p:txBody>
-      </p:sp>
-      <p:sp>
-        <p:nvSpPr>
-          <p:cNvPr id="6" name="Content Placeholder 5">
-            <a:extLst>
-              <a:ext uri="{FF2B5EF4-FFF2-40B4-BE49-F238E27FC236}">
-                <a16:creationId xmlns:a16="http://schemas.microsoft.com/office/drawing/2014/main" id="{FA6921A9-C323-443A-91F4-D3BBDE344A9E}"/>
-              </a:ext>
-            </a:extLst>
-          </p:cNvPr>
-          <p:cNvSpPr>
-            <a:spLocks noGrp="1"/>
-          </p:cNvSpPr>
-          <p:nvPr>
-            <p:ph sz="quarter" idx="4"/>
-          </p:nvPr>
-        </p:nvSpPr>
-        <p:spPr/>
-        <p:txBody>
-          <a:bodyPr/>
-          <a:lstStyle/>
-          <a:p>
-            <a:endParaRPr lang="en-US"/>
+            <a:pPr>
+              <a:buFont typeface="Wingdings" panose="05000000000000000000" pitchFamily="2" charset="2"/>
+              <a:buChar char="ü"/>
+            </a:pPr>
+            <a:r>
+              <a:rPr lang="en-US" dirty="0"/>
+              <a:t>Must use at least two server-side APIs</a:t>
+            </a:r>
+          </a:p>
+          <a:p>
+            <a:pPr>
+              <a:buFont typeface="Wingdings" panose="05000000000000000000" pitchFamily="2" charset="2"/>
+              <a:buChar char="ü"/>
+            </a:pPr>
+            <a:r>
+              <a:rPr lang="en-US" dirty="0"/>
+              <a:t>Must use a CSS framework </a:t>
+            </a:r>
+            <a:r>
+              <a:rPr lang="en-US" i="1" dirty="0"/>
+              <a:t>other than </a:t>
+            </a:r>
+            <a:r>
+              <a:rPr lang="en-US" dirty="0"/>
+              <a:t>Bootstrap</a:t>
+            </a:r>
+          </a:p>
+          <a:p>
+            <a:pPr>
+              <a:buFont typeface="Wingdings" panose="05000000000000000000" pitchFamily="2" charset="2"/>
+              <a:buChar char="ü"/>
+            </a:pPr>
+            <a:r>
+              <a:rPr lang="en-US" dirty="0"/>
+              <a:t>Use at least one new third-party API</a:t>
+            </a:r>
+          </a:p>
+          <a:p>
+            <a:pPr>
+              <a:buFont typeface="Wingdings" panose="05000000000000000000" pitchFamily="2" charset="2"/>
+              <a:buChar char="ü"/>
+            </a:pPr>
+            <a:r>
+              <a:rPr lang="en-US" dirty="0"/>
+              <a:t>Must have a polished, mobile-first UI</a:t>
+            </a:r>
+          </a:p>
+          <a:p>
+            <a:pPr>
+              <a:buFont typeface="Wingdings" panose="05000000000000000000" pitchFamily="2" charset="2"/>
+              <a:buChar char="ü"/>
+            </a:pPr>
+            <a:r>
+              <a:rPr lang="en-US" dirty="0"/>
+              <a:t>Must meet good quality coding standards (indentation, scoping, naming, etc.)</a:t>
+            </a:r>
+          </a:p>
+          <a:p>
+            <a:pPr>
+              <a:buFont typeface="Wingdings" panose="05000000000000000000" pitchFamily="2" charset="2"/>
+              <a:buChar char="ü"/>
+            </a:pPr>
+            <a:r>
+              <a:rPr lang="en-US" dirty="0"/>
+              <a:t>Does NOT use alerts, confirms, or prompts (look into </a:t>
+            </a:r>
+            <a:r>
+              <a:rPr lang="en-US" i="1" dirty="0"/>
+              <a:t>modals</a:t>
+            </a:r>
+            <a:r>
+              <a:rPr lang="en-US" dirty="0"/>
+              <a:t>).</a:t>
+            </a:r>
+          </a:p>
+          <a:p>
+            <a:pPr>
+              <a:buFont typeface="Wingdings" panose="05000000000000000000" pitchFamily="2" charset="2"/>
+              <a:buChar char="ü"/>
+            </a:pPr>
+            <a:r>
+              <a:rPr lang="en-US" dirty="0"/>
+              <a:t>Must be deployed to GitHub Pages</a:t>
+            </a:r>
+          </a:p>
+          <a:p>
+            <a:pPr>
+              <a:buFont typeface="Wingdings" panose="05000000000000000000" pitchFamily="2" charset="2"/>
+              <a:buChar char="ü"/>
+            </a:pPr>
+            <a:r>
+              <a:rPr lang="en-US" dirty="0"/>
+              <a:t>Must be interactive (</a:t>
+            </a:r>
+            <a:r>
+              <a:rPr lang="en-US" dirty="0" err="1"/>
+              <a:t>i.e</a:t>
+            </a:r>
+            <a:r>
+              <a:rPr lang="en-US" dirty="0"/>
+              <a:t>: accept and respond to user input)</a:t>
+            </a:r>
+            <a:endParaRPr lang="en-US" b="1" dirty="0"/>
           </a:p>
         </p:txBody>
       </p:sp>
     </p:spTree>
     <p:extLst>
       <p:ext uri="{BB962C8B-B14F-4D97-AF65-F5344CB8AC3E}">
-        <p14:creationId xmlns:p14="http://schemas.microsoft.com/office/powerpoint/2010/main" val="9560277"/>
+        <p14:creationId xmlns:p14="http://schemas.microsoft.com/office/powerpoint/2010/main" val="280059492"/>
       </p:ext>
     </p:extLst>
   </p:cSld>
@@ -4581,6 +8421,34 @@
       </p:sp>
       <p:sp>
         <p:nvSpPr>
+          <p:cNvPr id="4" name="Text Placeholder 3">
+            <a:extLst>
+              <a:ext uri="{FF2B5EF4-FFF2-40B4-BE49-F238E27FC236}">
+                <a16:creationId xmlns:a16="http://schemas.microsoft.com/office/drawing/2014/main" id="{343C1F18-9882-4906-8CE5-E285BD8E197B}"/>
+              </a:ext>
+            </a:extLst>
+          </p:cNvPr>
+          <p:cNvSpPr>
+            <a:spLocks noGrp="1"/>
+          </p:cNvSpPr>
+          <p:nvPr>
+            <p:ph type="body" idx="1"/>
+          </p:nvPr>
+        </p:nvSpPr>
+        <p:spPr/>
+        <p:txBody>
+          <a:bodyPr/>
+          <a:lstStyle/>
+          <a:p>
+            <a:r>
+              <a:rPr lang="en-US" dirty="0"/>
+              <a:t>languages</a:t>
+            </a:r>
+          </a:p>
+        </p:txBody>
+      </p:sp>
+      <p:sp>
+        <p:nvSpPr>
           <p:cNvPr id="3" name="Content Placeholder 2">
             <a:extLst>
               <a:ext uri="{FF2B5EF4-FFF2-40B4-BE49-F238E27FC236}">
@@ -4592,7 +8460,71 @@
             <a:spLocks noGrp="1"/>
           </p:cNvSpPr>
           <p:nvPr>
-            <p:ph idx="1"/>
+            <p:ph sz="half" idx="2"/>
+          </p:nvPr>
+        </p:nvSpPr>
+        <p:spPr/>
+        <p:txBody>
+          <a:bodyPr>
+            <a:normAutofit/>
+          </a:bodyPr>
+          <a:lstStyle/>
+          <a:p>
+            <a:pPr>
+              <a:buFont typeface="Courier New" panose="02070309020205020404" pitchFamily="49" charset="0"/>
+              <a:buChar char="o"/>
+            </a:pPr>
+            <a:r>
+              <a:rPr lang="en-US" dirty="0"/>
+              <a:t> HTML</a:t>
+            </a:r>
+          </a:p>
+          <a:p>
+            <a:pPr>
+              <a:buFont typeface="Courier New" panose="02070309020205020404" pitchFamily="49" charset="0"/>
+              <a:buChar char="o"/>
+            </a:pPr>
+            <a:r>
+              <a:rPr lang="en-US" dirty="0"/>
+              <a:t> JavaScript</a:t>
+            </a:r>
+          </a:p>
+          <a:p>
+            <a:pPr>
+              <a:buFont typeface="Courier New" panose="02070309020205020404" pitchFamily="49" charset="0"/>
+              <a:buChar char="o"/>
+            </a:pPr>
+            <a:r>
+              <a:rPr lang="en-US" dirty="0"/>
+              <a:t> Standard CSS </a:t>
+            </a:r>
+          </a:p>
+          <a:p>
+            <a:pPr>
+              <a:buFont typeface="Courier New" panose="02070309020205020404" pitchFamily="49" charset="0"/>
+              <a:buChar char="o"/>
+            </a:pPr>
+            <a:r>
+              <a:rPr lang="en-US" dirty="0"/>
+              <a:t> Materialize CSS</a:t>
+            </a:r>
+          </a:p>
+        </p:txBody>
+      </p:sp>
+      <p:sp>
+        <p:nvSpPr>
+          <p:cNvPr id="5" name="Text Placeholder 4">
+            <a:extLst>
+              <a:ext uri="{FF2B5EF4-FFF2-40B4-BE49-F238E27FC236}">
+                <a16:creationId xmlns:a16="http://schemas.microsoft.com/office/drawing/2014/main" id="{569B3A65-79EA-4B06-89E4-90506032E9A6}"/>
+              </a:ext>
+            </a:extLst>
+          </p:cNvPr>
+          <p:cNvSpPr>
+            <a:spLocks noGrp="1"/>
+          </p:cNvSpPr>
+          <p:nvPr>
+            <p:ph type="body" sz="quarter" idx="3"/>
           </p:nvPr>
         </p:nvSpPr>
         <p:spPr/>
@@ -4600,7 +8532,77 @@
           <a:bodyPr/>
           <a:lstStyle/>
           <a:p>
-            <a:endParaRPr lang="en-US"/>
+            <a:r>
+              <a:rPr lang="en-US" dirty="0"/>
+              <a:t>Technical tools</a:t>
+            </a:r>
+          </a:p>
+        </p:txBody>
+      </p:sp>
+      <p:sp>
+        <p:nvSpPr>
+          <p:cNvPr id="6" name="Content Placeholder 5">
+            <a:extLst>
+              <a:ext uri="{FF2B5EF4-FFF2-40B4-BE49-F238E27FC236}">
+                <a16:creationId xmlns:a16="http://schemas.microsoft.com/office/drawing/2014/main" id="{7BEA1737-F8B1-456F-B6E1-21674E4A3598}"/>
+              </a:ext>
+            </a:extLst>
+          </p:cNvPr>
+          <p:cNvSpPr>
+            <a:spLocks noGrp="1"/>
+          </p:cNvSpPr>
+          <p:nvPr>
+            <p:ph sz="quarter" idx="4"/>
+          </p:nvPr>
+        </p:nvSpPr>
+        <p:spPr/>
+        <p:txBody>
+          <a:bodyPr>
+            <a:normAutofit/>
+          </a:bodyPr>
+          <a:lstStyle/>
+          <a:p>
+            <a:pPr>
+              <a:buFont typeface="Courier New" panose="02070309020205020404" pitchFamily="49" charset="0"/>
+              <a:buChar char="o"/>
+            </a:pPr>
+            <a:r>
+              <a:rPr lang="en-US" dirty="0"/>
+              <a:t> Post Man</a:t>
+            </a:r>
+          </a:p>
+          <a:p>
+            <a:pPr>
+              <a:buFont typeface="Courier New" panose="02070309020205020404" pitchFamily="49" charset="0"/>
+              <a:buChar char="o"/>
+            </a:pPr>
+            <a:r>
+              <a:rPr lang="en-US" dirty="0"/>
+              <a:t> Draw.io</a:t>
+            </a:r>
+          </a:p>
+          <a:p>
+            <a:pPr>
+              <a:buFont typeface="Courier New" panose="02070309020205020404" pitchFamily="49" charset="0"/>
+              <a:buChar char="o"/>
+            </a:pPr>
+            <a:r>
+              <a:rPr lang="en-US" dirty="0"/>
+              <a:t> Visual Studio Code</a:t>
+            </a:r>
+          </a:p>
+          <a:p>
+            <a:pPr>
+              <a:buFont typeface="Courier New" panose="02070309020205020404" pitchFamily="49" charset="0"/>
+              <a:buChar char="o"/>
+            </a:pPr>
+            <a:r>
+              <a:rPr lang="en-US" dirty="0"/>
+              <a:t> Two third-party API sources (listed in the following slide) </a:t>
+            </a:r>
+          </a:p>
+          <a:p>
+            <a:endParaRPr lang="en-US" dirty="0"/>
           </a:p>
         </p:txBody>
       </p:sp>
@@ -4636,10 +8638,10 @@
       </p:grpSpPr>
       <p:sp>
         <p:nvSpPr>
-          <p:cNvPr id="4" name="Title 3">
+          <p:cNvPr id="2" name="Title 1">
             <a:extLst>
               <a:ext uri="{FF2B5EF4-FFF2-40B4-BE49-F238E27FC236}">
-                <a16:creationId xmlns:a16="http://schemas.microsoft.com/office/drawing/2014/main" id="{9D217995-CF48-453D-9F72-7A0FB0F49A4D}"/>
+                <a16:creationId xmlns:a16="http://schemas.microsoft.com/office/drawing/2014/main" id="{5CA1B235-0A35-4B48-AA31-F6B55AA0D7BB}"/>
               </a:ext>
             </a:extLst>
           </p:cNvPr>
@@ -4656,19 +8658,18 @@
           <a:lstStyle/>
           <a:p>
             <a:r>
-              <a:rPr lang="en-US"/>
-              <a:t>Beginning Development</a:t>
-            </a:r>
-            <a:endParaRPr lang="en-US" dirty="0"/>
+              <a:rPr lang="en-US" dirty="0"/>
+              <a:t>Project APIs</a:t>
+            </a:r>
           </a:p>
         </p:txBody>
       </p:sp>
       <p:sp>
         <p:nvSpPr>
-          <p:cNvPr id="7" name="Text Placeholder 6">
+          <p:cNvPr id="3" name="Content Placeholder 2">
             <a:extLst>
               <a:ext uri="{FF2B5EF4-FFF2-40B4-BE49-F238E27FC236}">
-                <a16:creationId xmlns:a16="http://schemas.microsoft.com/office/drawing/2014/main" id="{77212D67-04F3-487D-855E-4C0D2F2EF2E1}"/>
+                <a16:creationId xmlns:a16="http://schemas.microsoft.com/office/drawing/2014/main" id="{5A9B18C0-6423-4C49-ACDE-919654FC03ED}"/>
               </a:ext>
             </a:extLst>
           </p:cNvPr>
@@ -4676,7 +8677,7 @@
             <a:spLocks noGrp="1"/>
           </p:cNvSpPr>
           <p:nvPr>
-            <p:ph type="body" idx="1"/>
+            <p:ph idx="1"/>
           </p:nvPr>
         </p:nvSpPr>
         <p:spPr/>
@@ -4686,84 +8687,72 @@
           <a:p>
             <a:r>
               <a:rPr lang="en-US" dirty="0"/>
-              <a:t>Flowchart</a:t>
-            </a:r>
-          </a:p>
-        </p:txBody>
-      </p:sp>
-      <p:sp>
-        <p:nvSpPr>
-          <p:cNvPr id="5" name="Content Placeholder 4">
-            <a:extLst>
-              <a:ext uri="{FF2B5EF4-FFF2-40B4-BE49-F238E27FC236}">
-                <a16:creationId xmlns:a16="http://schemas.microsoft.com/office/drawing/2014/main" id="{B3A7EBAD-84BC-427E-B513-7234DCD8BF8B}"/>
-              </a:ext>
-            </a:extLst>
-          </p:cNvPr>
-          <p:cNvSpPr>
-            <a:spLocks noGrp="1"/>
-          </p:cNvSpPr>
-          <p:nvPr>
-            <p:ph sz="half" idx="2"/>
-          </p:nvPr>
-        </p:nvSpPr>
-        <p:spPr/>
-        <p:txBody>
-          <a:bodyPr/>
-          <a:lstStyle/>
+              <a:t>Here are the two APIs that we used for this project.</a:t>
+            </a:r>
+          </a:p>
           <a:p>
             <a:endParaRPr lang="en-US" dirty="0"/>
           </a:p>
-        </p:txBody>
-      </p:sp>
-      <p:sp>
-        <p:nvSpPr>
-          <p:cNvPr id="8" name="Text Placeholder 7">
-            <a:extLst>
-              <a:ext uri="{FF2B5EF4-FFF2-40B4-BE49-F238E27FC236}">
-                <a16:creationId xmlns:a16="http://schemas.microsoft.com/office/drawing/2014/main" id="{FAD44BBC-30D1-46E6-A86F-A3AF8A22251A}"/>
-              </a:ext>
-            </a:extLst>
-          </p:cNvPr>
-          <p:cNvSpPr>
-            <a:spLocks noGrp="1"/>
-          </p:cNvSpPr>
-          <p:nvPr>
-            <p:ph type="body" sz="quarter" idx="3"/>
-          </p:nvPr>
-        </p:nvSpPr>
-        <p:spPr/>
-        <p:txBody>
-          <a:bodyPr/>
-          <a:lstStyle/>
-          <a:p>
+          <a:p>
+            <a:pPr marL="749808" lvl="1" indent="-457200">
+              <a:buFont typeface="+mj-lt"/>
+              <a:buAutoNum type="arabicPeriod"/>
+            </a:pPr>
             <a:r>
               <a:rPr lang="en-US" dirty="0"/>
-              <a:t>wireframe</a:t>
-            </a:r>
-          </a:p>
-        </p:txBody>
-      </p:sp>
-      <p:sp>
-        <p:nvSpPr>
-          <p:cNvPr id="6" name="Content Placeholder 5">
-            <a:extLst>
-              <a:ext uri="{FF2B5EF4-FFF2-40B4-BE49-F238E27FC236}">
-                <a16:creationId xmlns:a16="http://schemas.microsoft.com/office/drawing/2014/main" id="{436C213C-6D86-4BDA-8BC0-BC9BFA63E7EB}"/>
-              </a:ext>
-            </a:extLst>
-          </p:cNvPr>
-          <p:cNvSpPr>
-            <a:spLocks noGrp="1"/>
-          </p:cNvSpPr>
-          <p:nvPr>
-            <p:ph sz="quarter" idx="4"/>
-          </p:nvPr>
-        </p:nvSpPr>
-        <p:spPr/>
-        <p:txBody>
-          <a:bodyPr/>
-          <a:lstStyle/>
+              <a:t>IMDb API - </a:t>
+            </a:r>
+            <a:r>
+              <a:rPr lang="en-US" dirty="0">
+                <a:hlinkClick r:id="rId2"/>
+              </a:rPr>
+              <a:t>https://rapidapi.com/apidojo/api/imdb8</a:t>
+            </a:r>
+            <a:endParaRPr lang="en-US" dirty="0"/>
+          </a:p>
+          <a:p>
+            <a:pPr marL="932688" lvl="2" indent="-457200">
+              <a:buFont typeface="Courier New" panose="02070309020205020404" pitchFamily="49" charset="0"/>
+              <a:buChar char="o"/>
+            </a:pPr>
+            <a:r>
+              <a:rPr lang="en-US" dirty="0"/>
+              <a:t>This API was used to populate movies data based on user selection criteria because (in limited scenarios) this API had the data that showed where movies / TV series were streaming.</a:t>
+            </a:r>
+          </a:p>
+          <a:p>
+            <a:pPr marL="475488" lvl="2" indent="0">
+              <a:buNone/>
+            </a:pPr>
+            <a:endParaRPr lang="en-US" dirty="0"/>
+          </a:p>
+          <a:p>
+            <a:pPr marL="749808" lvl="1" indent="-457200">
+              <a:buFont typeface="+mj-lt"/>
+              <a:buAutoNum type="arabicPeriod"/>
+            </a:pPr>
+            <a:r>
+              <a:rPr lang="en-US" dirty="0"/>
+              <a:t>The Movie Database API - </a:t>
+            </a:r>
+            <a:r>
+              <a:rPr lang="en-US" dirty="0">
+                <a:hlinkClick r:id="rId3"/>
+              </a:rPr>
+              <a:t>https://developers.themoviedb.org/3/getting-started/introduction</a:t>
+            </a:r>
+            <a:endParaRPr lang="en-US" dirty="0"/>
+          </a:p>
+          <a:p>
+            <a:pPr marL="932688" lvl="2" indent="-457200">
+              <a:buFont typeface="Courier New" panose="02070309020205020404" pitchFamily="49" charset="0"/>
+              <a:buChar char="o"/>
+            </a:pPr>
+            <a:r>
+              <a:rPr lang="en-US" dirty="0"/>
+              <a:t>This API was used to populate the alternative list of movies current showing in theaters for when the application was unable to pull content matches for the users selections.</a:t>
+            </a:r>
+          </a:p>
           <a:p>
             <a:endParaRPr lang="en-US" dirty="0"/>
           </a:p>
@@ -4772,7 +8761,7 @@
     </p:spTree>
     <p:extLst>
       <p:ext uri="{BB962C8B-B14F-4D97-AF65-F5344CB8AC3E}">
-        <p14:creationId xmlns:p14="http://schemas.microsoft.com/office/powerpoint/2010/main" val="1319871924"/>
+        <p14:creationId xmlns:p14="http://schemas.microsoft.com/office/powerpoint/2010/main" val="1600017888"/>
       </p:ext>
     </p:extLst>
   </p:cSld>
@@ -4804,7 +8793,7 @@
           <p:cNvPr id="2" name="Title 1">
             <a:extLst>
               <a:ext uri="{FF2B5EF4-FFF2-40B4-BE49-F238E27FC236}">
-                <a16:creationId xmlns:a16="http://schemas.microsoft.com/office/drawing/2014/main" id="{5CA1B235-0A35-4B48-AA31-F6B55AA0D7BB}"/>
+                <a16:creationId xmlns:a16="http://schemas.microsoft.com/office/drawing/2014/main" id="{BF00CAC8-F4B8-4C03-88B3-F0BEB8E000E5}"/>
               </a:ext>
             </a:extLst>
           </p:cNvPr>
@@ -4822,7 +8811,7 @@
           <a:p>
             <a:r>
               <a:rPr lang="en-US" dirty="0"/>
-              <a:t>Project APIs</a:t>
+              <a:t>Lessons Learned</a:t>
             </a:r>
           </a:p>
         </p:txBody>
@@ -4832,7 +8821,7 @@
           <p:cNvPr id="3" name="Content Placeholder 2">
             <a:extLst>
               <a:ext uri="{FF2B5EF4-FFF2-40B4-BE49-F238E27FC236}">
-                <a16:creationId xmlns:a16="http://schemas.microsoft.com/office/drawing/2014/main" id="{5A9B18C0-6423-4C49-ACDE-919654FC03ED}"/>
+                <a16:creationId xmlns:a16="http://schemas.microsoft.com/office/drawing/2014/main" id="{4B31BC68-53FF-4450-B062-C9892BCA4C4A}"/>
               </a:ext>
             </a:extLst>
           </p:cNvPr>
@@ -4852,10 +8841,35 @@
           </a:p>
         </p:txBody>
       </p:sp>
+      <p:sp>
+        <p:nvSpPr>
+          <p:cNvPr id="4" name="Text Placeholder 3">
+            <a:extLst>
+              <a:ext uri="{FF2B5EF4-FFF2-40B4-BE49-F238E27FC236}">
+                <a16:creationId xmlns:a16="http://schemas.microsoft.com/office/drawing/2014/main" id="{25C8FA80-CF94-407B-90EC-BFD3AA9A82D4}"/>
+              </a:ext>
+            </a:extLst>
+          </p:cNvPr>
+          <p:cNvSpPr>
+            <a:spLocks noGrp="1"/>
+          </p:cNvSpPr>
+          <p:nvPr>
+            <p:ph type="body" sz="half" idx="2"/>
+          </p:nvPr>
+        </p:nvSpPr>
+        <p:spPr/>
+        <p:txBody>
+          <a:bodyPr/>
+          <a:lstStyle/>
+          <a:p>
+            <a:endParaRPr lang="en-US"/>
+          </a:p>
+        </p:txBody>
+      </p:sp>
     </p:spTree>
     <p:extLst>
       <p:ext uri="{BB962C8B-B14F-4D97-AF65-F5344CB8AC3E}">
-        <p14:creationId xmlns:p14="http://schemas.microsoft.com/office/powerpoint/2010/main" val="1600017888"/>
+        <p14:creationId xmlns:p14="http://schemas.microsoft.com/office/powerpoint/2010/main" val="2871113362"/>
       </p:ext>
     </p:extLst>
   </p:cSld>

</xml_diff>